<commit_message>
App layout and styling
</commit_message>
<xml_diff>
--- a/Goal Tracker App - Screens.pptx
+++ b/Goal Tracker App - Screens.pptx
@@ -105,6 +105,11 @@
       </a:defRPr>
     </a:lvl9pPr>
   </p:defaultTextStyle>
+  <p:extLst>
+    <p:ext uri="{EFAFB233-063F-42B5-8137-9DF3F51BA10A}">
+      <p15:sldGuideLst xmlns:p15="http://schemas.microsoft.com/office/powerpoint/2012/main"/>
+    </p:ext>
+  </p:extLst>
 </p:presentation>
 </file>
 
@@ -5240,6 +5245,102 @@
           </p:spPr>
         </p:pic>
       </p:grpSp>
+      <p:sp>
+        <p:nvSpPr>
+          <p:cNvPr id="2" name="Minus Sign 1">
+            <a:extLst>
+              <a:ext uri="{FF2B5EF4-FFF2-40B4-BE49-F238E27FC236}">
+                <a16:creationId xmlns:a16="http://schemas.microsoft.com/office/drawing/2014/main" id="{729398E3-61C5-6E83-9C6B-6D456FDDC9A4}"/>
+              </a:ext>
+            </a:extLst>
+          </p:cNvPr>
+          <p:cNvSpPr/>
+          <p:nvPr/>
+        </p:nvSpPr>
+        <p:spPr>
+          <a:xfrm>
+            <a:off x="8532739" y="4718824"/>
+            <a:ext cx="299080" cy="330496"/>
+          </a:xfrm>
+          <a:prstGeom prst="mathMinus">
+            <a:avLst>
+              <a:gd name="adj1" fmla="val 15972"/>
+            </a:avLst>
+          </a:prstGeom>
+        </p:spPr>
+        <p:style>
+          <a:lnRef idx="2">
+            <a:schemeClr val="accent1">
+              <a:shade val="15000"/>
+            </a:schemeClr>
+          </a:lnRef>
+          <a:fillRef idx="1">
+            <a:schemeClr val="accent1"/>
+          </a:fillRef>
+          <a:effectRef idx="0">
+            <a:schemeClr val="accent1"/>
+          </a:effectRef>
+          <a:fontRef idx="minor">
+            <a:schemeClr val="lt1"/>
+          </a:fontRef>
+        </p:style>
+        <p:txBody>
+          <a:bodyPr rtlCol="0" anchor="ctr"/>
+          <a:lstStyle/>
+          <a:p>
+            <a:pPr algn="ctr"/>
+            <a:endParaRPr lang="en-CA"/>
+          </a:p>
+        </p:txBody>
+      </p:sp>
+      <p:sp>
+        <p:nvSpPr>
+          <p:cNvPr id="3" name="Minus Sign 2">
+            <a:extLst>
+              <a:ext uri="{FF2B5EF4-FFF2-40B4-BE49-F238E27FC236}">
+                <a16:creationId xmlns:a16="http://schemas.microsoft.com/office/drawing/2014/main" id="{2621BE25-A289-CDED-6F78-0A65303B6D3A}"/>
+              </a:ext>
+            </a:extLst>
+          </p:cNvPr>
+          <p:cNvSpPr/>
+          <p:nvPr/>
+        </p:nvSpPr>
+        <p:spPr>
+          <a:xfrm>
+            <a:off x="4525186" y="4542758"/>
+            <a:ext cx="299080" cy="330496"/>
+          </a:xfrm>
+          <a:prstGeom prst="mathMinus">
+            <a:avLst>
+              <a:gd name="adj1" fmla="val 15972"/>
+            </a:avLst>
+          </a:prstGeom>
+        </p:spPr>
+        <p:style>
+          <a:lnRef idx="2">
+            <a:schemeClr val="accent1">
+              <a:shade val="15000"/>
+            </a:schemeClr>
+          </a:lnRef>
+          <a:fillRef idx="1">
+            <a:schemeClr val="accent1"/>
+          </a:fillRef>
+          <a:effectRef idx="0">
+            <a:schemeClr val="accent1"/>
+          </a:effectRef>
+          <a:fontRef idx="minor">
+            <a:schemeClr val="lt1"/>
+          </a:fontRef>
+        </p:style>
+        <p:txBody>
+          <a:bodyPr rtlCol="0" anchor="ctr"/>
+          <a:lstStyle/>
+          <a:p>
+            <a:pPr algn="ctr"/>
+            <a:endParaRPr lang="en-CA"/>
+          </a:p>
+        </p:txBody>
+      </p:sp>
     </p:spTree>
     <p:extLst>
       <p:ext uri="{BB962C8B-B14F-4D97-AF65-F5344CB8AC3E}">

</xml_diff>

<commit_message>
Changes to Screens PPT
</commit_message>
<xml_diff>
--- a/Goal Tracker App - Screens.pptx
+++ b/Goal Tracker App - Screens.pptx
@@ -7,6 +7,8 @@
   <p:sldIdLst>
     <p:sldId id="256" r:id="rId2"/>
     <p:sldId id="257" r:id="rId3"/>
+    <p:sldId id="258" r:id="rId4"/>
+    <p:sldId id="259" r:id="rId5"/>
   </p:sldIdLst>
   <p:sldSz cx="12192000" cy="6858000"/>
   <p:notesSz cx="6858000" cy="9144000"/>
@@ -262,7 +264,7 @@
           <a:p>
             <a:fld id="{0938498D-1C41-419D-AAE9-C19D57E0856E}" type="datetimeFigureOut">
               <a:rPr lang="en-CA" smtClean="0"/>
-              <a:t>2023-08-30</a:t>
+              <a:t>2023-09-11</a:t>
             </a:fld>
             <a:endParaRPr lang="en-CA"/>
           </a:p>
@@ -462,7 +464,7 @@
           <a:p>
             <a:fld id="{0938498D-1C41-419D-AAE9-C19D57E0856E}" type="datetimeFigureOut">
               <a:rPr lang="en-CA" smtClean="0"/>
-              <a:t>2023-08-30</a:t>
+              <a:t>2023-09-11</a:t>
             </a:fld>
             <a:endParaRPr lang="en-CA"/>
           </a:p>
@@ -672,7 +674,7 @@
           <a:p>
             <a:fld id="{0938498D-1C41-419D-AAE9-C19D57E0856E}" type="datetimeFigureOut">
               <a:rPr lang="en-CA" smtClean="0"/>
-              <a:t>2023-08-30</a:t>
+              <a:t>2023-09-11</a:t>
             </a:fld>
             <a:endParaRPr lang="en-CA"/>
           </a:p>
@@ -872,7 +874,7 @@
           <a:p>
             <a:fld id="{0938498D-1C41-419D-AAE9-C19D57E0856E}" type="datetimeFigureOut">
               <a:rPr lang="en-CA" smtClean="0"/>
-              <a:t>2023-08-30</a:t>
+              <a:t>2023-09-11</a:t>
             </a:fld>
             <a:endParaRPr lang="en-CA"/>
           </a:p>
@@ -1148,7 +1150,7 @@
           <a:p>
             <a:fld id="{0938498D-1C41-419D-AAE9-C19D57E0856E}" type="datetimeFigureOut">
               <a:rPr lang="en-CA" smtClean="0"/>
-              <a:t>2023-08-30</a:t>
+              <a:t>2023-09-11</a:t>
             </a:fld>
             <a:endParaRPr lang="en-CA"/>
           </a:p>
@@ -1416,7 +1418,7 @@
           <a:p>
             <a:fld id="{0938498D-1C41-419D-AAE9-C19D57E0856E}" type="datetimeFigureOut">
               <a:rPr lang="en-CA" smtClean="0"/>
-              <a:t>2023-08-30</a:t>
+              <a:t>2023-09-11</a:t>
             </a:fld>
             <a:endParaRPr lang="en-CA"/>
           </a:p>
@@ -1831,7 +1833,7 @@
           <a:p>
             <a:fld id="{0938498D-1C41-419D-AAE9-C19D57E0856E}" type="datetimeFigureOut">
               <a:rPr lang="en-CA" smtClean="0"/>
-              <a:t>2023-08-30</a:t>
+              <a:t>2023-09-11</a:t>
             </a:fld>
             <a:endParaRPr lang="en-CA"/>
           </a:p>
@@ -1973,7 +1975,7 @@
           <a:p>
             <a:fld id="{0938498D-1C41-419D-AAE9-C19D57E0856E}" type="datetimeFigureOut">
               <a:rPr lang="en-CA" smtClean="0"/>
-              <a:t>2023-08-30</a:t>
+              <a:t>2023-09-11</a:t>
             </a:fld>
             <a:endParaRPr lang="en-CA"/>
           </a:p>
@@ -2086,7 +2088,7 @@
           <a:p>
             <a:fld id="{0938498D-1C41-419D-AAE9-C19D57E0856E}" type="datetimeFigureOut">
               <a:rPr lang="en-CA" smtClean="0"/>
-              <a:t>2023-08-30</a:t>
+              <a:t>2023-09-11</a:t>
             </a:fld>
             <a:endParaRPr lang="en-CA"/>
           </a:p>
@@ -2399,7 +2401,7 @@
           <a:p>
             <a:fld id="{0938498D-1C41-419D-AAE9-C19D57E0856E}" type="datetimeFigureOut">
               <a:rPr lang="en-CA" smtClean="0"/>
-              <a:t>2023-08-30</a:t>
+              <a:t>2023-09-11</a:t>
             </a:fld>
             <a:endParaRPr lang="en-CA"/>
           </a:p>
@@ -2688,7 +2690,7 @@
           <a:p>
             <a:fld id="{0938498D-1C41-419D-AAE9-C19D57E0856E}" type="datetimeFigureOut">
               <a:rPr lang="en-CA" smtClean="0"/>
-              <a:t>2023-08-30</a:t>
+              <a:t>2023-09-11</a:t>
             </a:fld>
             <a:endParaRPr lang="en-CA"/>
           </a:p>
@@ -2961,7 +2963,7 @@
           <a:p>
             <a:fld id="{0938498D-1C41-419D-AAE9-C19D57E0856E}" type="datetimeFigureOut">
               <a:rPr lang="en-CA" smtClean="0"/>
-              <a:t>2023-08-30</a:t>
+              <a:t>2023-09-11</a:t>
             </a:fld>
             <a:endParaRPr lang="en-CA"/>
           </a:p>
@@ -5354,6 +5356,4414 @@
 </p:sld>
 </file>
 
+<file path=ppt/slides/slide3.xml><?xml version="1.0" encoding="utf-8"?>
+<p:sld xmlns:a="http://schemas.openxmlformats.org/drawingml/2006/main" xmlns:r="http://schemas.openxmlformats.org/officeDocument/2006/relationships" xmlns:p="http://schemas.openxmlformats.org/presentationml/2006/main">
+  <p:cSld>
+    <p:spTree>
+      <p:nvGrpSpPr>
+        <p:cNvPr id="1" name=""/>
+        <p:cNvGrpSpPr/>
+        <p:nvPr/>
+      </p:nvGrpSpPr>
+      <p:grpSpPr>
+        <a:xfrm>
+          <a:off x="0" y="0"/>
+          <a:ext cx="0" cy="0"/>
+          <a:chOff x="0" y="0"/>
+          <a:chExt cx="0" cy="0"/>
+        </a:xfrm>
+      </p:grpSpPr>
+      <p:cxnSp>
+        <p:nvCxnSpPr>
+          <p:cNvPr id="4" name="Straight Connector 3">
+            <a:extLst>
+              <a:ext uri="{FF2B5EF4-FFF2-40B4-BE49-F238E27FC236}">
+                <a16:creationId xmlns:a16="http://schemas.microsoft.com/office/drawing/2014/main" id="{A135C611-2DC4-4B2C-AE68-3C93AE39356C}"/>
+              </a:ext>
+            </a:extLst>
+          </p:cNvPr>
+          <p:cNvCxnSpPr/>
+          <p:nvPr/>
+        </p:nvCxnSpPr>
+        <p:spPr>
+          <a:xfrm>
+            <a:off x="0" y="680720"/>
+            <a:ext cx="12192000" cy="0"/>
+          </a:xfrm>
+          <a:prstGeom prst="line">
+            <a:avLst/>
+          </a:prstGeom>
+        </p:spPr>
+        <p:style>
+          <a:lnRef idx="1">
+            <a:schemeClr val="accent1"/>
+          </a:lnRef>
+          <a:fillRef idx="0">
+            <a:schemeClr val="accent1"/>
+          </a:fillRef>
+          <a:effectRef idx="0">
+            <a:schemeClr val="accent1"/>
+          </a:effectRef>
+          <a:fontRef idx="minor">
+            <a:schemeClr val="tx1"/>
+          </a:fontRef>
+        </p:style>
+      </p:cxnSp>
+      <p:sp>
+        <p:nvSpPr>
+          <p:cNvPr id="5" name="Rectangle: Rounded Corners 4">
+            <a:extLst>
+              <a:ext uri="{FF2B5EF4-FFF2-40B4-BE49-F238E27FC236}">
+                <a16:creationId xmlns:a16="http://schemas.microsoft.com/office/drawing/2014/main" id="{3A737122-794D-4AA3-A140-9614A72AA7BB}"/>
+              </a:ext>
+            </a:extLst>
+          </p:cNvPr>
+          <p:cNvSpPr/>
+          <p:nvPr/>
+        </p:nvSpPr>
+        <p:spPr>
+          <a:xfrm>
+            <a:off x="1676400" y="111760"/>
+            <a:ext cx="2743200" cy="447040"/>
+          </a:xfrm>
+          <a:prstGeom prst="roundRect">
+            <a:avLst/>
+          </a:prstGeom>
+          <a:solidFill>
+            <a:schemeClr val="bg1"/>
+          </a:solidFill>
+        </p:spPr>
+        <p:style>
+          <a:lnRef idx="2">
+            <a:schemeClr val="accent1">
+              <a:shade val="15000"/>
+            </a:schemeClr>
+          </a:lnRef>
+          <a:fillRef idx="1">
+            <a:schemeClr val="accent1"/>
+          </a:fillRef>
+          <a:effectRef idx="0">
+            <a:schemeClr val="accent1"/>
+          </a:effectRef>
+          <a:fontRef idx="minor">
+            <a:schemeClr val="lt1"/>
+          </a:fontRef>
+        </p:style>
+        <p:txBody>
+          <a:bodyPr rtlCol="0" anchor="ctr"/>
+          <a:lstStyle/>
+          <a:p>
+            <a:pPr algn="ctr"/>
+            <a:endParaRPr lang="en-CA"/>
+          </a:p>
+        </p:txBody>
+      </p:sp>
+      <p:sp>
+        <p:nvSpPr>
+          <p:cNvPr id="6" name="TextBox 5">
+            <a:extLst>
+              <a:ext uri="{FF2B5EF4-FFF2-40B4-BE49-F238E27FC236}">
+                <a16:creationId xmlns:a16="http://schemas.microsoft.com/office/drawing/2014/main" id="{19E608DF-3BE5-4DEB-A5B4-7B9EDC0D8091}"/>
+              </a:ext>
+            </a:extLst>
+          </p:cNvPr>
+          <p:cNvSpPr txBox="1"/>
+          <p:nvPr/>
+        </p:nvSpPr>
+        <p:spPr>
+          <a:xfrm>
+            <a:off x="2527300" y="96753"/>
+            <a:ext cx="1231900" cy="477054"/>
+          </a:xfrm>
+          <a:prstGeom prst="rect">
+            <a:avLst/>
+          </a:prstGeom>
+          <a:noFill/>
+        </p:spPr>
+        <p:txBody>
+          <a:bodyPr wrap="square" rtlCol="0">
+            <a:spAutoFit/>
+          </a:bodyPr>
+          <a:lstStyle/>
+          <a:p>
+            <a:r>
+              <a:rPr lang="en-CA" sz="2500" b="1" dirty="0">
+                <a:solidFill>
+                  <a:schemeClr val="accent1"/>
+                </a:solidFill>
+              </a:rPr>
+              <a:t>GOALS</a:t>
+            </a:r>
+          </a:p>
+        </p:txBody>
+      </p:sp>
+      <p:sp>
+        <p:nvSpPr>
+          <p:cNvPr id="7" name="Rectangle: Rounded Corners 6">
+            <a:extLst>
+              <a:ext uri="{FF2B5EF4-FFF2-40B4-BE49-F238E27FC236}">
+                <a16:creationId xmlns:a16="http://schemas.microsoft.com/office/drawing/2014/main" id="{AAF0C8A7-951B-496D-9B43-7AC25ACF5568}"/>
+              </a:ext>
+            </a:extLst>
+          </p:cNvPr>
+          <p:cNvSpPr/>
+          <p:nvPr/>
+        </p:nvSpPr>
+        <p:spPr>
+          <a:xfrm>
+            <a:off x="7772402" y="96753"/>
+            <a:ext cx="2743200" cy="447040"/>
+          </a:xfrm>
+          <a:prstGeom prst="roundRect">
+            <a:avLst/>
+          </a:prstGeom>
+        </p:spPr>
+        <p:style>
+          <a:lnRef idx="2">
+            <a:schemeClr val="accent1">
+              <a:shade val="15000"/>
+            </a:schemeClr>
+          </a:lnRef>
+          <a:fillRef idx="1">
+            <a:schemeClr val="accent1"/>
+          </a:fillRef>
+          <a:effectRef idx="0">
+            <a:schemeClr val="accent1"/>
+          </a:effectRef>
+          <a:fontRef idx="minor">
+            <a:schemeClr val="lt1"/>
+          </a:fontRef>
+        </p:style>
+        <p:txBody>
+          <a:bodyPr rtlCol="0" anchor="ctr"/>
+          <a:lstStyle/>
+          <a:p>
+            <a:pPr algn="ctr"/>
+            <a:endParaRPr lang="en-CA"/>
+          </a:p>
+        </p:txBody>
+      </p:sp>
+      <p:sp>
+        <p:nvSpPr>
+          <p:cNvPr id="8" name="TextBox 7">
+            <a:extLst>
+              <a:ext uri="{FF2B5EF4-FFF2-40B4-BE49-F238E27FC236}">
+                <a16:creationId xmlns:a16="http://schemas.microsoft.com/office/drawing/2014/main" id="{DDF9D670-3EB3-4D03-BEAC-7E433E2704C6}"/>
+              </a:ext>
+            </a:extLst>
+          </p:cNvPr>
+          <p:cNvSpPr txBox="1"/>
+          <p:nvPr/>
+        </p:nvSpPr>
+        <p:spPr>
+          <a:xfrm>
+            <a:off x="7945120" y="81746"/>
+            <a:ext cx="2570480" cy="477054"/>
+          </a:xfrm>
+          <a:prstGeom prst="rect">
+            <a:avLst/>
+          </a:prstGeom>
+          <a:noFill/>
+        </p:spPr>
+        <p:txBody>
+          <a:bodyPr wrap="square" rtlCol="0">
+            <a:spAutoFit/>
+          </a:bodyPr>
+          <a:lstStyle/>
+          <a:p>
+            <a:r>
+              <a:rPr lang="en-CA" sz="2500" b="1" dirty="0">
+                <a:solidFill>
+                  <a:schemeClr val="bg1"/>
+                </a:solidFill>
+              </a:rPr>
+              <a:t>WEEKLY TRACKER</a:t>
+            </a:r>
+          </a:p>
+        </p:txBody>
+      </p:sp>
+      <p:sp>
+        <p:nvSpPr>
+          <p:cNvPr id="9" name="Rectangle: Rounded Corners 8">
+            <a:extLst>
+              <a:ext uri="{FF2B5EF4-FFF2-40B4-BE49-F238E27FC236}">
+                <a16:creationId xmlns:a16="http://schemas.microsoft.com/office/drawing/2014/main" id="{18CEF76F-8EF9-4238-8444-63CD2D8D327B}"/>
+              </a:ext>
+            </a:extLst>
+          </p:cNvPr>
+          <p:cNvSpPr/>
+          <p:nvPr/>
+        </p:nvSpPr>
+        <p:spPr>
+          <a:xfrm>
+            <a:off x="436485" y="994298"/>
+            <a:ext cx="11319030" cy="505977"/>
+          </a:xfrm>
+          <a:prstGeom prst="roundRect">
+            <a:avLst/>
+          </a:prstGeom>
+        </p:spPr>
+        <p:style>
+          <a:lnRef idx="2">
+            <a:schemeClr val="accent1">
+              <a:shade val="50000"/>
+            </a:schemeClr>
+          </a:lnRef>
+          <a:fillRef idx="1">
+            <a:schemeClr val="accent1"/>
+          </a:fillRef>
+          <a:effectRef idx="0">
+            <a:schemeClr val="accent1"/>
+          </a:effectRef>
+          <a:fontRef idx="minor">
+            <a:schemeClr val="lt1"/>
+          </a:fontRef>
+        </p:style>
+        <p:txBody>
+          <a:bodyPr rtlCol="0" anchor="ctr"/>
+          <a:lstStyle/>
+          <a:p>
+            <a:pPr algn="ctr"/>
+            <a:endParaRPr lang="en-US"/>
+          </a:p>
+        </p:txBody>
+      </p:sp>
+      <p:grpSp>
+        <p:nvGrpSpPr>
+          <p:cNvPr id="19" name="Group 18">
+            <a:extLst>
+              <a:ext uri="{FF2B5EF4-FFF2-40B4-BE49-F238E27FC236}">
+                <a16:creationId xmlns:a16="http://schemas.microsoft.com/office/drawing/2014/main" id="{12A90684-D58A-4164-A325-62D30942F748}"/>
+              </a:ext>
+            </a:extLst>
+          </p:cNvPr>
+          <p:cNvGrpSpPr/>
+          <p:nvPr/>
+        </p:nvGrpSpPr>
+        <p:grpSpPr>
+          <a:xfrm>
+            <a:off x="932156" y="1060852"/>
+            <a:ext cx="381739" cy="412789"/>
+            <a:chOff x="541537" y="1060852"/>
+            <a:chExt cx="381739" cy="412789"/>
+          </a:xfrm>
+        </p:grpSpPr>
+        <p:sp>
+          <p:nvSpPr>
+            <p:cNvPr id="16" name="Oval 15">
+              <a:extLst>
+                <a:ext uri="{FF2B5EF4-FFF2-40B4-BE49-F238E27FC236}">
+                  <a16:creationId xmlns:a16="http://schemas.microsoft.com/office/drawing/2014/main" id="{7FB56AD6-4083-4BBC-9F46-32FD71CDE003}"/>
+                </a:ext>
+              </a:extLst>
+            </p:cNvPr>
+            <p:cNvSpPr/>
+            <p:nvPr/>
+          </p:nvSpPr>
+          <p:spPr>
+            <a:xfrm>
+              <a:off x="541537" y="1060852"/>
+              <a:ext cx="381739" cy="386155"/>
+            </a:xfrm>
+            <a:prstGeom prst="ellipse">
+              <a:avLst/>
+            </a:prstGeom>
+            <a:solidFill>
+              <a:schemeClr val="bg1"/>
+            </a:solidFill>
+          </p:spPr>
+          <p:style>
+            <a:lnRef idx="2">
+              <a:schemeClr val="accent1">
+                <a:shade val="50000"/>
+              </a:schemeClr>
+            </a:lnRef>
+            <a:fillRef idx="1">
+              <a:schemeClr val="accent1"/>
+            </a:fillRef>
+            <a:effectRef idx="0">
+              <a:schemeClr val="accent1"/>
+            </a:effectRef>
+            <a:fontRef idx="minor">
+              <a:schemeClr val="lt1"/>
+            </a:fontRef>
+          </p:style>
+          <p:txBody>
+            <a:bodyPr rtlCol="0" anchor="ctr"/>
+            <a:lstStyle/>
+            <a:p>
+              <a:pPr algn="ctr"/>
+              <a:endParaRPr lang="en-US"/>
+            </a:p>
+          </p:txBody>
+        </p:sp>
+        <p:pic>
+          <p:nvPicPr>
+            <p:cNvPr id="18" name="Graphic 17" descr="Checkmark with solid fill">
+              <a:extLst>
+                <a:ext uri="{FF2B5EF4-FFF2-40B4-BE49-F238E27FC236}">
+                  <a16:creationId xmlns:a16="http://schemas.microsoft.com/office/drawing/2014/main" id="{DCF27D6B-EAF0-44B3-B65C-DA5879F39785}"/>
+                </a:ext>
+              </a:extLst>
+            </p:cNvPr>
+            <p:cNvPicPr>
+              <a:picLocks noChangeAspect="1"/>
+            </p:cNvPicPr>
+            <p:nvPr/>
+          </p:nvPicPr>
+          <p:blipFill>
+            <a:blip r:embed="rId2">
+              <a:extLst>
+                <a:ext uri="{28A0092B-C50C-407E-A947-70E740481C1C}">
+                  <a14:useLocalDpi xmlns:a14="http://schemas.microsoft.com/office/drawing/2010/main" val="0"/>
+                </a:ext>
+                <a:ext uri="{96DAC541-7B7A-43D3-8B79-37D633B846F1}">
+                  <asvg:svgBlip xmlns:asvg="http://schemas.microsoft.com/office/drawing/2016/SVG/main" r:embed="rId3"/>
+                </a:ext>
+              </a:extLst>
+            </a:blip>
+            <a:stretch>
+              <a:fillRect/>
+            </a:stretch>
+          </p:blipFill>
+          <p:spPr>
+            <a:xfrm>
+              <a:off x="541537" y="1098559"/>
+              <a:ext cx="375082" cy="375082"/>
+            </a:xfrm>
+            <a:prstGeom prst="rect">
+              <a:avLst/>
+            </a:prstGeom>
+          </p:spPr>
+        </p:pic>
+      </p:grpSp>
+      <p:sp>
+        <p:nvSpPr>
+          <p:cNvPr id="20" name="Isosceles Triangle 19">
+            <a:extLst>
+              <a:ext uri="{FF2B5EF4-FFF2-40B4-BE49-F238E27FC236}">
+                <a16:creationId xmlns:a16="http://schemas.microsoft.com/office/drawing/2014/main" id="{6B851890-A3EF-4DA5-A7EE-9FBC4EC89587}"/>
+              </a:ext>
+            </a:extLst>
+          </p:cNvPr>
+          <p:cNvSpPr/>
+          <p:nvPr/>
+        </p:nvSpPr>
+        <p:spPr>
+          <a:xfrm rot="5400000">
+            <a:off x="595544" y="1137383"/>
+            <a:ext cx="177553" cy="233091"/>
+          </a:xfrm>
+          <a:prstGeom prst="triangle">
+            <a:avLst/>
+          </a:prstGeom>
+          <a:solidFill>
+            <a:schemeClr val="bg1"/>
+          </a:solidFill>
+        </p:spPr>
+        <p:style>
+          <a:lnRef idx="2">
+            <a:schemeClr val="accent1">
+              <a:shade val="50000"/>
+            </a:schemeClr>
+          </a:lnRef>
+          <a:fillRef idx="1">
+            <a:schemeClr val="accent1"/>
+          </a:fillRef>
+          <a:effectRef idx="0">
+            <a:schemeClr val="accent1"/>
+          </a:effectRef>
+          <a:fontRef idx="minor">
+            <a:schemeClr val="lt1"/>
+          </a:fontRef>
+        </p:style>
+        <p:txBody>
+          <a:bodyPr rtlCol="0" anchor="ctr"/>
+          <a:lstStyle/>
+          <a:p>
+            <a:pPr algn="ctr"/>
+            <a:endParaRPr lang="en-US"/>
+          </a:p>
+        </p:txBody>
+      </p:sp>
+      <p:sp>
+        <p:nvSpPr>
+          <p:cNvPr id="21" name="TextBox 20">
+            <a:extLst>
+              <a:ext uri="{FF2B5EF4-FFF2-40B4-BE49-F238E27FC236}">
+                <a16:creationId xmlns:a16="http://schemas.microsoft.com/office/drawing/2014/main" id="{0D0B4399-01A4-4288-98CD-20881D9ADCBA}"/>
+              </a:ext>
+            </a:extLst>
+          </p:cNvPr>
+          <p:cNvSpPr txBox="1"/>
+          <p:nvPr/>
+        </p:nvSpPr>
+        <p:spPr>
+          <a:xfrm>
+            <a:off x="1507381" y="1046897"/>
+            <a:ext cx="3009530" cy="400110"/>
+          </a:xfrm>
+          <a:prstGeom prst="rect">
+            <a:avLst/>
+          </a:prstGeom>
+          <a:noFill/>
+        </p:spPr>
+        <p:txBody>
+          <a:bodyPr wrap="square" rtlCol="0">
+            <a:spAutoFit/>
+          </a:bodyPr>
+          <a:lstStyle/>
+          <a:p>
+            <a:r>
+              <a:rPr lang="en-US" sz="2000" b="1" dirty="0">
+                <a:solidFill>
+                  <a:schemeClr val="bg2"/>
+                </a:solidFill>
+              </a:rPr>
+              <a:t>2022</a:t>
+            </a:r>
+          </a:p>
+        </p:txBody>
+      </p:sp>
+      <p:sp>
+        <p:nvSpPr>
+          <p:cNvPr id="22" name="Rectangle: Rounded Corners 21">
+            <a:extLst>
+              <a:ext uri="{FF2B5EF4-FFF2-40B4-BE49-F238E27FC236}">
+                <a16:creationId xmlns:a16="http://schemas.microsoft.com/office/drawing/2014/main" id="{DAD52E65-7E6F-4591-818D-19496BAEABA2}"/>
+              </a:ext>
+            </a:extLst>
+          </p:cNvPr>
+          <p:cNvSpPr/>
+          <p:nvPr/>
+        </p:nvSpPr>
+        <p:spPr>
+          <a:xfrm>
+            <a:off x="436485" y="1671129"/>
+            <a:ext cx="11319030" cy="4259154"/>
+          </a:xfrm>
+          <a:prstGeom prst="roundRect">
+            <a:avLst>
+              <a:gd name="adj" fmla="val 3744"/>
+            </a:avLst>
+          </a:prstGeom>
+          <a:solidFill>
+            <a:schemeClr val="bg1"/>
+          </a:solidFill>
+          <a:ln>
+            <a:solidFill>
+              <a:schemeClr val="accent1"/>
+            </a:solidFill>
+          </a:ln>
+        </p:spPr>
+        <p:style>
+          <a:lnRef idx="2">
+            <a:schemeClr val="accent1">
+              <a:shade val="50000"/>
+            </a:schemeClr>
+          </a:lnRef>
+          <a:fillRef idx="1">
+            <a:schemeClr val="accent1"/>
+          </a:fillRef>
+          <a:effectRef idx="0">
+            <a:schemeClr val="accent1"/>
+          </a:effectRef>
+          <a:fontRef idx="minor">
+            <a:schemeClr val="lt1"/>
+          </a:fontRef>
+        </p:style>
+        <p:txBody>
+          <a:bodyPr rtlCol="0" anchor="ctr"/>
+          <a:lstStyle/>
+          <a:p>
+            <a:pPr algn="ctr"/>
+            <a:endParaRPr lang="en-US"/>
+          </a:p>
+        </p:txBody>
+      </p:sp>
+      <p:sp>
+        <p:nvSpPr>
+          <p:cNvPr id="24" name="Oval 23">
+            <a:extLst>
+              <a:ext uri="{FF2B5EF4-FFF2-40B4-BE49-F238E27FC236}">
+                <a16:creationId xmlns:a16="http://schemas.microsoft.com/office/drawing/2014/main" id="{DF35195E-37E6-4E07-ACC2-22223EC5A9D5}"/>
+              </a:ext>
+            </a:extLst>
+          </p:cNvPr>
+          <p:cNvSpPr/>
+          <p:nvPr/>
+        </p:nvSpPr>
+        <p:spPr>
+          <a:xfrm>
+            <a:off x="904387" y="1827807"/>
+            <a:ext cx="381739" cy="386155"/>
+          </a:xfrm>
+          <a:prstGeom prst="ellipse">
+            <a:avLst/>
+          </a:prstGeom>
+          <a:solidFill>
+            <a:schemeClr val="bg1"/>
+          </a:solidFill>
+        </p:spPr>
+        <p:style>
+          <a:lnRef idx="2">
+            <a:schemeClr val="accent1">
+              <a:shade val="50000"/>
+            </a:schemeClr>
+          </a:lnRef>
+          <a:fillRef idx="1">
+            <a:schemeClr val="accent1"/>
+          </a:fillRef>
+          <a:effectRef idx="0">
+            <a:schemeClr val="accent1"/>
+          </a:effectRef>
+          <a:fontRef idx="minor">
+            <a:schemeClr val="lt1"/>
+          </a:fontRef>
+        </p:style>
+        <p:txBody>
+          <a:bodyPr rtlCol="0" anchor="ctr"/>
+          <a:lstStyle/>
+          <a:p>
+            <a:pPr algn="ctr"/>
+            <a:endParaRPr lang="en-US"/>
+          </a:p>
+        </p:txBody>
+      </p:sp>
+      <p:sp>
+        <p:nvSpPr>
+          <p:cNvPr id="26" name="Isosceles Triangle 25">
+            <a:extLst>
+              <a:ext uri="{FF2B5EF4-FFF2-40B4-BE49-F238E27FC236}">
+                <a16:creationId xmlns:a16="http://schemas.microsoft.com/office/drawing/2014/main" id="{D684A50A-8F10-4FA1-A4A5-63A94D1AFE96}"/>
+              </a:ext>
+            </a:extLst>
+          </p:cNvPr>
+          <p:cNvSpPr/>
+          <p:nvPr/>
+        </p:nvSpPr>
+        <p:spPr>
+          <a:xfrm rot="10800000">
+            <a:off x="567775" y="1904338"/>
+            <a:ext cx="177553" cy="233091"/>
+          </a:xfrm>
+          <a:prstGeom prst="triangle">
+            <a:avLst/>
+          </a:prstGeom>
+          <a:solidFill>
+            <a:schemeClr val="accent1"/>
+          </a:solidFill>
+        </p:spPr>
+        <p:style>
+          <a:lnRef idx="2">
+            <a:schemeClr val="accent1">
+              <a:shade val="50000"/>
+            </a:schemeClr>
+          </a:lnRef>
+          <a:fillRef idx="1">
+            <a:schemeClr val="accent1"/>
+          </a:fillRef>
+          <a:effectRef idx="0">
+            <a:schemeClr val="accent1"/>
+          </a:effectRef>
+          <a:fontRef idx="minor">
+            <a:schemeClr val="lt1"/>
+          </a:fontRef>
+        </p:style>
+        <p:txBody>
+          <a:bodyPr rtlCol="0" anchor="ctr"/>
+          <a:lstStyle/>
+          <a:p>
+            <a:pPr algn="ctr"/>
+            <a:endParaRPr lang="en-US"/>
+          </a:p>
+        </p:txBody>
+      </p:sp>
+      <p:sp>
+        <p:nvSpPr>
+          <p:cNvPr id="27" name="TextBox 26">
+            <a:extLst>
+              <a:ext uri="{FF2B5EF4-FFF2-40B4-BE49-F238E27FC236}">
+                <a16:creationId xmlns:a16="http://schemas.microsoft.com/office/drawing/2014/main" id="{6A0D9577-3082-4767-B182-97A8080F0CFC}"/>
+              </a:ext>
+            </a:extLst>
+          </p:cNvPr>
+          <p:cNvSpPr txBox="1"/>
+          <p:nvPr/>
+        </p:nvSpPr>
+        <p:spPr>
+          <a:xfrm>
+            <a:off x="1479612" y="1813852"/>
+            <a:ext cx="3009530" cy="400110"/>
+          </a:xfrm>
+          <a:prstGeom prst="rect">
+            <a:avLst/>
+          </a:prstGeom>
+          <a:noFill/>
+        </p:spPr>
+        <p:txBody>
+          <a:bodyPr wrap="square" rtlCol="0">
+            <a:spAutoFit/>
+          </a:bodyPr>
+          <a:lstStyle/>
+          <a:p>
+            <a:r>
+              <a:rPr lang="en-US" sz="2000" b="1" dirty="0">
+                <a:solidFill>
+                  <a:schemeClr val="accent1"/>
+                </a:solidFill>
+              </a:rPr>
+              <a:t>2023</a:t>
+            </a:r>
+          </a:p>
+        </p:txBody>
+      </p:sp>
+      <p:sp>
+        <p:nvSpPr>
+          <p:cNvPr id="28" name="Rectangle: Rounded Corners 27">
+            <a:extLst>
+              <a:ext uri="{FF2B5EF4-FFF2-40B4-BE49-F238E27FC236}">
+                <a16:creationId xmlns:a16="http://schemas.microsoft.com/office/drawing/2014/main" id="{D36CC131-C194-48D0-9A19-43724FE004CF}"/>
+              </a:ext>
+            </a:extLst>
+          </p:cNvPr>
+          <p:cNvSpPr/>
+          <p:nvPr/>
+        </p:nvSpPr>
+        <p:spPr>
+          <a:xfrm>
+            <a:off x="567775" y="2324159"/>
+            <a:ext cx="11035340" cy="386155"/>
+          </a:xfrm>
+          <a:prstGeom prst="roundRect">
+            <a:avLst/>
+          </a:prstGeom>
+        </p:spPr>
+        <p:style>
+          <a:lnRef idx="2">
+            <a:schemeClr val="accent1">
+              <a:shade val="50000"/>
+            </a:schemeClr>
+          </a:lnRef>
+          <a:fillRef idx="1">
+            <a:schemeClr val="accent1"/>
+          </a:fillRef>
+          <a:effectRef idx="0">
+            <a:schemeClr val="accent1"/>
+          </a:effectRef>
+          <a:fontRef idx="minor">
+            <a:schemeClr val="lt1"/>
+          </a:fontRef>
+        </p:style>
+        <p:txBody>
+          <a:bodyPr rtlCol="0" anchor="ctr"/>
+          <a:lstStyle/>
+          <a:p>
+            <a:pPr algn="ctr"/>
+            <a:endParaRPr lang="en-US"/>
+          </a:p>
+        </p:txBody>
+      </p:sp>
+      <p:sp>
+        <p:nvSpPr>
+          <p:cNvPr id="29" name="Oval 28">
+            <a:extLst>
+              <a:ext uri="{FF2B5EF4-FFF2-40B4-BE49-F238E27FC236}">
+                <a16:creationId xmlns:a16="http://schemas.microsoft.com/office/drawing/2014/main" id="{65C043E7-EBCF-450B-99C0-35CF370B9FD3}"/>
+              </a:ext>
+            </a:extLst>
+          </p:cNvPr>
+          <p:cNvSpPr/>
+          <p:nvPr/>
+        </p:nvSpPr>
+        <p:spPr>
+          <a:xfrm>
+            <a:off x="965395" y="2384816"/>
+            <a:ext cx="258588" cy="269094"/>
+          </a:xfrm>
+          <a:prstGeom prst="ellipse">
+            <a:avLst/>
+          </a:prstGeom>
+          <a:solidFill>
+            <a:schemeClr val="bg1"/>
+          </a:solidFill>
+        </p:spPr>
+        <p:style>
+          <a:lnRef idx="2">
+            <a:schemeClr val="accent1">
+              <a:shade val="50000"/>
+            </a:schemeClr>
+          </a:lnRef>
+          <a:fillRef idx="1">
+            <a:schemeClr val="accent1"/>
+          </a:fillRef>
+          <a:effectRef idx="0">
+            <a:schemeClr val="accent1"/>
+          </a:effectRef>
+          <a:fontRef idx="minor">
+            <a:schemeClr val="lt1"/>
+          </a:fontRef>
+        </p:style>
+        <p:txBody>
+          <a:bodyPr rtlCol="0" anchor="ctr"/>
+          <a:lstStyle/>
+          <a:p>
+            <a:pPr algn="ctr"/>
+            <a:endParaRPr lang="en-US"/>
+          </a:p>
+        </p:txBody>
+      </p:sp>
+      <p:sp>
+        <p:nvSpPr>
+          <p:cNvPr id="31" name="Isosceles Triangle 30">
+            <a:extLst>
+              <a:ext uri="{FF2B5EF4-FFF2-40B4-BE49-F238E27FC236}">
+                <a16:creationId xmlns:a16="http://schemas.microsoft.com/office/drawing/2014/main" id="{22ADAC37-4A12-42F6-B3B7-5B6F8ADBBFCF}"/>
+              </a:ext>
+            </a:extLst>
+          </p:cNvPr>
+          <p:cNvSpPr/>
+          <p:nvPr/>
+        </p:nvSpPr>
+        <p:spPr>
+          <a:xfrm rot="5400000">
+            <a:off x="694428" y="2400690"/>
+            <a:ext cx="177553" cy="233091"/>
+          </a:xfrm>
+          <a:prstGeom prst="triangle">
+            <a:avLst/>
+          </a:prstGeom>
+          <a:solidFill>
+            <a:schemeClr val="bg1"/>
+          </a:solidFill>
+        </p:spPr>
+        <p:style>
+          <a:lnRef idx="2">
+            <a:schemeClr val="accent1">
+              <a:shade val="50000"/>
+            </a:schemeClr>
+          </a:lnRef>
+          <a:fillRef idx="1">
+            <a:schemeClr val="accent1"/>
+          </a:fillRef>
+          <a:effectRef idx="0">
+            <a:schemeClr val="accent1"/>
+          </a:effectRef>
+          <a:fontRef idx="minor">
+            <a:schemeClr val="lt1"/>
+          </a:fontRef>
+        </p:style>
+        <p:txBody>
+          <a:bodyPr rtlCol="0" anchor="ctr"/>
+          <a:lstStyle/>
+          <a:p>
+            <a:pPr algn="ctr"/>
+            <a:endParaRPr lang="en-US"/>
+          </a:p>
+        </p:txBody>
+      </p:sp>
+      <p:sp>
+        <p:nvSpPr>
+          <p:cNvPr id="32" name="TextBox 31">
+            <a:extLst>
+              <a:ext uri="{FF2B5EF4-FFF2-40B4-BE49-F238E27FC236}">
+                <a16:creationId xmlns:a16="http://schemas.microsoft.com/office/drawing/2014/main" id="{358A7C2D-675F-49C1-A439-980B9526F4DB}"/>
+              </a:ext>
+            </a:extLst>
+          </p:cNvPr>
+          <p:cNvSpPr txBox="1"/>
+          <p:nvPr/>
+        </p:nvSpPr>
+        <p:spPr>
+          <a:xfrm>
+            <a:off x="1355273" y="2332569"/>
+            <a:ext cx="3009530" cy="369332"/>
+          </a:xfrm>
+          <a:prstGeom prst="rect">
+            <a:avLst/>
+          </a:prstGeom>
+          <a:noFill/>
+        </p:spPr>
+        <p:txBody>
+          <a:bodyPr wrap="square" rtlCol="0">
+            <a:spAutoFit/>
+          </a:bodyPr>
+          <a:lstStyle/>
+          <a:p>
+            <a:r>
+              <a:rPr lang="en-US" b="1" dirty="0">
+                <a:solidFill>
+                  <a:schemeClr val="bg2"/>
+                </a:solidFill>
+              </a:rPr>
+              <a:t>January</a:t>
+            </a:r>
+          </a:p>
+        </p:txBody>
+      </p:sp>
+      <p:sp>
+        <p:nvSpPr>
+          <p:cNvPr id="33" name="Rectangle: Rounded Corners 32">
+            <a:extLst>
+              <a:ext uri="{FF2B5EF4-FFF2-40B4-BE49-F238E27FC236}">
+                <a16:creationId xmlns:a16="http://schemas.microsoft.com/office/drawing/2014/main" id="{A7C9B98E-8754-4B69-8D34-6F97F3C0A76E}"/>
+              </a:ext>
+            </a:extLst>
+          </p:cNvPr>
+          <p:cNvSpPr/>
+          <p:nvPr/>
+        </p:nvSpPr>
+        <p:spPr>
+          <a:xfrm>
+            <a:off x="567775" y="2770971"/>
+            <a:ext cx="11035340" cy="386155"/>
+          </a:xfrm>
+          <a:prstGeom prst="roundRect">
+            <a:avLst/>
+          </a:prstGeom>
+        </p:spPr>
+        <p:style>
+          <a:lnRef idx="2">
+            <a:schemeClr val="accent1">
+              <a:shade val="50000"/>
+            </a:schemeClr>
+          </a:lnRef>
+          <a:fillRef idx="1">
+            <a:schemeClr val="accent1"/>
+          </a:fillRef>
+          <a:effectRef idx="0">
+            <a:schemeClr val="accent1"/>
+          </a:effectRef>
+          <a:fontRef idx="minor">
+            <a:schemeClr val="lt1"/>
+          </a:fontRef>
+        </p:style>
+        <p:txBody>
+          <a:bodyPr rtlCol="0" anchor="ctr"/>
+          <a:lstStyle/>
+          <a:p>
+            <a:pPr algn="ctr"/>
+            <a:endParaRPr lang="en-US"/>
+          </a:p>
+        </p:txBody>
+      </p:sp>
+      <p:sp>
+        <p:nvSpPr>
+          <p:cNvPr id="34" name="Oval 33">
+            <a:extLst>
+              <a:ext uri="{FF2B5EF4-FFF2-40B4-BE49-F238E27FC236}">
+                <a16:creationId xmlns:a16="http://schemas.microsoft.com/office/drawing/2014/main" id="{21F2CE21-9D24-4F0D-AE88-AD7F57BC83A7}"/>
+              </a:ext>
+            </a:extLst>
+          </p:cNvPr>
+          <p:cNvSpPr/>
+          <p:nvPr/>
+        </p:nvSpPr>
+        <p:spPr>
+          <a:xfrm>
+            <a:off x="965395" y="2831628"/>
+            <a:ext cx="258588" cy="269094"/>
+          </a:xfrm>
+          <a:prstGeom prst="ellipse">
+            <a:avLst/>
+          </a:prstGeom>
+          <a:solidFill>
+            <a:schemeClr val="bg1"/>
+          </a:solidFill>
+        </p:spPr>
+        <p:style>
+          <a:lnRef idx="2">
+            <a:schemeClr val="accent1">
+              <a:shade val="50000"/>
+            </a:schemeClr>
+          </a:lnRef>
+          <a:fillRef idx="1">
+            <a:schemeClr val="accent1"/>
+          </a:fillRef>
+          <a:effectRef idx="0">
+            <a:schemeClr val="accent1"/>
+          </a:effectRef>
+          <a:fontRef idx="minor">
+            <a:schemeClr val="lt1"/>
+          </a:fontRef>
+        </p:style>
+        <p:txBody>
+          <a:bodyPr rtlCol="0" anchor="ctr"/>
+          <a:lstStyle/>
+          <a:p>
+            <a:pPr algn="ctr"/>
+            <a:endParaRPr lang="en-US"/>
+          </a:p>
+        </p:txBody>
+      </p:sp>
+      <p:sp>
+        <p:nvSpPr>
+          <p:cNvPr id="35" name="Isosceles Triangle 34">
+            <a:extLst>
+              <a:ext uri="{FF2B5EF4-FFF2-40B4-BE49-F238E27FC236}">
+                <a16:creationId xmlns:a16="http://schemas.microsoft.com/office/drawing/2014/main" id="{52A588B2-55EB-4969-B3CF-D0E0F4418337}"/>
+              </a:ext>
+            </a:extLst>
+          </p:cNvPr>
+          <p:cNvSpPr/>
+          <p:nvPr/>
+        </p:nvSpPr>
+        <p:spPr>
+          <a:xfrm rot="5400000">
+            <a:off x="694428" y="2847502"/>
+            <a:ext cx="177553" cy="233091"/>
+          </a:xfrm>
+          <a:prstGeom prst="triangle">
+            <a:avLst/>
+          </a:prstGeom>
+          <a:solidFill>
+            <a:schemeClr val="bg1"/>
+          </a:solidFill>
+        </p:spPr>
+        <p:style>
+          <a:lnRef idx="2">
+            <a:schemeClr val="accent1">
+              <a:shade val="50000"/>
+            </a:schemeClr>
+          </a:lnRef>
+          <a:fillRef idx="1">
+            <a:schemeClr val="accent1"/>
+          </a:fillRef>
+          <a:effectRef idx="0">
+            <a:schemeClr val="accent1"/>
+          </a:effectRef>
+          <a:fontRef idx="minor">
+            <a:schemeClr val="lt1"/>
+          </a:fontRef>
+        </p:style>
+        <p:txBody>
+          <a:bodyPr rtlCol="0" anchor="ctr"/>
+          <a:lstStyle/>
+          <a:p>
+            <a:pPr algn="ctr"/>
+            <a:endParaRPr lang="en-US"/>
+          </a:p>
+        </p:txBody>
+      </p:sp>
+      <p:sp>
+        <p:nvSpPr>
+          <p:cNvPr id="36" name="TextBox 35">
+            <a:extLst>
+              <a:ext uri="{FF2B5EF4-FFF2-40B4-BE49-F238E27FC236}">
+                <a16:creationId xmlns:a16="http://schemas.microsoft.com/office/drawing/2014/main" id="{AB62B20E-4EFA-4592-B9B0-5E09493C9860}"/>
+              </a:ext>
+            </a:extLst>
+          </p:cNvPr>
+          <p:cNvSpPr txBox="1"/>
+          <p:nvPr/>
+        </p:nvSpPr>
+        <p:spPr>
+          <a:xfrm>
+            <a:off x="1355273" y="2779381"/>
+            <a:ext cx="3009530" cy="369332"/>
+          </a:xfrm>
+          <a:prstGeom prst="rect">
+            <a:avLst/>
+          </a:prstGeom>
+          <a:noFill/>
+        </p:spPr>
+        <p:txBody>
+          <a:bodyPr wrap="square" rtlCol="0">
+            <a:spAutoFit/>
+          </a:bodyPr>
+          <a:lstStyle/>
+          <a:p>
+            <a:r>
+              <a:rPr lang="en-US" b="1" dirty="0">
+                <a:solidFill>
+                  <a:schemeClr val="bg2"/>
+                </a:solidFill>
+              </a:rPr>
+              <a:t>February</a:t>
+            </a:r>
+          </a:p>
+        </p:txBody>
+      </p:sp>
+      <p:sp>
+        <p:nvSpPr>
+          <p:cNvPr id="37" name="Rectangle: Rounded Corners 36">
+            <a:extLst>
+              <a:ext uri="{FF2B5EF4-FFF2-40B4-BE49-F238E27FC236}">
+                <a16:creationId xmlns:a16="http://schemas.microsoft.com/office/drawing/2014/main" id="{DCE56992-52F5-45DD-97A4-A88EB3C5CA3F}"/>
+              </a:ext>
+            </a:extLst>
+          </p:cNvPr>
+          <p:cNvSpPr/>
+          <p:nvPr/>
+        </p:nvSpPr>
+        <p:spPr>
+          <a:xfrm>
+            <a:off x="567775" y="3217783"/>
+            <a:ext cx="11035340" cy="386155"/>
+          </a:xfrm>
+          <a:prstGeom prst="roundRect">
+            <a:avLst/>
+          </a:prstGeom>
+        </p:spPr>
+        <p:style>
+          <a:lnRef idx="2">
+            <a:schemeClr val="accent1">
+              <a:shade val="50000"/>
+            </a:schemeClr>
+          </a:lnRef>
+          <a:fillRef idx="1">
+            <a:schemeClr val="accent1"/>
+          </a:fillRef>
+          <a:effectRef idx="0">
+            <a:schemeClr val="accent1"/>
+          </a:effectRef>
+          <a:fontRef idx="minor">
+            <a:schemeClr val="lt1"/>
+          </a:fontRef>
+        </p:style>
+        <p:txBody>
+          <a:bodyPr rtlCol="0" anchor="ctr"/>
+          <a:lstStyle/>
+          <a:p>
+            <a:pPr algn="ctr"/>
+            <a:endParaRPr lang="en-US"/>
+          </a:p>
+        </p:txBody>
+      </p:sp>
+      <p:sp>
+        <p:nvSpPr>
+          <p:cNvPr id="38" name="Oval 37">
+            <a:extLst>
+              <a:ext uri="{FF2B5EF4-FFF2-40B4-BE49-F238E27FC236}">
+                <a16:creationId xmlns:a16="http://schemas.microsoft.com/office/drawing/2014/main" id="{EFA28951-A26F-4BD7-8AA6-4422A803F95E}"/>
+              </a:ext>
+            </a:extLst>
+          </p:cNvPr>
+          <p:cNvSpPr/>
+          <p:nvPr/>
+        </p:nvSpPr>
+        <p:spPr>
+          <a:xfrm>
+            <a:off x="965395" y="3278440"/>
+            <a:ext cx="258588" cy="269094"/>
+          </a:xfrm>
+          <a:prstGeom prst="ellipse">
+            <a:avLst/>
+          </a:prstGeom>
+          <a:solidFill>
+            <a:schemeClr val="bg1"/>
+          </a:solidFill>
+        </p:spPr>
+        <p:style>
+          <a:lnRef idx="2">
+            <a:schemeClr val="accent1">
+              <a:shade val="50000"/>
+            </a:schemeClr>
+          </a:lnRef>
+          <a:fillRef idx="1">
+            <a:schemeClr val="accent1"/>
+          </a:fillRef>
+          <a:effectRef idx="0">
+            <a:schemeClr val="accent1"/>
+          </a:effectRef>
+          <a:fontRef idx="minor">
+            <a:schemeClr val="lt1"/>
+          </a:fontRef>
+        </p:style>
+        <p:txBody>
+          <a:bodyPr rtlCol="0" anchor="ctr"/>
+          <a:lstStyle/>
+          <a:p>
+            <a:pPr algn="ctr"/>
+            <a:endParaRPr lang="en-US"/>
+          </a:p>
+        </p:txBody>
+      </p:sp>
+      <p:sp>
+        <p:nvSpPr>
+          <p:cNvPr id="39" name="Isosceles Triangle 38">
+            <a:extLst>
+              <a:ext uri="{FF2B5EF4-FFF2-40B4-BE49-F238E27FC236}">
+                <a16:creationId xmlns:a16="http://schemas.microsoft.com/office/drawing/2014/main" id="{875F3928-E397-447D-94C4-0C4AD2BD0157}"/>
+              </a:ext>
+            </a:extLst>
+          </p:cNvPr>
+          <p:cNvSpPr/>
+          <p:nvPr/>
+        </p:nvSpPr>
+        <p:spPr>
+          <a:xfrm rot="5400000">
+            <a:off x="694428" y="3294314"/>
+            <a:ext cx="177553" cy="233091"/>
+          </a:xfrm>
+          <a:prstGeom prst="triangle">
+            <a:avLst/>
+          </a:prstGeom>
+          <a:solidFill>
+            <a:schemeClr val="bg1"/>
+          </a:solidFill>
+        </p:spPr>
+        <p:style>
+          <a:lnRef idx="2">
+            <a:schemeClr val="accent1">
+              <a:shade val="50000"/>
+            </a:schemeClr>
+          </a:lnRef>
+          <a:fillRef idx="1">
+            <a:schemeClr val="accent1"/>
+          </a:fillRef>
+          <a:effectRef idx="0">
+            <a:schemeClr val="accent1"/>
+          </a:effectRef>
+          <a:fontRef idx="minor">
+            <a:schemeClr val="lt1"/>
+          </a:fontRef>
+        </p:style>
+        <p:txBody>
+          <a:bodyPr rtlCol="0" anchor="ctr"/>
+          <a:lstStyle/>
+          <a:p>
+            <a:pPr algn="ctr"/>
+            <a:endParaRPr lang="en-US"/>
+          </a:p>
+        </p:txBody>
+      </p:sp>
+      <p:sp>
+        <p:nvSpPr>
+          <p:cNvPr id="40" name="TextBox 39">
+            <a:extLst>
+              <a:ext uri="{FF2B5EF4-FFF2-40B4-BE49-F238E27FC236}">
+                <a16:creationId xmlns:a16="http://schemas.microsoft.com/office/drawing/2014/main" id="{8AB52E70-43BC-49EB-B1D9-5C28E39CF36C}"/>
+              </a:ext>
+            </a:extLst>
+          </p:cNvPr>
+          <p:cNvSpPr txBox="1"/>
+          <p:nvPr/>
+        </p:nvSpPr>
+        <p:spPr>
+          <a:xfrm>
+            <a:off x="1355273" y="3226193"/>
+            <a:ext cx="3009530" cy="369332"/>
+          </a:xfrm>
+          <a:prstGeom prst="rect">
+            <a:avLst/>
+          </a:prstGeom>
+          <a:noFill/>
+        </p:spPr>
+        <p:txBody>
+          <a:bodyPr wrap="square" rtlCol="0">
+            <a:spAutoFit/>
+          </a:bodyPr>
+          <a:lstStyle/>
+          <a:p>
+            <a:r>
+              <a:rPr lang="en-US" b="1" dirty="0">
+                <a:solidFill>
+                  <a:schemeClr val="bg2"/>
+                </a:solidFill>
+              </a:rPr>
+              <a:t>March</a:t>
+            </a:r>
+          </a:p>
+        </p:txBody>
+      </p:sp>
+      <p:sp>
+        <p:nvSpPr>
+          <p:cNvPr id="41" name="Rectangle: Rounded Corners 40">
+            <a:extLst>
+              <a:ext uri="{FF2B5EF4-FFF2-40B4-BE49-F238E27FC236}">
+                <a16:creationId xmlns:a16="http://schemas.microsoft.com/office/drawing/2014/main" id="{6005C049-B47E-4A60-83F4-3D1B2389220C}"/>
+              </a:ext>
+            </a:extLst>
+          </p:cNvPr>
+          <p:cNvSpPr/>
+          <p:nvPr/>
+        </p:nvSpPr>
+        <p:spPr>
+          <a:xfrm>
+            <a:off x="567775" y="3651834"/>
+            <a:ext cx="11035340" cy="386155"/>
+          </a:xfrm>
+          <a:prstGeom prst="roundRect">
+            <a:avLst/>
+          </a:prstGeom>
+        </p:spPr>
+        <p:style>
+          <a:lnRef idx="2">
+            <a:schemeClr val="accent1">
+              <a:shade val="50000"/>
+            </a:schemeClr>
+          </a:lnRef>
+          <a:fillRef idx="1">
+            <a:schemeClr val="accent1"/>
+          </a:fillRef>
+          <a:effectRef idx="0">
+            <a:schemeClr val="accent1"/>
+          </a:effectRef>
+          <a:fontRef idx="minor">
+            <a:schemeClr val="lt1"/>
+          </a:fontRef>
+        </p:style>
+        <p:txBody>
+          <a:bodyPr rtlCol="0" anchor="ctr"/>
+          <a:lstStyle/>
+          <a:p>
+            <a:pPr algn="ctr"/>
+            <a:endParaRPr lang="en-US"/>
+          </a:p>
+        </p:txBody>
+      </p:sp>
+      <p:sp>
+        <p:nvSpPr>
+          <p:cNvPr id="42" name="Oval 41">
+            <a:extLst>
+              <a:ext uri="{FF2B5EF4-FFF2-40B4-BE49-F238E27FC236}">
+                <a16:creationId xmlns:a16="http://schemas.microsoft.com/office/drawing/2014/main" id="{BAEC910C-6698-45FF-8733-5CAC74BCE0E7}"/>
+              </a:ext>
+            </a:extLst>
+          </p:cNvPr>
+          <p:cNvSpPr/>
+          <p:nvPr/>
+        </p:nvSpPr>
+        <p:spPr>
+          <a:xfrm>
+            <a:off x="965395" y="3712491"/>
+            <a:ext cx="258588" cy="269094"/>
+          </a:xfrm>
+          <a:prstGeom prst="ellipse">
+            <a:avLst/>
+          </a:prstGeom>
+          <a:solidFill>
+            <a:schemeClr val="bg1"/>
+          </a:solidFill>
+        </p:spPr>
+        <p:style>
+          <a:lnRef idx="2">
+            <a:schemeClr val="accent1">
+              <a:shade val="50000"/>
+            </a:schemeClr>
+          </a:lnRef>
+          <a:fillRef idx="1">
+            <a:schemeClr val="accent1"/>
+          </a:fillRef>
+          <a:effectRef idx="0">
+            <a:schemeClr val="accent1"/>
+          </a:effectRef>
+          <a:fontRef idx="minor">
+            <a:schemeClr val="lt1"/>
+          </a:fontRef>
+        </p:style>
+        <p:txBody>
+          <a:bodyPr rtlCol="0" anchor="ctr"/>
+          <a:lstStyle/>
+          <a:p>
+            <a:pPr algn="ctr"/>
+            <a:endParaRPr lang="en-US"/>
+          </a:p>
+        </p:txBody>
+      </p:sp>
+      <p:sp>
+        <p:nvSpPr>
+          <p:cNvPr id="43" name="Isosceles Triangle 42">
+            <a:extLst>
+              <a:ext uri="{FF2B5EF4-FFF2-40B4-BE49-F238E27FC236}">
+                <a16:creationId xmlns:a16="http://schemas.microsoft.com/office/drawing/2014/main" id="{D5C5579D-EF3C-436F-B94F-3FEA07732F0D}"/>
+              </a:ext>
+            </a:extLst>
+          </p:cNvPr>
+          <p:cNvSpPr/>
+          <p:nvPr/>
+        </p:nvSpPr>
+        <p:spPr>
+          <a:xfrm rot="5400000">
+            <a:off x="694428" y="3728365"/>
+            <a:ext cx="177553" cy="233091"/>
+          </a:xfrm>
+          <a:prstGeom prst="triangle">
+            <a:avLst/>
+          </a:prstGeom>
+          <a:solidFill>
+            <a:schemeClr val="bg1"/>
+          </a:solidFill>
+        </p:spPr>
+        <p:style>
+          <a:lnRef idx="2">
+            <a:schemeClr val="accent1">
+              <a:shade val="50000"/>
+            </a:schemeClr>
+          </a:lnRef>
+          <a:fillRef idx="1">
+            <a:schemeClr val="accent1"/>
+          </a:fillRef>
+          <a:effectRef idx="0">
+            <a:schemeClr val="accent1"/>
+          </a:effectRef>
+          <a:fontRef idx="minor">
+            <a:schemeClr val="lt1"/>
+          </a:fontRef>
+        </p:style>
+        <p:txBody>
+          <a:bodyPr rtlCol="0" anchor="ctr"/>
+          <a:lstStyle/>
+          <a:p>
+            <a:pPr algn="ctr"/>
+            <a:endParaRPr lang="en-US"/>
+          </a:p>
+        </p:txBody>
+      </p:sp>
+      <p:sp>
+        <p:nvSpPr>
+          <p:cNvPr id="44" name="TextBox 43">
+            <a:extLst>
+              <a:ext uri="{FF2B5EF4-FFF2-40B4-BE49-F238E27FC236}">
+                <a16:creationId xmlns:a16="http://schemas.microsoft.com/office/drawing/2014/main" id="{4F6EEA3B-9F38-4671-8E96-575A9BC22187}"/>
+              </a:ext>
+            </a:extLst>
+          </p:cNvPr>
+          <p:cNvSpPr txBox="1"/>
+          <p:nvPr/>
+        </p:nvSpPr>
+        <p:spPr>
+          <a:xfrm>
+            <a:off x="1355273" y="3660244"/>
+            <a:ext cx="3009530" cy="369332"/>
+          </a:xfrm>
+          <a:prstGeom prst="rect">
+            <a:avLst/>
+          </a:prstGeom>
+          <a:noFill/>
+        </p:spPr>
+        <p:txBody>
+          <a:bodyPr wrap="square" rtlCol="0">
+            <a:spAutoFit/>
+          </a:bodyPr>
+          <a:lstStyle/>
+          <a:p>
+            <a:r>
+              <a:rPr lang="en-US" b="1" dirty="0">
+                <a:solidFill>
+                  <a:schemeClr val="bg2"/>
+                </a:solidFill>
+              </a:rPr>
+              <a:t>April</a:t>
+            </a:r>
+          </a:p>
+        </p:txBody>
+      </p:sp>
+      <p:sp>
+        <p:nvSpPr>
+          <p:cNvPr id="45" name="Rectangle: Rounded Corners 44">
+            <a:extLst>
+              <a:ext uri="{FF2B5EF4-FFF2-40B4-BE49-F238E27FC236}">
+                <a16:creationId xmlns:a16="http://schemas.microsoft.com/office/drawing/2014/main" id="{32A6D1DE-E224-491F-98C7-BC269C144233}"/>
+              </a:ext>
+            </a:extLst>
+          </p:cNvPr>
+          <p:cNvSpPr/>
+          <p:nvPr/>
+        </p:nvSpPr>
+        <p:spPr>
+          <a:xfrm>
+            <a:off x="578330" y="4098412"/>
+            <a:ext cx="11035340" cy="386155"/>
+          </a:xfrm>
+          <a:prstGeom prst="roundRect">
+            <a:avLst/>
+          </a:prstGeom>
+        </p:spPr>
+        <p:style>
+          <a:lnRef idx="2">
+            <a:schemeClr val="accent1">
+              <a:shade val="50000"/>
+            </a:schemeClr>
+          </a:lnRef>
+          <a:fillRef idx="1">
+            <a:schemeClr val="accent1"/>
+          </a:fillRef>
+          <a:effectRef idx="0">
+            <a:schemeClr val="accent1"/>
+          </a:effectRef>
+          <a:fontRef idx="minor">
+            <a:schemeClr val="lt1"/>
+          </a:fontRef>
+        </p:style>
+        <p:txBody>
+          <a:bodyPr rtlCol="0" anchor="ctr"/>
+          <a:lstStyle/>
+          <a:p>
+            <a:pPr algn="ctr"/>
+            <a:endParaRPr lang="en-US"/>
+          </a:p>
+        </p:txBody>
+      </p:sp>
+      <p:sp>
+        <p:nvSpPr>
+          <p:cNvPr id="46" name="Oval 45">
+            <a:extLst>
+              <a:ext uri="{FF2B5EF4-FFF2-40B4-BE49-F238E27FC236}">
+                <a16:creationId xmlns:a16="http://schemas.microsoft.com/office/drawing/2014/main" id="{AD6D73EB-B18E-4BBE-BD8A-143873A15A53}"/>
+              </a:ext>
+            </a:extLst>
+          </p:cNvPr>
+          <p:cNvSpPr/>
+          <p:nvPr/>
+        </p:nvSpPr>
+        <p:spPr>
+          <a:xfrm>
+            <a:off x="975950" y="4159069"/>
+            <a:ext cx="258588" cy="269094"/>
+          </a:xfrm>
+          <a:prstGeom prst="ellipse">
+            <a:avLst/>
+          </a:prstGeom>
+          <a:solidFill>
+            <a:schemeClr val="bg1"/>
+          </a:solidFill>
+        </p:spPr>
+        <p:style>
+          <a:lnRef idx="2">
+            <a:schemeClr val="accent1">
+              <a:shade val="50000"/>
+            </a:schemeClr>
+          </a:lnRef>
+          <a:fillRef idx="1">
+            <a:schemeClr val="accent1"/>
+          </a:fillRef>
+          <a:effectRef idx="0">
+            <a:schemeClr val="accent1"/>
+          </a:effectRef>
+          <a:fontRef idx="minor">
+            <a:schemeClr val="lt1"/>
+          </a:fontRef>
+        </p:style>
+        <p:txBody>
+          <a:bodyPr rtlCol="0" anchor="ctr"/>
+          <a:lstStyle/>
+          <a:p>
+            <a:pPr algn="ctr"/>
+            <a:endParaRPr lang="en-US"/>
+          </a:p>
+        </p:txBody>
+      </p:sp>
+      <p:sp>
+        <p:nvSpPr>
+          <p:cNvPr id="47" name="Isosceles Triangle 46">
+            <a:extLst>
+              <a:ext uri="{FF2B5EF4-FFF2-40B4-BE49-F238E27FC236}">
+                <a16:creationId xmlns:a16="http://schemas.microsoft.com/office/drawing/2014/main" id="{B6CD4ED3-6C07-4B68-A13A-804EB63E3072}"/>
+              </a:ext>
+            </a:extLst>
+          </p:cNvPr>
+          <p:cNvSpPr/>
+          <p:nvPr/>
+        </p:nvSpPr>
+        <p:spPr>
+          <a:xfrm rot="5400000">
+            <a:off x="704983" y="4174943"/>
+            <a:ext cx="177553" cy="233091"/>
+          </a:xfrm>
+          <a:prstGeom prst="triangle">
+            <a:avLst/>
+          </a:prstGeom>
+          <a:solidFill>
+            <a:schemeClr val="bg1"/>
+          </a:solidFill>
+        </p:spPr>
+        <p:style>
+          <a:lnRef idx="2">
+            <a:schemeClr val="accent1">
+              <a:shade val="50000"/>
+            </a:schemeClr>
+          </a:lnRef>
+          <a:fillRef idx="1">
+            <a:schemeClr val="accent1"/>
+          </a:fillRef>
+          <a:effectRef idx="0">
+            <a:schemeClr val="accent1"/>
+          </a:effectRef>
+          <a:fontRef idx="minor">
+            <a:schemeClr val="lt1"/>
+          </a:fontRef>
+        </p:style>
+        <p:txBody>
+          <a:bodyPr rtlCol="0" anchor="ctr"/>
+          <a:lstStyle/>
+          <a:p>
+            <a:pPr algn="ctr"/>
+            <a:endParaRPr lang="en-US"/>
+          </a:p>
+        </p:txBody>
+      </p:sp>
+      <p:sp>
+        <p:nvSpPr>
+          <p:cNvPr id="48" name="TextBox 47">
+            <a:extLst>
+              <a:ext uri="{FF2B5EF4-FFF2-40B4-BE49-F238E27FC236}">
+                <a16:creationId xmlns:a16="http://schemas.microsoft.com/office/drawing/2014/main" id="{83F40CCE-0D1E-40A4-BA9E-2575A57B496F}"/>
+              </a:ext>
+            </a:extLst>
+          </p:cNvPr>
+          <p:cNvSpPr txBox="1"/>
+          <p:nvPr/>
+        </p:nvSpPr>
+        <p:spPr>
+          <a:xfrm>
+            <a:off x="1365828" y="4106822"/>
+            <a:ext cx="3009530" cy="369332"/>
+          </a:xfrm>
+          <a:prstGeom prst="rect">
+            <a:avLst/>
+          </a:prstGeom>
+          <a:noFill/>
+        </p:spPr>
+        <p:txBody>
+          <a:bodyPr wrap="square" rtlCol="0">
+            <a:spAutoFit/>
+          </a:bodyPr>
+          <a:lstStyle/>
+          <a:p>
+            <a:r>
+              <a:rPr lang="en-US" b="1" dirty="0">
+                <a:solidFill>
+                  <a:schemeClr val="bg2"/>
+                </a:solidFill>
+              </a:rPr>
+              <a:t>May</a:t>
+            </a:r>
+          </a:p>
+        </p:txBody>
+      </p:sp>
+    </p:spTree>
+    <p:extLst>
+      <p:ext uri="{BB962C8B-B14F-4D97-AF65-F5344CB8AC3E}">
+        <p14:creationId xmlns:p14="http://schemas.microsoft.com/office/powerpoint/2010/main" val="337215438"/>
+      </p:ext>
+    </p:extLst>
+  </p:cSld>
+  <p:clrMapOvr>
+    <a:masterClrMapping/>
+  </p:clrMapOvr>
+</p:sld>
+</file>
+
+<file path=ppt/slides/slide4.xml><?xml version="1.0" encoding="utf-8"?>
+<p:sld xmlns:a="http://schemas.openxmlformats.org/drawingml/2006/main" xmlns:r="http://schemas.openxmlformats.org/officeDocument/2006/relationships" xmlns:p="http://schemas.openxmlformats.org/presentationml/2006/main">
+  <p:cSld>
+    <p:spTree>
+      <p:nvGrpSpPr>
+        <p:cNvPr id="1" name=""/>
+        <p:cNvGrpSpPr/>
+        <p:nvPr/>
+      </p:nvGrpSpPr>
+      <p:grpSpPr>
+        <a:xfrm>
+          <a:off x="0" y="0"/>
+          <a:ext cx="0" cy="0"/>
+          <a:chOff x="0" y="0"/>
+          <a:chExt cx="0" cy="0"/>
+        </a:xfrm>
+      </p:grpSpPr>
+      <p:cxnSp>
+        <p:nvCxnSpPr>
+          <p:cNvPr id="4" name="Straight Connector 3">
+            <a:extLst>
+              <a:ext uri="{FF2B5EF4-FFF2-40B4-BE49-F238E27FC236}">
+                <a16:creationId xmlns:a16="http://schemas.microsoft.com/office/drawing/2014/main" id="{A135C611-2DC4-4B2C-AE68-3C93AE39356C}"/>
+              </a:ext>
+            </a:extLst>
+          </p:cNvPr>
+          <p:cNvCxnSpPr/>
+          <p:nvPr/>
+        </p:nvCxnSpPr>
+        <p:spPr>
+          <a:xfrm>
+            <a:off x="0" y="680720"/>
+            <a:ext cx="12192000" cy="0"/>
+          </a:xfrm>
+          <a:prstGeom prst="line">
+            <a:avLst/>
+          </a:prstGeom>
+        </p:spPr>
+        <p:style>
+          <a:lnRef idx="1">
+            <a:schemeClr val="accent1"/>
+          </a:lnRef>
+          <a:fillRef idx="0">
+            <a:schemeClr val="accent1"/>
+          </a:fillRef>
+          <a:effectRef idx="0">
+            <a:schemeClr val="accent1"/>
+          </a:effectRef>
+          <a:fontRef idx="minor">
+            <a:schemeClr val="tx1"/>
+          </a:fontRef>
+        </p:style>
+      </p:cxnSp>
+      <p:sp>
+        <p:nvSpPr>
+          <p:cNvPr id="5" name="Rectangle: Rounded Corners 4">
+            <a:extLst>
+              <a:ext uri="{FF2B5EF4-FFF2-40B4-BE49-F238E27FC236}">
+                <a16:creationId xmlns:a16="http://schemas.microsoft.com/office/drawing/2014/main" id="{3A737122-794D-4AA3-A140-9614A72AA7BB}"/>
+              </a:ext>
+            </a:extLst>
+          </p:cNvPr>
+          <p:cNvSpPr/>
+          <p:nvPr/>
+        </p:nvSpPr>
+        <p:spPr>
+          <a:xfrm>
+            <a:off x="1676400" y="111760"/>
+            <a:ext cx="2743200" cy="447040"/>
+          </a:xfrm>
+          <a:prstGeom prst="roundRect">
+            <a:avLst/>
+          </a:prstGeom>
+          <a:solidFill>
+            <a:schemeClr val="bg1"/>
+          </a:solidFill>
+        </p:spPr>
+        <p:style>
+          <a:lnRef idx="2">
+            <a:schemeClr val="accent1">
+              <a:shade val="15000"/>
+            </a:schemeClr>
+          </a:lnRef>
+          <a:fillRef idx="1">
+            <a:schemeClr val="accent1"/>
+          </a:fillRef>
+          <a:effectRef idx="0">
+            <a:schemeClr val="accent1"/>
+          </a:effectRef>
+          <a:fontRef idx="minor">
+            <a:schemeClr val="lt1"/>
+          </a:fontRef>
+        </p:style>
+        <p:txBody>
+          <a:bodyPr rtlCol="0" anchor="ctr"/>
+          <a:lstStyle/>
+          <a:p>
+            <a:pPr algn="ctr"/>
+            <a:endParaRPr lang="en-CA"/>
+          </a:p>
+        </p:txBody>
+      </p:sp>
+      <p:sp>
+        <p:nvSpPr>
+          <p:cNvPr id="6" name="TextBox 5">
+            <a:extLst>
+              <a:ext uri="{FF2B5EF4-FFF2-40B4-BE49-F238E27FC236}">
+                <a16:creationId xmlns:a16="http://schemas.microsoft.com/office/drawing/2014/main" id="{19E608DF-3BE5-4DEB-A5B4-7B9EDC0D8091}"/>
+              </a:ext>
+            </a:extLst>
+          </p:cNvPr>
+          <p:cNvSpPr txBox="1"/>
+          <p:nvPr/>
+        </p:nvSpPr>
+        <p:spPr>
+          <a:xfrm>
+            <a:off x="2527300" y="96753"/>
+            <a:ext cx="1231900" cy="477054"/>
+          </a:xfrm>
+          <a:prstGeom prst="rect">
+            <a:avLst/>
+          </a:prstGeom>
+          <a:noFill/>
+        </p:spPr>
+        <p:txBody>
+          <a:bodyPr wrap="square" rtlCol="0">
+            <a:spAutoFit/>
+          </a:bodyPr>
+          <a:lstStyle/>
+          <a:p>
+            <a:r>
+              <a:rPr lang="en-CA" sz="2500" b="1" dirty="0">
+                <a:solidFill>
+                  <a:schemeClr val="accent1"/>
+                </a:solidFill>
+              </a:rPr>
+              <a:t>GOALS</a:t>
+            </a:r>
+          </a:p>
+        </p:txBody>
+      </p:sp>
+      <p:sp>
+        <p:nvSpPr>
+          <p:cNvPr id="7" name="Rectangle: Rounded Corners 6">
+            <a:extLst>
+              <a:ext uri="{FF2B5EF4-FFF2-40B4-BE49-F238E27FC236}">
+                <a16:creationId xmlns:a16="http://schemas.microsoft.com/office/drawing/2014/main" id="{AAF0C8A7-951B-496D-9B43-7AC25ACF5568}"/>
+              </a:ext>
+            </a:extLst>
+          </p:cNvPr>
+          <p:cNvSpPr/>
+          <p:nvPr/>
+        </p:nvSpPr>
+        <p:spPr>
+          <a:xfrm>
+            <a:off x="7772402" y="96753"/>
+            <a:ext cx="2743200" cy="447040"/>
+          </a:xfrm>
+          <a:prstGeom prst="roundRect">
+            <a:avLst/>
+          </a:prstGeom>
+        </p:spPr>
+        <p:style>
+          <a:lnRef idx="2">
+            <a:schemeClr val="accent1">
+              <a:shade val="15000"/>
+            </a:schemeClr>
+          </a:lnRef>
+          <a:fillRef idx="1">
+            <a:schemeClr val="accent1"/>
+          </a:fillRef>
+          <a:effectRef idx="0">
+            <a:schemeClr val="accent1"/>
+          </a:effectRef>
+          <a:fontRef idx="minor">
+            <a:schemeClr val="lt1"/>
+          </a:fontRef>
+        </p:style>
+        <p:txBody>
+          <a:bodyPr rtlCol="0" anchor="ctr"/>
+          <a:lstStyle/>
+          <a:p>
+            <a:pPr algn="ctr"/>
+            <a:endParaRPr lang="en-CA"/>
+          </a:p>
+        </p:txBody>
+      </p:sp>
+      <p:sp>
+        <p:nvSpPr>
+          <p:cNvPr id="8" name="TextBox 7">
+            <a:extLst>
+              <a:ext uri="{FF2B5EF4-FFF2-40B4-BE49-F238E27FC236}">
+                <a16:creationId xmlns:a16="http://schemas.microsoft.com/office/drawing/2014/main" id="{DDF9D670-3EB3-4D03-BEAC-7E433E2704C6}"/>
+              </a:ext>
+            </a:extLst>
+          </p:cNvPr>
+          <p:cNvSpPr txBox="1"/>
+          <p:nvPr/>
+        </p:nvSpPr>
+        <p:spPr>
+          <a:xfrm>
+            <a:off x="7945120" y="81746"/>
+            <a:ext cx="2570480" cy="477054"/>
+          </a:xfrm>
+          <a:prstGeom prst="rect">
+            <a:avLst/>
+          </a:prstGeom>
+          <a:noFill/>
+        </p:spPr>
+        <p:txBody>
+          <a:bodyPr wrap="square" rtlCol="0">
+            <a:spAutoFit/>
+          </a:bodyPr>
+          <a:lstStyle/>
+          <a:p>
+            <a:r>
+              <a:rPr lang="en-CA" sz="2500" b="1" dirty="0">
+                <a:solidFill>
+                  <a:schemeClr val="bg1"/>
+                </a:solidFill>
+              </a:rPr>
+              <a:t>WEEKLY TRACKER</a:t>
+            </a:r>
+          </a:p>
+        </p:txBody>
+      </p:sp>
+      <p:cxnSp>
+        <p:nvCxnSpPr>
+          <p:cNvPr id="49" name="Straight Connector 48">
+            <a:extLst>
+              <a:ext uri="{FF2B5EF4-FFF2-40B4-BE49-F238E27FC236}">
+                <a16:creationId xmlns:a16="http://schemas.microsoft.com/office/drawing/2014/main" id="{2D0809BF-E326-4DA8-835A-A9058CD19C83}"/>
+              </a:ext>
+            </a:extLst>
+          </p:cNvPr>
+          <p:cNvCxnSpPr/>
+          <p:nvPr/>
+        </p:nvCxnSpPr>
+        <p:spPr>
+          <a:xfrm>
+            <a:off x="0" y="1099450"/>
+            <a:ext cx="12192000" cy="0"/>
+          </a:xfrm>
+          <a:prstGeom prst="line">
+            <a:avLst/>
+          </a:prstGeom>
+        </p:spPr>
+        <p:style>
+          <a:lnRef idx="1">
+            <a:schemeClr val="accent1"/>
+          </a:lnRef>
+          <a:fillRef idx="0">
+            <a:schemeClr val="accent1"/>
+          </a:fillRef>
+          <a:effectRef idx="0">
+            <a:schemeClr val="accent1"/>
+          </a:effectRef>
+          <a:fontRef idx="minor">
+            <a:schemeClr val="tx1"/>
+          </a:fontRef>
+        </p:style>
+      </p:cxnSp>
+      <p:cxnSp>
+        <p:nvCxnSpPr>
+          <p:cNvPr id="50" name="Straight Connector 49">
+            <a:extLst>
+              <a:ext uri="{FF2B5EF4-FFF2-40B4-BE49-F238E27FC236}">
+                <a16:creationId xmlns:a16="http://schemas.microsoft.com/office/drawing/2014/main" id="{7D0DC782-2BE4-4406-A969-2194356CD359}"/>
+              </a:ext>
+            </a:extLst>
+          </p:cNvPr>
+          <p:cNvCxnSpPr/>
+          <p:nvPr/>
+        </p:nvCxnSpPr>
+        <p:spPr>
+          <a:xfrm>
+            <a:off x="0" y="1509303"/>
+            <a:ext cx="12192000" cy="0"/>
+          </a:xfrm>
+          <a:prstGeom prst="line">
+            <a:avLst/>
+          </a:prstGeom>
+        </p:spPr>
+        <p:style>
+          <a:lnRef idx="1">
+            <a:schemeClr val="accent1"/>
+          </a:lnRef>
+          <a:fillRef idx="0">
+            <a:schemeClr val="accent1"/>
+          </a:fillRef>
+          <a:effectRef idx="0">
+            <a:schemeClr val="accent1"/>
+          </a:effectRef>
+          <a:fontRef idx="minor">
+            <a:schemeClr val="tx1"/>
+          </a:fontRef>
+        </p:style>
+      </p:cxnSp>
+      <p:cxnSp>
+        <p:nvCxnSpPr>
+          <p:cNvPr id="51" name="Straight Connector 50">
+            <a:extLst>
+              <a:ext uri="{FF2B5EF4-FFF2-40B4-BE49-F238E27FC236}">
+                <a16:creationId xmlns:a16="http://schemas.microsoft.com/office/drawing/2014/main" id="{BEE73267-9027-49EC-A65A-73D313C49B7B}"/>
+              </a:ext>
+            </a:extLst>
+          </p:cNvPr>
+          <p:cNvCxnSpPr/>
+          <p:nvPr/>
+        </p:nvCxnSpPr>
+        <p:spPr>
+          <a:xfrm>
+            <a:off x="0" y="1936910"/>
+            <a:ext cx="12192000" cy="0"/>
+          </a:xfrm>
+          <a:prstGeom prst="line">
+            <a:avLst/>
+          </a:prstGeom>
+        </p:spPr>
+        <p:style>
+          <a:lnRef idx="1">
+            <a:schemeClr val="accent1"/>
+          </a:lnRef>
+          <a:fillRef idx="0">
+            <a:schemeClr val="accent1"/>
+          </a:fillRef>
+          <a:effectRef idx="0">
+            <a:schemeClr val="accent1"/>
+          </a:effectRef>
+          <a:fontRef idx="minor">
+            <a:schemeClr val="tx1"/>
+          </a:fontRef>
+        </p:style>
+      </p:cxnSp>
+      <p:grpSp>
+        <p:nvGrpSpPr>
+          <p:cNvPr id="11" name="Group 10">
+            <a:extLst>
+              <a:ext uri="{FF2B5EF4-FFF2-40B4-BE49-F238E27FC236}">
+                <a16:creationId xmlns:a16="http://schemas.microsoft.com/office/drawing/2014/main" id="{EFC43163-32DA-4051-B262-D04BEE62665D}"/>
+              </a:ext>
+            </a:extLst>
+          </p:cNvPr>
+          <p:cNvGrpSpPr/>
+          <p:nvPr/>
+        </p:nvGrpSpPr>
+        <p:grpSpPr>
+          <a:xfrm>
+            <a:off x="513230" y="709858"/>
+            <a:ext cx="1029810" cy="369332"/>
+            <a:chOff x="417250" y="709858"/>
+            <a:chExt cx="1029810" cy="369332"/>
+          </a:xfrm>
+        </p:grpSpPr>
+        <p:sp>
+          <p:nvSpPr>
+            <p:cNvPr id="3" name="Rectangle: Rounded Corners 2">
+              <a:extLst>
+                <a:ext uri="{FF2B5EF4-FFF2-40B4-BE49-F238E27FC236}">
+                  <a16:creationId xmlns:a16="http://schemas.microsoft.com/office/drawing/2014/main" id="{CB481261-AC5B-4D72-842D-7939133A4BD6}"/>
+                </a:ext>
+              </a:extLst>
+            </p:cNvPr>
+            <p:cNvSpPr/>
+            <p:nvPr/>
+          </p:nvSpPr>
+          <p:spPr>
+            <a:xfrm>
+              <a:off x="417250" y="744295"/>
+              <a:ext cx="1029810" cy="300458"/>
+            </a:xfrm>
+            <a:prstGeom prst="roundRect">
+              <a:avLst/>
+            </a:prstGeom>
+            <a:solidFill>
+              <a:schemeClr val="bg2"/>
+            </a:solidFill>
+            <a:ln w="19050">
+              <a:solidFill>
+                <a:schemeClr val="accent1"/>
+              </a:solidFill>
+            </a:ln>
+          </p:spPr>
+          <p:style>
+            <a:lnRef idx="2">
+              <a:schemeClr val="accent1">
+                <a:shade val="50000"/>
+              </a:schemeClr>
+            </a:lnRef>
+            <a:fillRef idx="1">
+              <a:schemeClr val="accent1"/>
+            </a:fillRef>
+            <a:effectRef idx="0">
+              <a:schemeClr val="accent1"/>
+            </a:effectRef>
+            <a:fontRef idx="minor">
+              <a:schemeClr val="lt1"/>
+            </a:fontRef>
+          </p:style>
+          <p:txBody>
+            <a:bodyPr rtlCol="0" anchor="ctr"/>
+            <a:lstStyle/>
+            <a:p>
+              <a:pPr algn="ctr"/>
+              <a:endParaRPr lang="en-US"/>
+            </a:p>
+          </p:txBody>
+        </p:sp>
+        <p:sp>
+          <p:nvSpPr>
+            <p:cNvPr id="10" name="TextBox 9">
+              <a:extLst>
+                <a:ext uri="{FF2B5EF4-FFF2-40B4-BE49-F238E27FC236}">
+                  <a16:creationId xmlns:a16="http://schemas.microsoft.com/office/drawing/2014/main" id="{BD0D3E82-8DC8-4692-9A42-4CC141A22E71}"/>
+                </a:ext>
+              </a:extLst>
+            </p:cNvPr>
+            <p:cNvSpPr txBox="1"/>
+            <p:nvPr/>
+          </p:nvSpPr>
+          <p:spPr>
+            <a:xfrm>
+              <a:off x="614778" y="709858"/>
+              <a:ext cx="652509" cy="369332"/>
+            </a:xfrm>
+            <a:prstGeom prst="rect">
+              <a:avLst/>
+            </a:prstGeom>
+            <a:noFill/>
+          </p:spPr>
+          <p:txBody>
+            <a:bodyPr wrap="square" rtlCol="0">
+              <a:spAutoFit/>
+            </a:bodyPr>
+            <a:lstStyle/>
+            <a:p>
+              <a:r>
+                <a:rPr lang="en-US" b="1" dirty="0">
+                  <a:solidFill>
+                    <a:schemeClr val="accent1"/>
+                  </a:solidFill>
+                </a:rPr>
+                <a:t>2020</a:t>
+              </a:r>
+            </a:p>
+          </p:txBody>
+        </p:sp>
+      </p:grpSp>
+      <p:grpSp>
+        <p:nvGrpSpPr>
+          <p:cNvPr id="62" name="Group 61">
+            <a:extLst>
+              <a:ext uri="{FF2B5EF4-FFF2-40B4-BE49-F238E27FC236}">
+                <a16:creationId xmlns:a16="http://schemas.microsoft.com/office/drawing/2014/main" id="{4CBB0FCE-3D5F-43FB-871B-996C1DBDE83C}"/>
+              </a:ext>
+            </a:extLst>
+          </p:cNvPr>
+          <p:cNvGrpSpPr/>
+          <p:nvPr/>
+        </p:nvGrpSpPr>
+        <p:grpSpPr>
+          <a:xfrm>
+            <a:off x="1751494" y="721241"/>
+            <a:ext cx="1029810" cy="369332"/>
+            <a:chOff x="417250" y="709858"/>
+            <a:chExt cx="1029810" cy="369332"/>
+          </a:xfrm>
+        </p:grpSpPr>
+        <p:sp>
+          <p:nvSpPr>
+            <p:cNvPr id="63" name="Rectangle: Rounded Corners 62">
+              <a:extLst>
+                <a:ext uri="{FF2B5EF4-FFF2-40B4-BE49-F238E27FC236}">
+                  <a16:creationId xmlns:a16="http://schemas.microsoft.com/office/drawing/2014/main" id="{268DE68E-2DD0-4E4B-8223-1A7CE06451C8}"/>
+                </a:ext>
+              </a:extLst>
+            </p:cNvPr>
+            <p:cNvSpPr/>
+            <p:nvPr/>
+          </p:nvSpPr>
+          <p:spPr>
+            <a:xfrm>
+              <a:off x="417250" y="744295"/>
+              <a:ext cx="1029810" cy="300458"/>
+            </a:xfrm>
+            <a:prstGeom prst="roundRect">
+              <a:avLst/>
+            </a:prstGeom>
+            <a:solidFill>
+              <a:schemeClr val="bg2"/>
+            </a:solidFill>
+            <a:ln w="19050">
+              <a:solidFill>
+                <a:schemeClr val="accent1"/>
+              </a:solidFill>
+            </a:ln>
+          </p:spPr>
+          <p:style>
+            <a:lnRef idx="2">
+              <a:schemeClr val="accent1">
+                <a:shade val="50000"/>
+              </a:schemeClr>
+            </a:lnRef>
+            <a:fillRef idx="1">
+              <a:schemeClr val="accent1"/>
+            </a:fillRef>
+            <a:effectRef idx="0">
+              <a:schemeClr val="accent1"/>
+            </a:effectRef>
+            <a:fontRef idx="minor">
+              <a:schemeClr val="lt1"/>
+            </a:fontRef>
+          </p:style>
+          <p:txBody>
+            <a:bodyPr rtlCol="0" anchor="ctr"/>
+            <a:lstStyle/>
+            <a:p>
+              <a:pPr algn="ctr"/>
+              <a:endParaRPr lang="en-US"/>
+            </a:p>
+          </p:txBody>
+        </p:sp>
+        <p:sp>
+          <p:nvSpPr>
+            <p:cNvPr id="64" name="TextBox 63">
+              <a:extLst>
+                <a:ext uri="{FF2B5EF4-FFF2-40B4-BE49-F238E27FC236}">
+                  <a16:creationId xmlns:a16="http://schemas.microsoft.com/office/drawing/2014/main" id="{1A3BDE72-258F-43F1-9D27-10DFC3FFC552}"/>
+                </a:ext>
+              </a:extLst>
+            </p:cNvPr>
+            <p:cNvSpPr txBox="1"/>
+            <p:nvPr/>
+          </p:nvSpPr>
+          <p:spPr>
+            <a:xfrm>
+              <a:off x="614778" y="709858"/>
+              <a:ext cx="652509" cy="369332"/>
+            </a:xfrm>
+            <a:prstGeom prst="rect">
+              <a:avLst/>
+            </a:prstGeom>
+            <a:noFill/>
+          </p:spPr>
+          <p:txBody>
+            <a:bodyPr wrap="square" rtlCol="0">
+              <a:spAutoFit/>
+            </a:bodyPr>
+            <a:lstStyle/>
+            <a:p>
+              <a:r>
+                <a:rPr lang="en-US" b="1" dirty="0">
+                  <a:solidFill>
+                    <a:schemeClr val="accent1"/>
+                  </a:solidFill>
+                </a:rPr>
+                <a:t>2021</a:t>
+              </a:r>
+            </a:p>
+          </p:txBody>
+        </p:sp>
+      </p:grpSp>
+      <p:grpSp>
+        <p:nvGrpSpPr>
+          <p:cNvPr id="65" name="Group 64">
+            <a:extLst>
+              <a:ext uri="{FF2B5EF4-FFF2-40B4-BE49-F238E27FC236}">
+                <a16:creationId xmlns:a16="http://schemas.microsoft.com/office/drawing/2014/main" id="{9505C43B-C461-4CDC-A67D-38DC26D93AC9}"/>
+              </a:ext>
+            </a:extLst>
+          </p:cNvPr>
+          <p:cNvGrpSpPr/>
+          <p:nvPr/>
+        </p:nvGrpSpPr>
+        <p:grpSpPr>
+          <a:xfrm>
+            <a:off x="6803677" y="718565"/>
+            <a:ext cx="1029810" cy="369332"/>
+            <a:chOff x="417250" y="692102"/>
+            <a:chExt cx="1029810" cy="369332"/>
+          </a:xfrm>
+        </p:grpSpPr>
+        <p:sp>
+          <p:nvSpPr>
+            <p:cNvPr id="66" name="Rectangle: Rounded Corners 65">
+              <a:extLst>
+                <a:ext uri="{FF2B5EF4-FFF2-40B4-BE49-F238E27FC236}">
+                  <a16:creationId xmlns:a16="http://schemas.microsoft.com/office/drawing/2014/main" id="{4B53CFDA-1B11-40C7-AA57-2E81B4637E9D}"/>
+                </a:ext>
+              </a:extLst>
+            </p:cNvPr>
+            <p:cNvSpPr/>
+            <p:nvPr/>
+          </p:nvSpPr>
+          <p:spPr>
+            <a:xfrm>
+              <a:off x="417250" y="726539"/>
+              <a:ext cx="1029810" cy="300458"/>
+            </a:xfrm>
+            <a:prstGeom prst="roundRect">
+              <a:avLst/>
+            </a:prstGeom>
+            <a:solidFill>
+              <a:schemeClr val="bg2"/>
+            </a:solidFill>
+            <a:ln w="19050">
+              <a:solidFill>
+                <a:schemeClr val="accent1"/>
+              </a:solidFill>
+            </a:ln>
+          </p:spPr>
+          <p:style>
+            <a:lnRef idx="2">
+              <a:schemeClr val="accent1">
+                <a:shade val="50000"/>
+              </a:schemeClr>
+            </a:lnRef>
+            <a:fillRef idx="1">
+              <a:schemeClr val="accent1"/>
+            </a:fillRef>
+            <a:effectRef idx="0">
+              <a:schemeClr val="accent1"/>
+            </a:effectRef>
+            <a:fontRef idx="minor">
+              <a:schemeClr val="lt1"/>
+            </a:fontRef>
+          </p:style>
+          <p:txBody>
+            <a:bodyPr rtlCol="0" anchor="ctr"/>
+            <a:lstStyle/>
+            <a:p>
+              <a:pPr algn="ctr"/>
+              <a:endParaRPr lang="en-US"/>
+            </a:p>
+          </p:txBody>
+        </p:sp>
+        <p:sp>
+          <p:nvSpPr>
+            <p:cNvPr id="67" name="TextBox 66">
+              <a:extLst>
+                <a:ext uri="{FF2B5EF4-FFF2-40B4-BE49-F238E27FC236}">
+                  <a16:creationId xmlns:a16="http://schemas.microsoft.com/office/drawing/2014/main" id="{956B1815-8587-4EFD-B99E-E05234CBEB12}"/>
+                </a:ext>
+              </a:extLst>
+            </p:cNvPr>
+            <p:cNvSpPr txBox="1"/>
+            <p:nvPr/>
+          </p:nvSpPr>
+          <p:spPr>
+            <a:xfrm>
+              <a:off x="614778" y="692102"/>
+              <a:ext cx="652509" cy="369332"/>
+            </a:xfrm>
+            <a:prstGeom prst="rect">
+              <a:avLst/>
+            </a:prstGeom>
+            <a:noFill/>
+          </p:spPr>
+          <p:txBody>
+            <a:bodyPr wrap="square" rtlCol="0">
+              <a:spAutoFit/>
+            </a:bodyPr>
+            <a:lstStyle/>
+            <a:p>
+              <a:r>
+                <a:rPr lang="en-US" b="1" dirty="0">
+                  <a:solidFill>
+                    <a:schemeClr val="accent1"/>
+                  </a:solidFill>
+                </a:rPr>
+                <a:t>2025</a:t>
+              </a:r>
+            </a:p>
+          </p:txBody>
+        </p:sp>
+      </p:grpSp>
+      <p:grpSp>
+        <p:nvGrpSpPr>
+          <p:cNvPr id="68" name="Group 67">
+            <a:extLst>
+              <a:ext uri="{FF2B5EF4-FFF2-40B4-BE49-F238E27FC236}">
+                <a16:creationId xmlns:a16="http://schemas.microsoft.com/office/drawing/2014/main" id="{A53CD534-49A2-4B95-B3F0-63C53F65BFE0}"/>
+              </a:ext>
+            </a:extLst>
+          </p:cNvPr>
+          <p:cNvGrpSpPr/>
+          <p:nvPr/>
+        </p:nvGrpSpPr>
+        <p:grpSpPr>
+          <a:xfrm>
+            <a:off x="5527315" y="724753"/>
+            <a:ext cx="1029810" cy="369332"/>
+            <a:chOff x="417250" y="709858"/>
+            <a:chExt cx="1029810" cy="369332"/>
+          </a:xfrm>
+        </p:grpSpPr>
+        <p:sp>
+          <p:nvSpPr>
+            <p:cNvPr id="69" name="Rectangle: Rounded Corners 68">
+              <a:extLst>
+                <a:ext uri="{FF2B5EF4-FFF2-40B4-BE49-F238E27FC236}">
+                  <a16:creationId xmlns:a16="http://schemas.microsoft.com/office/drawing/2014/main" id="{2DB56A16-3A7F-4170-9B18-153CC26172BE}"/>
+                </a:ext>
+              </a:extLst>
+            </p:cNvPr>
+            <p:cNvSpPr/>
+            <p:nvPr/>
+          </p:nvSpPr>
+          <p:spPr>
+            <a:xfrm>
+              <a:off x="417250" y="744295"/>
+              <a:ext cx="1029810" cy="300458"/>
+            </a:xfrm>
+            <a:prstGeom prst="roundRect">
+              <a:avLst/>
+            </a:prstGeom>
+            <a:solidFill>
+              <a:schemeClr val="bg2"/>
+            </a:solidFill>
+            <a:ln w="19050">
+              <a:solidFill>
+                <a:schemeClr val="accent1"/>
+              </a:solidFill>
+            </a:ln>
+          </p:spPr>
+          <p:style>
+            <a:lnRef idx="2">
+              <a:schemeClr val="accent1">
+                <a:shade val="50000"/>
+              </a:schemeClr>
+            </a:lnRef>
+            <a:fillRef idx="1">
+              <a:schemeClr val="accent1"/>
+            </a:fillRef>
+            <a:effectRef idx="0">
+              <a:schemeClr val="accent1"/>
+            </a:effectRef>
+            <a:fontRef idx="minor">
+              <a:schemeClr val="lt1"/>
+            </a:fontRef>
+          </p:style>
+          <p:txBody>
+            <a:bodyPr rtlCol="0" anchor="ctr"/>
+            <a:lstStyle/>
+            <a:p>
+              <a:pPr algn="ctr"/>
+              <a:endParaRPr lang="en-US"/>
+            </a:p>
+          </p:txBody>
+        </p:sp>
+        <p:sp>
+          <p:nvSpPr>
+            <p:cNvPr id="70" name="TextBox 69">
+              <a:extLst>
+                <a:ext uri="{FF2B5EF4-FFF2-40B4-BE49-F238E27FC236}">
+                  <a16:creationId xmlns:a16="http://schemas.microsoft.com/office/drawing/2014/main" id="{A99F02FB-3136-46D7-A25A-0A58BA3969D3}"/>
+                </a:ext>
+              </a:extLst>
+            </p:cNvPr>
+            <p:cNvSpPr txBox="1"/>
+            <p:nvPr/>
+          </p:nvSpPr>
+          <p:spPr>
+            <a:xfrm>
+              <a:off x="614778" y="709858"/>
+              <a:ext cx="652509" cy="369332"/>
+            </a:xfrm>
+            <a:prstGeom prst="rect">
+              <a:avLst/>
+            </a:prstGeom>
+            <a:noFill/>
+          </p:spPr>
+          <p:txBody>
+            <a:bodyPr wrap="square" rtlCol="0">
+              <a:spAutoFit/>
+            </a:bodyPr>
+            <a:lstStyle/>
+            <a:p>
+              <a:r>
+                <a:rPr lang="en-US" b="1" dirty="0">
+                  <a:solidFill>
+                    <a:schemeClr val="accent1"/>
+                  </a:solidFill>
+                </a:rPr>
+                <a:t>2024</a:t>
+              </a:r>
+            </a:p>
+          </p:txBody>
+        </p:sp>
+      </p:grpSp>
+      <p:grpSp>
+        <p:nvGrpSpPr>
+          <p:cNvPr id="71" name="Group 70">
+            <a:extLst>
+              <a:ext uri="{FF2B5EF4-FFF2-40B4-BE49-F238E27FC236}">
+                <a16:creationId xmlns:a16="http://schemas.microsoft.com/office/drawing/2014/main" id="{1012CD71-28BA-4900-A151-9AF86C9B611D}"/>
+              </a:ext>
+            </a:extLst>
+          </p:cNvPr>
+          <p:cNvGrpSpPr/>
+          <p:nvPr/>
+        </p:nvGrpSpPr>
+        <p:grpSpPr>
+          <a:xfrm>
+            <a:off x="3010101" y="721241"/>
+            <a:ext cx="1029810" cy="369332"/>
+            <a:chOff x="417250" y="709858"/>
+            <a:chExt cx="1029810" cy="369332"/>
+          </a:xfrm>
+        </p:grpSpPr>
+        <p:sp>
+          <p:nvSpPr>
+            <p:cNvPr id="72" name="Rectangle: Rounded Corners 71">
+              <a:extLst>
+                <a:ext uri="{FF2B5EF4-FFF2-40B4-BE49-F238E27FC236}">
+                  <a16:creationId xmlns:a16="http://schemas.microsoft.com/office/drawing/2014/main" id="{0BCF1A84-046F-4749-AF89-39FC3D9E5B97}"/>
+                </a:ext>
+              </a:extLst>
+            </p:cNvPr>
+            <p:cNvSpPr/>
+            <p:nvPr/>
+          </p:nvSpPr>
+          <p:spPr>
+            <a:xfrm>
+              <a:off x="417250" y="744295"/>
+              <a:ext cx="1029810" cy="300458"/>
+            </a:xfrm>
+            <a:prstGeom prst="roundRect">
+              <a:avLst/>
+            </a:prstGeom>
+            <a:solidFill>
+              <a:schemeClr val="bg2"/>
+            </a:solidFill>
+            <a:ln w="19050">
+              <a:solidFill>
+                <a:schemeClr val="accent1"/>
+              </a:solidFill>
+            </a:ln>
+          </p:spPr>
+          <p:style>
+            <a:lnRef idx="2">
+              <a:schemeClr val="accent1">
+                <a:shade val="50000"/>
+              </a:schemeClr>
+            </a:lnRef>
+            <a:fillRef idx="1">
+              <a:schemeClr val="accent1"/>
+            </a:fillRef>
+            <a:effectRef idx="0">
+              <a:schemeClr val="accent1"/>
+            </a:effectRef>
+            <a:fontRef idx="minor">
+              <a:schemeClr val="lt1"/>
+            </a:fontRef>
+          </p:style>
+          <p:txBody>
+            <a:bodyPr rtlCol="0" anchor="ctr"/>
+            <a:lstStyle/>
+            <a:p>
+              <a:pPr algn="ctr"/>
+              <a:endParaRPr lang="en-US"/>
+            </a:p>
+          </p:txBody>
+        </p:sp>
+        <p:sp>
+          <p:nvSpPr>
+            <p:cNvPr id="73" name="TextBox 72">
+              <a:extLst>
+                <a:ext uri="{FF2B5EF4-FFF2-40B4-BE49-F238E27FC236}">
+                  <a16:creationId xmlns:a16="http://schemas.microsoft.com/office/drawing/2014/main" id="{A13A8AEF-0134-4F1C-BBC3-3FF7B2C22E04}"/>
+                </a:ext>
+              </a:extLst>
+            </p:cNvPr>
+            <p:cNvSpPr txBox="1"/>
+            <p:nvPr/>
+          </p:nvSpPr>
+          <p:spPr>
+            <a:xfrm>
+              <a:off x="614778" y="709858"/>
+              <a:ext cx="652509" cy="369332"/>
+            </a:xfrm>
+            <a:prstGeom prst="rect">
+              <a:avLst/>
+            </a:prstGeom>
+            <a:noFill/>
+          </p:spPr>
+          <p:txBody>
+            <a:bodyPr wrap="square" rtlCol="0">
+              <a:spAutoFit/>
+            </a:bodyPr>
+            <a:lstStyle/>
+            <a:p>
+              <a:r>
+                <a:rPr lang="en-US" b="1" dirty="0">
+                  <a:solidFill>
+                    <a:schemeClr val="accent1"/>
+                  </a:solidFill>
+                </a:rPr>
+                <a:t>2022</a:t>
+              </a:r>
+            </a:p>
+          </p:txBody>
+        </p:sp>
+      </p:grpSp>
+      <p:sp>
+        <p:nvSpPr>
+          <p:cNvPr id="75" name="Rectangle: Rounded Corners 74">
+            <a:extLst>
+              <a:ext uri="{FF2B5EF4-FFF2-40B4-BE49-F238E27FC236}">
+                <a16:creationId xmlns:a16="http://schemas.microsoft.com/office/drawing/2014/main" id="{00AFAFE6-DDE3-4CC9-B522-139F6701A5F4}"/>
+              </a:ext>
+            </a:extLst>
+          </p:cNvPr>
+          <p:cNvSpPr/>
+          <p:nvPr/>
+        </p:nvSpPr>
+        <p:spPr>
+          <a:xfrm>
+            <a:off x="4268708" y="752710"/>
+            <a:ext cx="1029810" cy="300458"/>
+          </a:xfrm>
+          <a:prstGeom prst="roundRect">
+            <a:avLst/>
+          </a:prstGeom>
+          <a:solidFill>
+            <a:schemeClr val="accent1"/>
+          </a:solidFill>
+          <a:ln w="19050">
+            <a:solidFill>
+              <a:schemeClr val="accent1"/>
+            </a:solidFill>
+          </a:ln>
+        </p:spPr>
+        <p:style>
+          <a:lnRef idx="2">
+            <a:schemeClr val="accent1">
+              <a:shade val="50000"/>
+            </a:schemeClr>
+          </a:lnRef>
+          <a:fillRef idx="1">
+            <a:schemeClr val="accent1"/>
+          </a:fillRef>
+          <a:effectRef idx="0">
+            <a:schemeClr val="accent1"/>
+          </a:effectRef>
+          <a:fontRef idx="minor">
+            <a:schemeClr val="lt1"/>
+          </a:fontRef>
+        </p:style>
+        <p:txBody>
+          <a:bodyPr rtlCol="0" anchor="ctr"/>
+          <a:lstStyle/>
+          <a:p>
+            <a:pPr algn="ctr"/>
+            <a:endParaRPr lang="en-US"/>
+          </a:p>
+        </p:txBody>
+      </p:sp>
+      <p:sp>
+        <p:nvSpPr>
+          <p:cNvPr id="76" name="TextBox 75">
+            <a:extLst>
+              <a:ext uri="{FF2B5EF4-FFF2-40B4-BE49-F238E27FC236}">
+                <a16:creationId xmlns:a16="http://schemas.microsoft.com/office/drawing/2014/main" id="{E1BEA00A-6FA8-4C60-BDA5-9275B046CF40}"/>
+              </a:ext>
+            </a:extLst>
+          </p:cNvPr>
+          <p:cNvSpPr txBox="1"/>
+          <p:nvPr/>
+        </p:nvSpPr>
+        <p:spPr>
+          <a:xfrm>
+            <a:off x="4466236" y="718273"/>
+            <a:ext cx="652509" cy="369332"/>
+          </a:xfrm>
+          <a:prstGeom prst="rect">
+            <a:avLst/>
+          </a:prstGeom>
+          <a:noFill/>
+        </p:spPr>
+        <p:txBody>
+          <a:bodyPr wrap="square" rtlCol="0">
+            <a:spAutoFit/>
+          </a:bodyPr>
+          <a:lstStyle/>
+          <a:p>
+            <a:r>
+              <a:rPr lang="en-US" b="1" dirty="0">
+                <a:solidFill>
+                  <a:schemeClr val="bg1"/>
+                </a:solidFill>
+              </a:rPr>
+              <a:t>2023</a:t>
+            </a:r>
+          </a:p>
+        </p:txBody>
+      </p:sp>
+      <p:grpSp>
+        <p:nvGrpSpPr>
+          <p:cNvPr id="77" name="Group 76">
+            <a:extLst>
+              <a:ext uri="{FF2B5EF4-FFF2-40B4-BE49-F238E27FC236}">
+                <a16:creationId xmlns:a16="http://schemas.microsoft.com/office/drawing/2014/main" id="{BD5143C4-5E76-4B4B-91D4-7DB5FF4282EE}"/>
+              </a:ext>
+            </a:extLst>
+          </p:cNvPr>
+          <p:cNvGrpSpPr/>
+          <p:nvPr/>
+        </p:nvGrpSpPr>
+        <p:grpSpPr>
+          <a:xfrm>
+            <a:off x="8097794" y="709858"/>
+            <a:ext cx="1029810" cy="369332"/>
+            <a:chOff x="417250" y="709858"/>
+            <a:chExt cx="1029810" cy="369332"/>
+          </a:xfrm>
+        </p:grpSpPr>
+        <p:sp>
+          <p:nvSpPr>
+            <p:cNvPr id="78" name="Rectangle: Rounded Corners 77">
+              <a:extLst>
+                <a:ext uri="{FF2B5EF4-FFF2-40B4-BE49-F238E27FC236}">
+                  <a16:creationId xmlns:a16="http://schemas.microsoft.com/office/drawing/2014/main" id="{7980D991-EFC1-47BA-9FDC-78DA043D307E}"/>
+                </a:ext>
+              </a:extLst>
+            </p:cNvPr>
+            <p:cNvSpPr/>
+            <p:nvPr/>
+          </p:nvSpPr>
+          <p:spPr>
+            <a:xfrm>
+              <a:off x="417250" y="744295"/>
+              <a:ext cx="1029810" cy="300458"/>
+            </a:xfrm>
+            <a:prstGeom prst="roundRect">
+              <a:avLst/>
+            </a:prstGeom>
+            <a:solidFill>
+              <a:schemeClr val="bg2"/>
+            </a:solidFill>
+            <a:ln w="19050">
+              <a:solidFill>
+                <a:schemeClr val="accent1"/>
+              </a:solidFill>
+            </a:ln>
+          </p:spPr>
+          <p:style>
+            <a:lnRef idx="2">
+              <a:schemeClr val="accent1">
+                <a:shade val="50000"/>
+              </a:schemeClr>
+            </a:lnRef>
+            <a:fillRef idx="1">
+              <a:schemeClr val="accent1"/>
+            </a:fillRef>
+            <a:effectRef idx="0">
+              <a:schemeClr val="accent1"/>
+            </a:effectRef>
+            <a:fontRef idx="minor">
+              <a:schemeClr val="lt1"/>
+            </a:fontRef>
+          </p:style>
+          <p:txBody>
+            <a:bodyPr rtlCol="0" anchor="ctr"/>
+            <a:lstStyle/>
+            <a:p>
+              <a:pPr algn="ctr"/>
+              <a:endParaRPr lang="en-US"/>
+            </a:p>
+          </p:txBody>
+        </p:sp>
+        <p:sp>
+          <p:nvSpPr>
+            <p:cNvPr id="79" name="TextBox 78">
+              <a:extLst>
+                <a:ext uri="{FF2B5EF4-FFF2-40B4-BE49-F238E27FC236}">
+                  <a16:creationId xmlns:a16="http://schemas.microsoft.com/office/drawing/2014/main" id="{E4032BA6-42D8-417A-8CAA-E46F7E0A3F9A}"/>
+                </a:ext>
+              </a:extLst>
+            </p:cNvPr>
+            <p:cNvSpPr txBox="1"/>
+            <p:nvPr/>
+          </p:nvSpPr>
+          <p:spPr>
+            <a:xfrm>
+              <a:off x="614778" y="709858"/>
+              <a:ext cx="652509" cy="369332"/>
+            </a:xfrm>
+            <a:prstGeom prst="rect">
+              <a:avLst/>
+            </a:prstGeom>
+            <a:noFill/>
+          </p:spPr>
+          <p:txBody>
+            <a:bodyPr wrap="square" rtlCol="0">
+              <a:spAutoFit/>
+            </a:bodyPr>
+            <a:lstStyle/>
+            <a:p>
+              <a:r>
+                <a:rPr lang="en-US" b="1" dirty="0">
+                  <a:solidFill>
+                    <a:schemeClr val="accent1"/>
+                  </a:solidFill>
+                </a:rPr>
+                <a:t>2026</a:t>
+              </a:r>
+            </a:p>
+          </p:txBody>
+        </p:sp>
+      </p:grpSp>
+      <p:grpSp>
+        <p:nvGrpSpPr>
+          <p:cNvPr id="80" name="Group 79">
+            <a:extLst>
+              <a:ext uri="{FF2B5EF4-FFF2-40B4-BE49-F238E27FC236}">
+                <a16:creationId xmlns:a16="http://schemas.microsoft.com/office/drawing/2014/main" id="{13B92A37-44F3-4373-B578-989E97D24FC1}"/>
+              </a:ext>
+            </a:extLst>
+          </p:cNvPr>
+          <p:cNvGrpSpPr/>
+          <p:nvPr/>
+        </p:nvGrpSpPr>
+        <p:grpSpPr>
+          <a:xfrm>
+            <a:off x="9354652" y="709858"/>
+            <a:ext cx="1029810" cy="369332"/>
+            <a:chOff x="417250" y="709858"/>
+            <a:chExt cx="1029810" cy="369332"/>
+          </a:xfrm>
+        </p:grpSpPr>
+        <p:sp>
+          <p:nvSpPr>
+            <p:cNvPr id="81" name="Rectangle: Rounded Corners 80">
+              <a:extLst>
+                <a:ext uri="{FF2B5EF4-FFF2-40B4-BE49-F238E27FC236}">
+                  <a16:creationId xmlns:a16="http://schemas.microsoft.com/office/drawing/2014/main" id="{DE1E227A-0FC7-4D2D-9202-09D27D4D38DC}"/>
+                </a:ext>
+              </a:extLst>
+            </p:cNvPr>
+            <p:cNvSpPr/>
+            <p:nvPr/>
+          </p:nvSpPr>
+          <p:spPr>
+            <a:xfrm>
+              <a:off x="417250" y="752710"/>
+              <a:ext cx="1029810" cy="300458"/>
+            </a:xfrm>
+            <a:prstGeom prst="roundRect">
+              <a:avLst/>
+            </a:prstGeom>
+            <a:solidFill>
+              <a:schemeClr val="bg2"/>
+            </a:solidFill>
+            <a:ln w="19050">
+              <a:solidFill>
+                <a:schemeClr val="accent1"/>
+              </a:solidFill>
+            </a:ln>
+          </p:spPr>
+          <p:style>
+            <a:lnRef idx="2">
+              <a:schemeClr val="accent1">
+                <a:shade val="50000"/>
+              </a:schemeClr>
+            </a:lnRef>
+            <a:fillRef idx="1">
+              <a:schemeClr val="accent1"/>
+            </a:fillRef>
+            <a:effectRef idx="0">
+              <a:schemeClr val="accent1"/>
+            </a:effectRef>
+            <a:fontRef idx="minor">
+              <a:schemeClr val="lt1"/>
+            </a:fontRef>
+          </p:style>
+          <p:txBody>
+            <a:bodyPr rtlCol="0" anchor="ctr"/>
+            <a:lstStyle/>
+            <a:p>
+              <a:pPr algn="ctr"/>
+              <a:endParaRPr lang="en-US"/>
+            </a:p>
+          </p:txBody>
+        </p:sp>
+        <p:sp>
+          <p:nvSpPr>
+            <p:cNvPr id="82" name="TextBox 81">
+              <a:extLst>
+                <a:ext uri="{FF2B5EF4-FFF2-40B4-BE49-F238E27FC236}">
+                  <a16:creationId xmlns:a16="http://schemas.microsoft.com/office/drawing/2014/main" id="{5EEA6DDF-FEB3-4C35-9C06-1AA8DDE877C0}"/>
+                </a:ext>
+              </a:extLst>
+            </p:cNvPr>
+            <p:cNvSpPr txBox="1"/>
+            <p:nvPr/>
+          </p:nvSpPr>
+          <p:spPr>
+            <a:xfrm>
+              <a:off x="614778" y="709858"/>
+              <a:ext cx="652509" cy="369332"/>
+            </a:xfrm>
+            <a:prstGeom prst="rect">
+              <a:avLst/>
+            </a:prstGeom>
+            <a:noFill/>
+          </p:spPr>
+          <p:txBody>
+            <a:bodyPr wrap="square" rtlCol="0">
+              <a:spAutoFit/>
+            </a:bodyPr>
+            <a:lstStyle/>
+            <a:p>
+              <a:r>
+                <a:rPr lang="en-US" b="1" dirty="0">
+                  <a:solidFill>
+                    <a:schemeClr val="accent1"/>
+                  </a:solidFill>
+                </a:rPr>
+                <a:t>2027</a:t>
+              </a:r>
+            </a:p>
+          </p:txBody>
+        </p:sp>
+      </p:grpSp>
+      <p:grpSp>
+        <p:nvGrpSpPr>
+          <p:cNvPr id="83" name="Group 82">
+            <a:extLst>
+              <a:ext uri="{FF2B5EF4-FFF2-40B4-BE49-F238E27FC236}">
+                <a16:creationId xmlns:a16="http://schemas.microsoft.com/office/drawing/2014/main" id="{5895F5EA-7B20-491B-94BE-D6B8CC718972}"/>
+              </a:ext>
+            </a:extLst>
+          </p:cNvPr>
+          <p:cNvGrpSpPr/>
+          <p:nvPr/>
+        </p:nvGrpSpPr>
+        <p:grpSpPr>
+          <a:xfrm>
+            <a:off x="1509211" y="1128587"/>
+            <a:ext cx="665826" cy="369332"/>
+            <a:chOff x="417250" y="709859"/>
+            <a:chExt cx="1029810" cy="369332"/>
+          </a:xfrm>
+        </p:grpSpPr>
+        <p:sp>
+          <p:nvSpPr>
+            <p:cNvPr id="84" name="Rectangle: Rounded Corners 83">
+              <a:extLst>
+                <a:ext uri="{FF2B5EF4-FFF2-40B4-BE49-F238E27FC236}">
+                  <a16:creationId xmlns:a16="http://schemas.microsoft.com/office/drawing/2014/main" id="{B39D88A1-DF7B-4472-AED9-157D19DFE2FF}"/>
+                </a:ext>
+              </a:extLst>
+            </p:cNvPr>
+            <p:cNvSpPr/>
+            <p:nvPr/>
+          </p:nvSpPr>
+          <p:spPr>
+            <a:xfrm>
+              <a:off x="417250" y="744295"/>
+              <a:ext cx="1029810" cy="300458"/>
+            </a:xfrm>
+            <a:prstGeom prst="roundRect">
+              <a:avLst/>
+            </a:prstGeom>
+            <a:solidFill>
+              <a:schemeClr val="bg2"/>
+            </a:solidFill>
+            <a:ln w="19050">
+              <a:solidFill>
+                <a:schemeClr val="accent1"/>
+              </a:solidFill>
+            </a:ln>
+          </p:spPr>
+          <p:style>
+            <a:lnRef idx="2">
+              <a:schemeClr val="accent1">
+                <a:shade val="50000"/>
+              </a:schemeClr>
+            </a:lnRef>
+            <a:fillRef idx="1">
+              <a:schemeClr val="accent1"/>
+            </a:fillRef>
+            <a:effectRef idx="0">
+              <a:schemeClr val="accent1"/>
+            </a:effectRef>
+            <a:fontRef idx="minor">
+              <a:schemeClr val="lt1"/>
+            </a:fontRef>
+          </p:style>
+          <p:txBody>
+            <a:bodyPr rtlCol="0" anchor="ctr"/>
+            <a:lstStyle/>
+            <a:p>
+              <a:pPr algn="ctr"/>
+              <a:endParaRPr lang="en-US"/>
+            </a:p>
+          </p:txBody>
+        </p:sp>
+        <p:sp>
+          <p:nvSpPr>
+            <p:cNvPr id="85" name="TextBox 84">
+              <a:extLst>
+                <a:ext uri="{FF2B5EF4-FFF2-40B4-BE49-F238E27FC236}">
+                  <a16:creationId xmlns:a16="http://schemas.microsoft.com/office/drawing/2014/main" id="{E5E292CD-D673-4A18-9384-93DDA5791FCE}"/>
+                </a:ext>
+              </a:extLst>
+            </p:cNvPr>
+            <p:cNvSpPr txBox="1"/>
+            <p:nvPr/>
+          </p:nvSpPr>
+          <p:spPr>
+            <a:xfrm>
+              <a:off x="524499" y="709859"/>
+              <a:ext cx="879589" cy="369332"/>
+            </a:xfrm>
+            <a:prstGeom prst="rect">
+              <a:avLst/>
+            </a:prstGeom>
+            <a:noFill/>
+          </p:spPr>
+          <p:txBody>
+            <a:bodyPr wrap="square" rtlCol="0">
+              <a:spAutoFit/>
+            </a:bodyPr>
+            <a:lstStyle/>
+            <a:p>
+              <a:r>
+                <a:rPr lang="en-US" b="1" dirty="0">
+                  <a:solidFill>
+                    <a:schemeClr val="accent1"/>
+                  </a:solidFill>
+                </a:rPr>
+                <a:t>JAN</a:t>
+              </a:r>
+            </a:p>
+          </p:txBody>
+        </p:sp>
+      </p:grpSp>
+      <p:grpSp>
+        <p:nvGrpSpPr>
+          <p:cNvPr id="86" name="Group 85">
+            <a:extLst>
+              <a:ext uri="{FF2B5EF4-FFF2-40B4-BE49-F238E27FC236}">
+                <a16:creationId xmlns:a16="http://schemas.microsoft.com/office/drawing/2014/main" id="{D467F440-4F2F-4637-B03D-9224F3B4C967}"/>
+              </a:ext>
+            </a:extLst>
+          </p:cNvPr>
+          <p:cNvGrpSpPr/>
+          <p:nvPr/>
+        </p:nvGrpSpPr>
+        <p:grpSpPr>
+          <a:xfrm>
+            <a:off x="2268316" y="1139074"/>
+            <a:ext cx="665826" cy="369332"/>
+            <a:chOff x="417250" y="709859"/>
+            <a:chExt cx="1029810" cy="369332"/>
+          </a:xfrm>
+        </p:grpSpPr>
+        <p:sp>
+          <p:nvSpPr>
+            <p:cNvPr id="87" name="Rectangle: Rounded Corners 86">
+              <a:extLst>
+                <a:ext uri="{FF2B5EF4-FFF2-40B4-BE49-F238E27FC236}">
+                  <a16:creationId xmlns:a16="http://schemas.microsoft.com/office/drawing/2014/main" id="{1C9120DA-77AE-4AFF-A353-7CDF8D6F2EC9}"/>
+                </a:ext>
+              </a:extLst>
+            </p:cNvPr>
+            <p:cNvSpPr/>
+            <p:nvPr/>
+          </p:nvSpPr>
+          <p:spPr>
+            <a:xfrm>
+              <a:off x="417250" y="744295"/>
+              <a:ext cx="1029810" cy="300458"/>
+            </a:xfrm>
+            <a:prstGeom prst="roundRect">
+              <a:avLst/>
+            </a:prstGeom>
+            <a:solidFill>
+              <a:schemeClr val="bg2"/>
+            </a:solidFill>
+            <a:ln w="19050">
+              <a:solidFill>
+                <a:schemeClr val="accent1"/>
+              </a:solidFill>
+            </a:ln>
+          </p:spPr>
+          <p:style>
+            <a:lnRef idx="2">
+              <a:schemeClr val="accent1">
+                <a:shade val="50000"/>
+              </a:schemeClr>
+            </a:lnRef>
+            <a:fillRef idx="1">
+              <a:schemeClr val="accent1"/>
+            </a:fillRef>
+            <a:effectRef idx="0">
+              <a:schemeClr val="accent1"/>
+            </a:effectRef>
+            <a:fontRef idx="minor">
+              <a:schemeClr val="lt1"/>
+            </a:fontRef>
+          </p:style>
+          <p:txBody>
+            <a:bodyPr rtlCol="0" anchor="ctr"/>
+            <a:lstStyle/>
+            <a:p>
+              <a:pPr algn="ctr"/>
+              <a:endParaRPr lang="en-US"/>
+            </a:p>
+          </p:txBody>
+        </p:sp>
+        <p:sp>
+          <p:nvSpPr>
+            <p:cNvPr id="88" name="TextBox 87">
+              <a:extLst>
+                <a:ext uri="{FF2B5EF4-FFF2-40B4-BE49-F238E27FC236}">
+                  <a16:creationId xmlns:a16="http://schemas.microsoft.com/office/drawing/2014/main" id="{240A1853-142E-4074-A044-1FD6E4CA565A}"/>
+                </a:ext>
+              </a:extLst>
+            </p:cNvPr>
+            <p:cNvSpPr txBox="1"/>
+            <p:nvPr/>
+          </p:nvSpPr>
+          <p:spPr>
+            <a:xfrm>
+              <a:off x="524499" y="709859"/>
+              <a:ext cx="879589" cy="369332"/>
+            </a:xfrm>
+            <a:prstGeom prst="rect">
+              <a:avLst/>
+            </a:prstGeom>
+            <a:noFill/>
+          </p:spPr>
+          <p:txBody>
+            <a:bodyPr wrap="square" rtlCol="0">
+              <a:spAutoFit/>
+            </a:bodyPr>
+            <a:lstStyle/>
+            <a:p>
+              <a:r>
+                <a:rPr lang="en-US" b="1" dirty="0">
+                  <a:solidFill>
+                    <a:schemeClr val="accent1"/>
+                  </a:solidFill>
+                </a:rPr>
+                <a:t>FEB</a:t>
+              </a:r>
+            </a:p>
+          </p:txBody>
+        </p:sp>
+      </p:grpSp>
+      <p:grpSp>
+        <p:nvGrpSpPr>
+          <p:cNvPr id="89" name="Group 88">
+            <a:extLst>
+              <a:ext uri="{FF2B5EF4-FFF2-40B4-BE49-F238E27FC236}">
+                <a16:creationId xmlns:a16="http://schemas.microsoft.com/office/drawing/2014/main" id="{EEA64B40-6117-4103-92C5-0563A61814ED}"/>
+              </a:ext>
+            </a:extLst>
+          </p:cNvPr>
+          <p:cNvGrpSpPr/>
+          <p:nvPr/>
+        </p:nvGrpSpPr>
+        <p:grpSpPr>
+          <a:xfrm>
+            <a:off x="3053990" y="1128587"/>
+            <a:ext cx="722617" cy="369332"/>
+            <a:chOff x="417250" y="709859"/>
+            <a:chExt cx="1117646" cy="369332"/>
+          </a:xfrm>
+        </p:grpSpPr>
+        <p:sp>
+          <p:nvSpPr>
+            <p:cNvPr id="90" name="Rectangle: Rounded Corners 89">
+              <a:extLst>
+                <a:ext uri="{FF2B5EF4-FFF2-40B4-BE49-F238E27FC236}">
+                  <a16:creationId xmlns:a16="http://schemas.microsoft.com/office/drawing/2014/main" id="{A1DDEC30-D127-4B25-829F-843E33349351}"/>
+                </a:ext>
+              </a:extLst>
+            </p:cNvPr>
+            <p:cNvSpPr/>
+            <p:nvPr/>
+          </p:nvSpPr>
+          <p:spPr>
+            <a:xfrm>
+              <a:off x="417250" y="744295"/>
+              <a:ext cx="1029810" cy="300458"/>
+            </a:xfrm>
+            <a:prstGeom prst="roundRect">
+              <a:avLst/>
+            </a:prstGeom>
+            <a:solidFill>
+              <a:schemeClr val="bg2"/>
+            </a:solidFill>
+            <a:ln w="19050">
+              <a:solidFill>
+                <a:schemeClr val="accent1"/>
+              </a:solidFill>
+            </a:ln>
+          </p:spPr>
+          <p:style>
+            <a:lnRef idx="2">
+              <a:schemeClr val="accent1">
+                <a:shade val="50000"/>
+              </a:schemeClr>
+            </a:lnRef>
+            <a:fillRef idx="1">
+              <a:schemeClr val="accent1"/>
+            </a:fillRef>
+            <a:effectRef idx="0">
+              <a:schemeClr val="accent1"/>
+            </a:effectRef>
+            <a:fontRef idx="minor">
+              <a:schemeClr val="lt1"/>
+            </a:fontRef>
+          </p:style>
+          <p:txBody>
+            <a:bodyPr rtlCol="0" anchor="ctr"/>
+            <a:lstStyle/>
+            <a:p>
+              <a:pPr algn="ctr"/>
+              <a:endParaRPr lang="en-US"/>
+            </a:p>
+          </p:txBody>
+        </p:sp>
+        <p:sp>
+          <p:nvSpPr>
+            <p:cNvPr id="91" name="TextBox 90">
+              <a:extLst>
+                <a:ext uri="{FF2B5EF4-FFF2-40B4-BE49-F238E27FC236}">
+                  <a16:creationId xmlns:a16="http://schemas.microsoft.com/office/drawing/2014/main" id="{97473A83-104D-4C23-840B-5470EBE40DAC}"/>
+                </a:ext>
+              </a:extLst>
+            </p:cNvPr>
+            <p:cNvSpPr txBox="1"/>
+            <p:nvPr/>
+          </p:nvSpPr>
+          <p:spPr>
+            <a:xfrm>
+              <a:off x="430923" y="709859"/>
+              <a:ext cx="1103973" cy="369332"/>
+            </a:xfrm>
+            <a:prstGeom prst="rect">
+              <a:avLst/>
+            </a:prstGeom>
+            <a:noFill/>
+          </p:spPr>
+          <p:txBody>
+            <a:bodyPr wrap="square" rtlCol="0">
+              <a:spAutoFit/>
+            </a:bodyPr>
+            <a:lstStyle/>
+            <a:p>
+              <a:r>
+                <a:rPr lang="en-US" b="1" dirty="0">
+                  <a:solidFill>
+                    <a:schemeClr val="accent1"/>
+                  </a:solidFill>
+                </a:rPr>
+                <a:t>MAR</a:t>
+              </a:r>
+            </a:p>
+          </p:txBody>
+        </p:sp>
+      </p:grpSp>
+      <p:grpSp>
+        <p:nvGrpSpPr>
+          <p:cNvPr id="92" name="Group 91">
+            <a:extLst>
+              <a:ext uri="{FF2B5EF4-FFF2-40B4-BE49-F238E27FC236}">
+                <a16:creationId xmlns:a16="http://schemas.microsoft.com/office/drawing/2014/main" id="{3C38B2DD-3A5B-484B-B6F0-C62BF53A948B}"/>
+              </a:ext>
+            </a:extLst>
+          </p:cNvPr>
+          <p:cNvGrpSpPr/>
+          <p:nvPr/>
+        </p:nvGrpSpPr>
+        <p:grpSpPr>
+          <a:xfrm>
+            <a:off x="3826848" y="1132253"/>
+            <a:ext cx="716680" cy="369332"/>
+            <a:chOff x="417250" y="709383"/>
+            <a:chExt cx="1108464" cy="369332"/>
+          </a:xfrm>
+        </p:grpSpPr>
+        <p:sp>
+          <p:nvSpPr>
+            <p:cNvPr id="93" name="Rectangle: Rounded Corners 92">
+              <a:extLst>
+                <a:ext uri="{FF2B5EF4-FFF2-40B4-BE49-F238E27FC236}">
+                  <a16:creationId xmlns:a16="http://schemas.microsoft.com/office/drawing/2014/main" id="{A229AF63-B887-4AD0-A8C6-5FD70E45FB7F}"/>
+                </a:ext>
+              </a:extLst>
+            </p:cNvPr>
+            <p:cNvSpPr/>
+            <p:nvPr/>
+          </p:nvSpPr>
+          <p:spPr>
+            <a:xfrm>
+              <a:off x="417250" y="744295"/>
+              <a:ext cx="1029810" cy="300458"/>
+            </a:xfrm>
+            <a:prstGeom prst="roundRect">
+              <a:avLst/>
+            </a:prstGeom>
+            <a:solidFill>
+              <a:schemeClr val="bg2"/>
+            </a:solidFill>
+            <a:ln w="19050">
+              <a:solidFill>
+                <a:schemeClr val="accent1"/>
+              </a:solidFill>
+            </a:ln>
+          </p:spPr>
+          <p:style>
+            <a:lnRef idx="2">
+              <a:schemeClr val="accent1">
+                <a:shade val="50000"/>
+              </a:schemeClr>
+            </a:lnRef>
+            <a:fillRef idx="1">
+              <a:schemeClr val="accent1"/>
+            </a:fillRef>
+            <a:effectRef idx="0">
+              <a:schemeClr val="accent1"/>
+            </a:effectRef>
+            <a:fontRef idx="minor">
+              <a:schemeClr val="lt1"/>
+            </a:fontRef>
+          </p:style>
+          <p:txBody>
+            <a:bodyPr rtlCol="0" anchor="ctr"/>
+            <a:lstStyle/>
+            <a:p>
+              <a:pPr algn="ctr"/>
+              <a:endParaRPr lang="en-US"/>
+            </a:p>
+          </p:txBody>
+        </p:sp>
+        <p:sp>
+          <p:nvSpPr>
+            <p:cNvPr id="94" name="TextBox 93">
+              <a:extLst>
+                <a:ext uri="{FF2B5EF4-FFF2-40B4-BE49-F238E27FC236}">
+                  <a16:creationId xmlns:a16="http://schemas.microsoft.com/office/drawing/2014/main" id="{38F3E646-71DA-4DB7-B391-A25ECF1D08D6}"/>
+                </a:ext>
+              </a:extLst>
+            </p:cNvPr>
+            <p:cNvSpPr txBox="1"/>
+            <p:nvPr/>
+          </p:nvSpPr>
+          <p:spPr>
+            <a:xfrm>
+              <a:off x="501888" y="709383"/>
+              <a:ext cx="1023826" cy="369332"/>
+            </a:xfrm>
+            <a:prstGeom prst="rect">
+              <a:avLst/>
+            </a:prstGeom>
+            <a:noFill/>
+          </p:spPr>
+          <p:txBody>
+            <a:bodyPr wrap="square" rtlCol="0">
+              <a:spAutoFit/>
+            </a:bodyPr>
+            <a:lstStyle/>
+            <a:p>
+              <a:r>
+                <a:rPr lang="en-US" b="1" dirty="0">
+                  <a:solidFill>
+                    <a:schemeClr val="accent1"/>
+                  </a:solidFill>
+                </a:rPr>
+                <a:t>APR</a:t>
+              </a:r>
+            </a:p>
+          </p:txBody>
+        </p:sp>
+      </p:grpSp>
+      <p:grpSp>
+        <p:nvGrpSpPr>
+          <p:cNvPr id="95" name="Group 94">
+            <a:extLst>
+              <a:ext uri="{FF2B5EF4-FFF2-40B4-BE49-F238E27FC236}">
+                <a16:creationId xmlns:a16="http://schemas.microsoft.com/office/drawing/2014/main" id="{5A98ABE5-B370-46EF-85EC-F137DE9481C8}"/>
+              </a:ext>
+            </a:extLst>
+          </p:cNvPr>
+          <p:cNvGrpSpPr/>
+          <p:nvPr/>
+        </p:nvGrpSpPr>
+        <p:grpSpPr>
+          <a:xfrm>
+            <a:off x="4599706" y="1117060"/>
+            <a:ext cx="665826" cy="369332"/>
+            <a:chOff x="417250" y="709859"/>
+            <a:chExt cx="1029810" cy="369332"/>
+          </a:xfrm>
+        </p:grpSpPr>
+        <p:sp>
+          <p:nvSpPr>
+            <p:cNvPr id="96" name="Rectangle: Rounded Corners 95">
+              <a:extLst>
+                <a:ext uri="{FF2B5EF4-FFF2-40B4-BE49-F238E27FC236}">
+                  <a16:creationId xmlns:a16="http://schemas.microsoft.com/office/drawing/2014/main" id="{7945A9C8-2E17-4240-A7C9-3F6E2DA04F11}"/>
+                </a:ext>
+              </a:extLst>
+            </p:cNvPr>
+            <p:cNvSpPr/>
+            <p:nvPr/>
+          </p:nvSpPr>
+          <p:spPr>
+            <a:xfrm>
+              <a:off x="417250" y="744295"/>
+              <a:ext cx="1029810" cy="300458"/>
+            </a:xfrm>
+            <a:prstGeom prst="roundRect">
+              <a:avLst/>
+            </a:prstGeom>
+            <a:solidFill>
+              <a:schemeClr val="bg2"/>
+            </a:solidFill>
+            <a:ln w="19050">
+              <a:solidFill>
+                <a:schemeClr val="accent1"/>
+              </a:solidFill>
+            </a:ln>
+          </p:spPr>
+          <p:style>
+            <a:lnRef idx="2">
+              <a:schemeClr val="accent1">
+                <a:shade val="50000"/>
+              </a:schemeClr>
+            </a:lnRef>
+            <a:fillRef idx="1">
+              <a:schemeClr val="accent1"/>
+            </a:fillRef>
+            <a:effectRef idx="0">
+              <a:schemeClr val="accent1"/>
+            </a:effectRef>
+            <a:fontRef idx="minor">
+              <a:schemeClr val="lt1"/>
+            </a:fontRef>
+          </p:style>
+          <p:txBody>
+            <a:bodyPr rtlCol="0" anchor="ctr"/>
+            <a:lstStyle/>
+            <a:p>
+              <a:pPr algn="ctr"/>
+              <a:endParaRPr lang="en-US"/>
+            </a:p>
+          </p:txBody>
+        </p:sp>
+        <p:sp>
+          <p:nvSpPr>
+            <p:cNvPr id="97" name="TextBox 96">
+              <a:extLst>
+                <a:ext uri="{FF2B5EF4-FFF2-40B4-BE49-F238E27FC236}">
+                  <a16:creationId xmlns:a16="http://schemas.microsoft.com/office/drawing/2014/main" id="{7A03E3F4-A49A-4DBD-94BC-08F0D846628E}"/>
+                </a:ext>
+              </a:extLst>
+            </p:cNvPr>
+            <p:cNvSpPr txBox="1"/>
+            <p:nvPr/>
+          </p:nvSpPr>
+          <p:spPr>
+            <a:xfrm>
+              <a:off x="429441" y="709859"/>
+              <a:ext cx="974647" cy="369332"/>
+            </a:xfrm>
+            <a:prstGeom prst="rect">
+              <a:avLst/>
+            </a:prstGeom>
+            <a:noFill/>
+          </p:spPr>
+          <p:txBody>
+            <a:bodyPr wrap="square" rtlCol="0">
+              <a:spAutoFit/>
+            </a:bodyPr>
+            <a:lstStyle/>
+            <a:p>
+              <a:r>
+                <a:rPr lang="en-US" b="1" dirty="0">
+                  <a:solidFill>
+                    <a:schemeClr val="accent1"/>
+                  </a:solidFill>
+                </a:rPr>
+                <a:t>MAY</a:t>
+              </a:r>
+            </a:p>
+          </p:txBody>
+        </p:sp>
+      </p:grpSp>
+      <p:grpSp>
+        <p:nvGrpSpPr>
+          <p:cNvPr id="98" name="Group 97">
+            <a:extLst>
+              <a:ext uri="{FF2B5EF4-FFF2-40B4-BE49-F238E27FC236}">
+                <a16:creationId xmlns:a16="http://schemas.microsoft.com/office/drawing/2014/main" id="{B9348D35-78D6-40EA-A819-D8CAFECD7F85}"/>
+              </a:ext>
+            </a:extLst>
+          </p:cNvPr>
+          <p:cNvGrpSpPr/>
+          <p:nvPr/>
+        </p:nvGrpSpPr>
+        <p:grpSpPr>
+          <a:xfrm>
+            <a:off x="5354690" y="1126354"/>
+            <a:ext cx="665826" cy="369332"/>
+            <a:chOff x="417250" y="709859"/>
+            <a:chExt cx="1029810" cy="369332"/>
+          </a:xfrm>
+        </p:grpSpPr>
+        <p:sp>
+          <p:nvSpPr>
+            <p:cNvPr id="99" name="Rectangle: Rounded Corners 98">
+              <a:extLst>
+                <a:ext uri="{FF2B5EF4-FFF2-40B4-BE49-F238E27FC236}">
+                  <a16:creationId xmlns:a16="http://schemas.microsoft.com/office/drawing/2014/main" id="{4F86E91A-85A7-41E7-9331-D015138AC06F}"/>
+                </a:ext>
+              </a:extLst>
+            </p:cNvPr>
+            <p:cNvSpPr/>
+            <p:nvPr/>
+          </p:nvSpPr>
+          <p:spPr>
+            <a:xfrm>
+              <a:off x="417250" y="744295"/>
+              <a:ext cx="1029810" cy="300458"/>
+            </a:xfrm>
+            <a:prstGeom prst="roundRect">
+              <a:avLst/>
+            </a:prstGeom>
+            <a:solidFill>
+              <a:schemeClr val="bg2"/>
+            </a:solidFill>
+            <a:ln w="19050">
+              <a:solidFill>
+                <a:schemeClr val="accent1"/>
+              </a:solidFill>
+            </a:ln>
+          </p:spPr>
+          <p:style>
+            <a:lnRef idx="2">
+              <a:schemeClr val="accent1">
+                <a:shade val="50000"/>
+              </a:schemeClr>
+            </a:lnRef>
+            <a:fillRef idx="1">
+              <a:schemeClr val="accent1"/>
+            </a:fillRef>
+            <a:effectRef idx="0">
+              <a:schemeClr val="accent1"/>
+            </a:effectRef>
+            <a:fontRef idx="minor">
+              <a:schemeClr val="lt1"/>
+            </a:fontRef>
+          </p:style>
+          <p:txBody>
+            <a:bodyPr rtlCol="0" anchor="ctr"/>
+            <a:lstStyle/>
+            <a:p>
+              <a:pPr algn="ctr"/>
+              <a:endParaRPr lang="en-US"/>
+            </a:p>
+          </p:txBody>
+        </p:sp>
+        <p:sp>
+          <p:nvSpPr>
+            <p:cNvPr id="100" name="TextBox 99">
+              <a:extLst>
+                <a:ext uri="{FF2B5EF4-FFF2-40B4-BE49-F238E27FC236}">
+                  <a16:creationId xmlns:a16="http://schemas.microsoft.com/office/drawing/2014/main" id="{E7DF9971-8CDC-4E19-9238-7DB3D06B447C}"/>
+                </a:ext>
+              </a:extLst>
+            </p:cNvPr>
+            <p:cNvSpPr txBox="1"/>
+            <p:nvPr/>
+          </p:nvSpPr>
+          <p:spPr>
+            <a:xfrm>
+              <a:off x="524499" y="709859"/>
+              <a:ext cx="879589" cy="369332"/>
+            </a:xfrm>
+            <a:prstGeom prst="rect">
+              <a:avLst/>
+            </a:prstGeom>
+            <a:noFill/>
+          </p:spPr>
+          <p:txBody>
+            <a:bodyPr wrap="square" rtlCol="0">
+              <a:spAutoFit/>
+            </a:bodyPr>
+            <a:lstStyle/>
+            <a:p>
+              <a:r>
+                <a:rPr lang="en-US" b="1" dirty="0">
+                  <a:solidFill>
+                    <a:schemeClr val="accent1"/>
+                  </a:solidFill>
+                </a:rPr>
+                <a:t>JUN</a:t>
+              </a:r>
+            </a:p>
+          </p:txBody>
+        </p:sp>
+      </p:grpSp>
+      <p:grpSp>
+        <p:nvGrpSpPr>
+          <p:cNvPr id="101" name="Group 100">
+            <a:extLst>
+              <a:ext uri="{FF2B5EF4-FFF2-40B4-BE49-F238E27FC236}">
+                <a16:creationId xmlns:a16="http://schemas.microsoft.com/office/drawing/2014/main" id="{330079AF-BF89-45A8-9E9A-E9E2C813101E}"/>
+              </a:ext>
+            </a:extLst>
+          </p:cNvPr>
+          <p:cNvGrpSpPr/>
+          <p:nvPr/>
+        </p:nvGrpSpPr>
+        <p:grpSpPr>
+          <a:xfrm>
+            <a:off x="6107646" y="1129420"/>
+            <a:ext cx="665826" cy="369332"/>
+            <a:chOff x="417250" y="709859"/>
+            <a:chExt cx="1029810" cy="369332"/>
+          </a:xfrm>
+        </p:grpSpPr>
+        <p:sp>
+          <p:nvSpPr>
+            <p:cNvPr id="102" name="Rectangle: Rounded Corners 101">
+              <a:extLst>
+                <a:ext uri="{FF2B5EF4-FFF2-40B4-BE49-F238E27FC236}">
+                  <a16:creationId xmlns:a16="http://schemas.microsoft.com/office/drawing/2014/main" id="{9F9E372C-BECB-419F-BC26-CA7675DEB941}"/>
+                </a:ext>
+              </a:extLst>
+            </p:cNvPr>
+            <p:cNvSpPr/>
+            <p:nvPr/>
+          </p:nvSpPr>
+          <p:spPr>
+            <a:xfrm>
+              <a:off x="417250" y="744295"/>
+              <a:ext cx="1029810" cy="300458"/>
+            </a:xfrm>
+            <a:prstGeom prst="roundRect">
+              <a:avLst/>
+            </a:prstGeom>
+            <a:solidFill>
+              <a:schemeClr val="bg2"/>
+            </a:solidFill>
+            <a:ln w="19050">
+              <a:solidFill>
+                <a:schemeClr val="accent1"/>
+              </a:solidFill>
+            </a:ln>
+          </p:spPr>
+          <p:style>
+            <a:lnRef idx="2">
+              <a:schemeClr val="accent1">
+                <a:shade val="50000"/>
+              </a:schemeClr>
+            </a:lnRef>
+            <a:fillRef idx="1">
+              <a:schemeClr val="accent1"/>
+            </a:fillRef>
+            <a:effectRef idx="0">
+              <a:schemeClr val="accent1"/>
+            </a:effectRef>
+            <a:fontRef idx="minor">
+              <a:schemeClr val="lt1"/>
+            </a:fontRef>
+          </p:style>
+          <p:txBody>
+            <a:bodyPr rtlCol="0" anchor="ctr"/>
+            <a:lstStyle/>
+            <a:p>
+              <a:pPr algn="ctr"/>
+              <a:endParaRPr lang="en-US"/>
+            </a:p>
+          </p:txBody>
+        </p:sp>
+        <p:sp>
+          <p:nvSpPr>
+            <p:cNvPr id="103" name="TextBox 102">
+              <a:extLst>
+                <a:ext uri="{FF2B5EF4-FFF2-40B4-BE49-F238E27FC236}">
+                  <a16:creationId xmlns:a16="http://schemas.microsoft.com/office/drawing/2014/main" id="{1A453B9A-08F5-4B13-8B01-A997A75DF0A0}"/>
+                </a:ext>
+              </a:extLst>
+            </p:cNvPr>
+            <p:cNvSpPr txBox="1"/>
+            <p:nvPr/>
+          </p:nvSpPr>
+          <p:spPr>
+            <a:xfrm>
+              <a:off x="524499" y="709859"/>
+              <a:ext cx="879589" cy="369332"/>
+            </a:xfrm>
+            <a:prstGeom prst="rect">
+              <a:avLst/>
+            </a:prstGeom>
+            <a:noFill/>
+          </p:spPr>
+          <p:txBody>
+            <a:bodyPr wrap="square" rtlCol="0">
+              <a:spAutoFit/>
+            </a:bodyPr>
+            <a:lstStyle/>
+            <a:p>
+              <a:r>
+                <a:rPr lang="en-US" b="1" dirty="0">
+                  <a:solidFill>
+                    <a:schemeClr val="accent1"/>
+                  </a:solidFill>
+                </a:rPr>
+                <a:t>JUL</a:t>
+              </a:r>
+            </a:p>
+          </p:txBody>
+        </p:sp>
+      </p:grpSp>
+      <p:grpSp>
+        <p:nvGrpSpPr>
+          <p:cNvPr id="104" name="Group 103">
+            <a:extLst>
+              <a:ext uri="{FF2B5EF4-FFF2-40B4-BE49-F238E27FC236}">
+                <a16:creationId xmlns:a16="http://schemas.microsoft.com/office/drawing/2014/main" id="{0DB0149A-7DC9-40A0-B8B4-C832132AF218}"/>
+              </a:ext>
+            </a:extLst>
+          </p:cNvPr>
+          <p:cNvGrpSpPr/>
+          <p:nvPr/>
+        </p:nvGrpSpPr>
+        <p:grpSpPr>
+          <a:xfrm>
+            <a:off x="6865272" y="1122304"/>
+            <a:ext cx="665826" cy="369332"/>
+            <a:chOff x="417250" y="692337"/>
+            <a:chExt cx="1029810" cy="369332"/>
+          </a:xfrm>
+        </p:grpSpPr>
+        <p:sp>
+          <p:nvSpPr>
+            <p:cNvPr id="105" name="Rectangle: Rounded Corners 104">
+              <a:extLst>
+                <a:ext uri="{FF2B5EF4-FFF2-40B4-BE49-F238E27FC236}">
+                  <a16:creationId xmlns:a16="http://schemas.microsoft.com/office/drawing/2014/main" id="{16B8D4AC-C843-4C0B-8D08-A8F39AD25DA7}"/>
+                </a:ext>
+              </a:extLst>
+            </p:cNvPr>
+            <p:cNvSpPr/>
+            <p:nvPr/>
+          </p:nvSpPr>
+          <p:spPr>
+            <a:xfrm>
+              <a:off x="417250" y="744295"/>
+              <a:ext cx="1029810" cy="300458"/>
+            </a:xfrm>
+            <a:prstGeom prst="roundRect">
+              <a:avLst/>
+            </a:prstGeom>
+            <a:solidFill>
+              <a:schemeClr val="bg2"/>
+            </a:solidFill>
+            <a:ln w="19050">
+              <a:solidFill>
+                <a:schemeClr val="accent1"/>
+              </a:solidFill>
+            </a:ln>
+          </p:spPr>
+          <p:style>
+            <a:lnRef idx="2">
+              <a:schemeClr val="accent1">
+                <a:shade val="50000"/>
+              </a:schemeClr>
+            </a:lnRef>
+            <a:fillRef idx="1">
+              <a:schemeClr val="accent1"/>
+            </a:fillRef>
+            <a:effectRef idx="0">
+              <a:schemeClr val="accent1"/>
+            </a:effectRef>
+            <a:fontRef idx="minor">
+              <a:schemeClr val="lt1"/>
+            </a:fontRef>
+          </p:style>
+          <p:txBody>
+            <a:bodyPr rtlCol="0" anchor="ctr"/>
+            <a:lstStyle/>
+            <a:p>
+              <a:pPr algn="ctr"/>
+              <a:endParaRPr lang="en-US"/>
+            </a:p>
+          </p:txBody>
+        </p:sp>
+        <p:sp>
+          <p:nvSpPr>
+            <p:cNvPr id="106" name="TextBox 105">
+              <a:extLst>
+                <a:ext uri="{FF2B5EF4-FFF2-40B4-BE49-F238E27FC236}">
+                  <a16:creationId xmlns:a16="http://schemas.microsoft.com/office/drawing/2014/main" id="{0FF47F45-B868-412E-8C4E-5C0240BB7FDE}"/>
+                </a:ext>
+              </a:extLst>
+            </p:cNvPr>
+            <p:cNvSpPr txBox="1"/>
+            <p:nvPr/>
+          </p:nvSpPr>
+          <p:spPr>
+            <a:xfrm>
+              <a:off x="469404" y="692337"/>
+              <a:ext cx="977656" cy="369332"/>
+            </a:xfrm>
+            <a:prstGeom prst="rect">
+              <a:avLst/>
+            </a:prstGeom>
+            <a:noFill/>
+          </p:spPr>
+          <p:txBody>
+            <a:bodyPr wrap="square" rtlCol="0">
+              <a:spAutoFit/>
+            </a:bodyPr>
+            <a:lstStyle/>
+            <a:p>
+              <a:r>
+                <a:rPr lang="en-US" b="1" dirty="0">
+                  <a:solidFill>
+                    <a:schemeClr val="accent1"/>
+                  </a:solidFill>
+                </a:rPr>
+                <a:t>AUG</a:t>
+              </a:r>
+            </a:p>
+          </p:txBody>
+        </p:sp>
+      </p:grpSp>
+      <p:grpSp>
+        <p:nvGrpSpPr>
+          <p:cNvPr id="107" name="Group 106">
+            <a:extLst>
+              <a:ext uri="{FF2B5EF4-FFF2-40B4-BE49-F238E27FC236}">
+                <a16:creationId xmlns:a16="http://schemas.microsoft.com/office/drawing/2014/main" id="{DAD136B9-A888-4E99-AC02-0C9A476E0FC4}"/>
+              </a:ext>
+            </a:extLst>
+          </p:cNvPr>
+          <p:cNvGrpSpPr/>
+          <p:nvPr/>
+        </p:nvGrpSpPr>
+        <p:grpSpPr>
+          <a:xfrm>
+            <a:off x="7650682" y="1132548"/>
+            <a:ext cx="665826" cy="369332"/>
+            <a:chOff x="417250" y="709859"/>
+            <a:chExt cx="1029810" cy="369332"/>
+          </a:xfrm>
+        </p:grpSpPr>
+        <p:sp>
+          <p:nvSpPr>
+            <p:cNvPr id="108" name="Rectangle: Rounded Corners 107">
+              <a:extLst>
+                <a:ext uri="{FF2B5EF4-FFF2-40B4-BE49-F238E27FC236}">
+                  <a16:creationId xmlns:a16="http://schemas.microsoft.com/office/drawing/2014/main" id="{72B1970A-101B-4909-944A-4AE5FF55B8A7}"/>
+                </a:ext>
+              </a:extLst>
+            </p:cNvPr>
+            <p:cNvSpPr/>
+            <p:nvPr/>
+          </p:nvSpPr>
+          <p:spPr>
+            <a:xfrm>
+              <a:off x="417250" y="744295"/>
+              <a:ext cx="1029810" cy="300458"/>
+            </a:xfrm>
+            <a:prstGeom prst="roundRect">
+              <a:avLst/>
+            </a:prstGeom>
+            <a:solidFill>
+              <a:schemeClr val="accent1"/>
+            </a:solidFill>
+            <a:ln w="19050">
+              <a:solidFill>
+                <a:schemeClr val="accent1"/>
+              </a:solidFill>
+            </a:ln>
+          </p:spPr>
+          <p:style>
+            <a:lnRef idx="2">
+              <a:schemeClr val="accent1">
+                <a:shade val="50000"/>
+              </a:schemeClr>
+            </a:lnRef>
+            <a:fillRef idx="1">
+              <a:schemeClr val="accent1"/>
+            </a:fillRef>
+            <a:effectRef idx="0">
+              <a:schemeClr val="accent1"/>
+            </a:effectRef>
+            <a:fontRef idx="minor">
+              <a:schemeClr val="lt1"/>
+            </a:fontRef>
+          </p:style>
+          <p:txBody>
+            <a:bodyPr rtlCol="0" anchor="ctr"/>
+            <a:lstStyle/>
+            <a:p>
+              <a:pPr algn="ctr"/>
+              <a:endParaRPr lang="en-US"/>
+            </a:p>
+          </p:txBody>
+        </p:sp>
+        <p:sp>
+          <p:nvSpPr>
+            <p:cNvPr id="109" name="TextBox 108">
+              <a:extLst>
+                <a:ext uri="{FF2B5EF4-FFF2-40B4-BE49-F238E27FC236}">
+                  <a16:creationId xmlns:a16="http://schemas.microsoft.com/office/drawing/2014/main" id="{36E1F8A8-BA02-4824-9C2C-175C85776985}"/>
+                </a:ext>
+              </a:extLst>
+            </p:cNvPr>
+            <p:cNvSpPr txBox="1"/>
+            <p:nvPr/>
+          </p:nvSpPr>
+          <p:spPr>
+            <a:xfrm>
+              <a:off x="524499" y="709859"/>
+              <a:ext cx="879589" cy="369332"/>
+            </a:xfrm>
+            <a:prstGeom prst="rect">
+              <a:avLst/>
+            </a:prstGeom>
+            <a:noFill/>
+          </p:spPr>
+          <p:txBody>
+            <a:bodyPr wrap="square" rtlCol="0">
+              <a:spAutoFit/>
+            </a:bodyPr>
+            <a:lstStyle/>
+            <a:p>
+              <a:r>
+                <a:rPr lang="en-US" b="1" dirty="0">
+                  <a:solidFill>
+                    <a:schemeClr val="bg1"/>
+                  </a:solidFill>
+                </a:rPr>
+                <a:t>SEP</a:t>
+              </a:r>
+            </a:p>
+          </p:txBody>
+        </p:sp>
+      </p:grpSp>
+      <p:grpSp>
+        <p:nvGrpSpPr>
+          <p:cNvPr id="110" name="Group 109">
+            <a:extLst>
+              <a:ext uri="{FF2B5EF4-FFF2-40B4-BE49-F238E27FC236}">
+                <a16:creationId xmlns:a16="http://schemas.microsoft.com/office/drawing/2014/main" id="{96B646AD-0D47-465C-9CB2-7304A9E320F0}"/>
+              </a:ext>
+            </a:extLst>
+          </p:cNvPr>
+          <p:cNvGrpSpPr/>
+          <p:nvPr/>
+        </p:nvGrpSpPr>
+        <p:grpSpPr>
+          <a:xfrm>
+            <a:off x="8404572" y="1124196"/>
+            <a:ext cx="677646" cy="369332"/>
+            <a:chOff x="417250" y="709859"/>
+            <a:chExt cx="1048091" cy="369332"/>
+          </a:xfrm>
+        </p:grpSpPr>
+        <p:sp>
+          <p:nvSpPr>
+            <p:cNvPr id="111" name="Rectangle: Rounded Corners 110">
+              <a:extLst>
+                <a:ext uri="{FF2B5EF4-FFF2-40B4-BE49-F238E27FC236}">
+                  <a16:creationId xmlns:a16="http://schemas.microsoft.com/office/drawing/2014/main" id="{7CE9F136-5951-4428-9D3A-DC329A0FD9F4}"/>
+                </a:ext>
+              </a:extLst>
+            </p:cNvPr>
+            <p:cNvSpPr/>
+            <p:nvPr/>
+          </p:nvSpPr>
+          <p:spPr>
+            <a:xfrm>
+              <a:off x="417250" y="744295"/>
+              <a:ext cx="1029810" cy="300458"/>
+            </a:xfrm>
+            <a:prstGeom prst="roundRect">
+              <a:avLst/>
+            </a:prstGeom>
+            <a:solidFill>
+              <a:schemeClr val="bg2"/>
+            </a:solidFill>
+            <a:ln w="19050">
+              <a:solidFill>
+                <a:schemeClr val="accent1"/>
+              </a:solidFill>
+            </a:ln>
+          </p:spPr>
+          <p:style>
+            <a:lnRef idx="2">
+              <a:schemeClr val="accent1">
+                <a:shade val="50000"/>
+              </a:schemeClr>
+            </a:lnRef>
+            <a:fillRef idx="1">
+              <a:schemeClr val="accent1"/>
+            </a:fillRef>
+            <a:effectRef idx="0">
+              <a:schemeClr val="accent1"/>
+            </a:effectRef>
+            <a:fontRef idx="minor">
+              <a:schemeClr val="lt1"/>
+            </a:fontRef>
+          </p:style>
+          <p:txBody>
+            <a:bodyPr rtlCol="0" anchor="ctr"/>
+            <a:lstStyle/>
+            <a:p>
+              <a:pPr algn="ctr"/>
+              <a:endParaRPr lang="en-US"/>
+            </a:p>
+          </p:txBody>
+        </p:sp>
+        <p:sp>
+          <p:nvSpPr>
+            <p:cNvPr id="112" name="TextBox 111">
+              <a:extLst>
+                <a:ext uri="{FF2B5EF4-FFF2-40B4-BE49-F238E27FC236}">
+                  <a16:creationId xmlns:a16="http://schemas.microsoft.com/office/drawing/2014/main" id="{99794622-DE28-41A1-A454-1AD4D7BDB3D8}"/>
+                </a:ext>
+              </a:extLst>
+            </p:cNvPr>
+            <p:cNvSpPr txBox="1"/>
+            <p:nvPr/>
+          </p:nvSpPr>
+          <p:spPr>
+            <a:xfrm>
+              <a:off x="487685" y="709859"/>
+              <a:ext cx="977656" cy="369332"/>
+            </a:xfrm>
+            <a:prstGeom prst="rect">
+              <a:avLst/>
+            </a:prstGeom>
+            <a:noFill/>
+          </p:spPr>
+          <p:txBody>
+            <a:bodyPr wrap="square" rtlCol="0">
+              <a:spAutoFit/>
+            </a:bodyPr>
+            <a:lstStyle/>
+            <a:p>
+              <a:r>
+                <a:rPr lang="en-US" b="1" dirty="0">
+                  <a:solidFill>
+                    <a:schemeClr val="accent1"/>
+                  </a:solidFill>
+                </a:rPr>
+                <a:t>OCT</a:t>
+              </a:r>
+            </a:p>
+          </p:txBody>
+        </p:sp>
+      </p:grpSp>
+      <p:grpSp>
+        <p:nvGrpSpPr>
+          <p:cNvPr id="113" name="Group 112">
+            <a:extLst>
+              <a:ext uri="{FF2B5EF4-FFF2-40B4-BE49-F238E27FC236}">
+                <a16:creationId xmlns:a16="http://schemas.microsoft.com/office/drawing/2014/main" id="{A9B0AE66-6BE3-41FC-BE1E-FD2D4E5E6125}"/>
+              </a:ext>
+            </a:extLst>
+          </p:cNvPr>
+          <p:cNvGrpSpPr/>
+          <p:nvPr/>
+        </p:nvGrpSpPr>
+        <p:grpSpPr>
+          <a:xfrm>
+            <a:off x="9192342" y="1126354"/>
+            <a:ext cx="721878" cy="369332"/>
+            <a:chOff x="417250" y="709858"/>
+            <a:chExt cx="1116503" cy="369332"/>
+          </a:xfrm>
+        </p:grpSpPr>
+        <p:sp>
+          <p:nvSpPr>
+            <p:cNvPr id="114" name="Rectangle: Rounded Corners 113">
+              <a:extLst>
+                <a:ext uri="{FF2B5EF4-FFF2-40B4-BE49-F238E27FC236}">
+                  <a16:creationId xmlns:a16="http://schemas.microsoft.com/office/drawing/2014/main" id="{DF500431-C38A-4D37-BA77-9E3CAA7A3DCC}"/>
+                </a:ext>
+              </a:extLst>
+            </p:cNvPr>
+            <p:cNvSpPr/>
+            <p:nvPr/>
+          </p:nvSpPr>
+          <p:spPr>
+            <a:xfrm>
+              <a:off x="417250" y="744295"/>
+              <a:ext cx="1029810" cy="300458"/>
+            </a:xfrm>
+            <a:prstGeom prst="roundRect">
+              <a:avLst/>
+            </a:prstGeom>
+            <a:solidFill>
+              <a:schemeClr val="bg2"/>
+            </a:solidFill>
+            <a:ln w="19050">
+              <a:solidFill>
+                <a:schemeClr val="accent1"/>
+              </a:solidFill>
+            </a:ln>
+          </p:spPr>
+          <p:style>
+            <a:lnRef idx="2">
+              <a:schemeClr val="accent1">
+                <a:shade val="50000"/>
+              </a:schemeClr>
+            </a:lnRef>
+            <a:fillRef idx="1">
+              <a:schemeClr val="accent1"/>
+            </a:fillRef>
+            <a:effectRef idx="0">
+              <a:schemeClr val="accent1"/>
+            </a:effectRef>
+            <a:fontRef idx="minor">
+              <a:schemeClr val="lt1"/>
+            </a:fontRef>
+          </p:style>
+          <p:txBody>
+            <a:bodyPr rtlCol="0" anchor="ctr"/>
+            <a:lstStyle/>
+            <a:p>
+              <a:pPr algn="ctr"/>
+              <a:endParaRPr lang="en-US"/>
+            </a:p>
+          </p:txBody>
+        </p:sp>
+        <p:sp>
+          <p:nvSpPr>
+            <p:cNvPr id="115" name="TextBox 114">
+              <a:extLst>
+                <a:ext uri="{FF2B5EF4-FFF2-40B4-BE49-F238E27FC236}">
+                  <a16:creationId xmlns:a16="http://schemas.microsoft.com/office/drawing/2014/main" id="{221EE6FC-25D3-4198-BB13-712AB0015EDF}"/>
+                </a:ext>
+              </a:extLst>
+            </p:cNvPr>
+            <p:cNvSpPr txBox="1"/>
+            <p:nvPr/>
+          </p:nvSpPr>
+          <p:spPr>
+            <a:xfrm>
+              <a:off x="471805" y="709858"/>
+              <a:ext cx="1061948" cy="369332"/>
+            </a:xfrm>
+            <a:prstGeom prst="rect">
+              <a:avLst/>
+            </a:prstGeom>
+            <a:noFill/>
+          </p:spPr>
+          <p:txBody>
+            <a:bodyPr wrap="square" rtlCol="0">
+              <a:spAutoFit/>
+            </a:bodyPr>
+            <a:lstStyle/>
+            <a:p>
+              <a:r>
+                <a:rPr lang="en-US" b="1" dirty="0">
+                  <a:solidFill>
+                    <a:schemeClr val="accent1"/>
+                  </a:solidFill>
+                </a:rPr>
+                <a:t>NOV</a:t>
+              </a:r>
+            </a:p>
+          </p:txBody>
+        </p:sp>
+      </p:grpSp>
+      <p:grpSp>
+        <p:nvGrpSpPr>
+          <p:cNvPr id="116" name="Group 115">
+            <a:extLst>
+              <a:ext uri="{FF2B5EF4-FFF2-40B4-BE49-F238E27FC236}">
+                <a16:creationId xmlns:a16="http://schemas.microsoft.com/office/drawing/2014/main" id="{E346EE15-297D-43A6-9AB0-D394EB17ABEA}"/>
+              </a:ext>
+            </a:extLst>
+          </p:cNvPr>
+          <p:cNvGrpSpPr/>
+          <p:nvPr/>
+        </p:nvGrpSpPr>
+        <p:grpSpPr>
+          <a:xfrm>
+            <a:off x="9976838" y="1127683"/>
+            <a:ext cx="721878" cy="369332"/>
+            <a:chOff x="417250" y="709858"/>
+            <a:chExt cx="1116503" cy="369332"/>
+          </a:xfrm>
+        </p:grpSpPr>
+        <p:sp>
+          <p:nvSpPr>
+            <p:cNvPr id="117" name="Rectangle: Rounded Corners 116">
+              <a:extLst>
+                <a:ext uri="{FF2B5EF4-FFF2-40B4-BE49-F238E27FC236}">
+                  <a16:creationId xmlns:a16="http://schemas.microsoft.com/office/drawing/2014/main" id="{BCB19677-5900-4B6B-8B15-032824540504}"/>
+                </a:ext>
+              </a:extLst>
+            </p:cNvPr>
+            <p:cNvSpPr/>
+            <p:nvPr/>
+          </p:nvSpPr>
+          <p:spPr>
+            <a:xfrm>
+              <a:off x="417250" y="744295"/>
+              <a:ext cx="1029810" cy="300458"/>
+            </a:xfrm>
+            <a:prstGeom prst="roundRect">
+              <a:avLst/>
+            </a:prstGeom>
+            <a:solidFill>
+              <a:schemeClr val="bg2"/>
+            </a:solidFill>
+            <a:ln w="19050">
+              <a:solidFill>
+                <a:schemeClr val="accent1"/>
+              </a:solidFill>
+            </a:ln>
+          </p:spPr>
+          <p:style>
+            <a:lnRef idx="2">
+              <a:schemeClr val="accent1">
+                <a:shade val="50000"/>
+              </a:schemeClr>
+            </a:lnRef>
+            <a:fillRef idx="1">
+              <a:schemeClr val="accent1"/>
+            </a:fillRef>
+            <a:effectRef idx="0">
+              <a:schemeClr val="accent1"/>
+            </a:effectRef>
+            <a:fontRef idx="minor">
+              <a:schemeClr val="lt1"/>
+            </a:fontRef>
+          </p:style>
+          <p:txBody>
+            <a:bodyPr rtlCol="0" anchor="ctr"/>
+            <a:lstStyle/>
+            <a:p>
+              <a:pPr algn="ctr"/>
+              <a:endParaRPr lang="en-US"/>
+            </a:p>
+          </p:txBody>
+        </p:sp>
+        <p:sp>
+          <p:nvSpPr>
+            <p:cNvPr id="118" name="TextBox 117">
+              <a:extLst>
+                <a:ext uri="{FF2B5EF4-FFF2-40B4-BE49-F238E27FC236}">
+                  <a16:creationId xmlns:a16="http://schemas.microsoft.com/office/drawing/2014/main" id="{E891702C-4499-43F3-ACEC-B55FD4BAA414}"/>
+                </a:ext>
+              </a:extLst>
+            </p:cNvPr>
+            <p:cNvSpPr txBox="1"/>
+            <p:nvPr/>
+          </p:nvSpPr>
+          <p:spPr>
+            <a:xfrm>
+              <a:off x="471805" y="709858"/>
+              <a:ext cx="1061948" cy="369332"/>
+            </a:xfrm>
+            <a:prstGeom prst="rect">
+              <a:avLst/>
+            </a:prstGeom>
+            <a:noFill/>
+          </p:spPr>
+          <p:txBody>
+            <a:bodyPr wrap="square" rtlCol="0">
+              <a:spAutoFit/>
+            </a:bodyPr>
+            <a:lstStyle/>
+            <a:p>
+              <a:r>
+                <a:rPr lang="en-US" b="1" dirty="0">
+                  <a:solidFill>
+                    <a:schemeClr val="accent1"/>
+                  </a:solidFill>
+                </a:rPr>
+                <a:t>DEC</a:t>
+              </a:r>
+            </a:p>
+          </p:txBody>
+        </p:sp>
+      </p:grpSp>
+      <p:grpSp>
+        <p:nvGrpSpPr>
+          <p:cNvPr id="119" name="Group 118">
+            <a:extLst>
+              <a:ext uri="{FF2B5EF4-FFF2-40B4-BE49-F238E27FC236}">
+                <a16:creationId xmlns:a16="http://schemas.microsoft.com/office/drawing/2014/main" id="{3E022D91-2E2F-419C-865C-0E77F3EFE95B}"/>
+              </a:ext>
+            </a:extLst>
+          </p:cNvPr>
+          <p:cNvGrpSpPr/>
+          <p:nvPr/>
+        </p:nvGrpSpPr>
+        <p:grpSpPr>
+          <a:xfrm>
+            <a:off x="10596874" y="712365"/>
+            <a:ext cx="1029810" cy="369332"/>
+            <a:chOff x="417250" y="709858"/>
+            <a:chExt cx="1029810" cy="369332"/>
+          </a:xfrm>
+        </p:grpSpPr>
+        <p:sp>
+          <p:nvSpPr>
+            <p:cNvPr id="120" name="Rectangle: Rounded Corners 119">
+              <a:extLst>
+                <a:ext uri="{FF2B5EF4-FFF2-40B4-BE49-F238E27FC236}">
+                  <a16:creationId xmlns:a16="http://schemas.microsoft.com/office/drawing/2014/main" id="{69531D66-A195-4535-A69F-2AE2A923982F}"/>
+                </a:ext>
+              </a:extLst>
+            </p:cNvPr>
+            <p:cNvSpPr/>
+            <p:nvPr/>
+          </p:nvSpPr>
+          <p:spPr>
+            <a:xfrm>
+              <a:off x="417250" y="752710"/>
+              <a:ext cx="1029810" cy="300458"/>
+            </a:xfrm>
+            <a:prstGeom prst="roundRect">
+              <a:avLst/>
+            </a:prstGeom>
+            <a:solidFill>
+              <a:schemeClr val="bg2"/>
+            </a:solidFill>
+            <a:ln w="19050">
+              <a:solidFill>
+                <a:schemeClr val="accent1"/>
+              </a:solidFill>
+            </a:ln>
+          </p:spPr>
+          <p:style>
+            <a:lnRef idx="2">
+              <a:schemeClr val="accent1">
+                <a:shade val="50000"/>
+              </a:schemeClr>
+            </a:lnRef>
+            <a:fillRef idx="1">
+              <a:schemeClr val="accent1"/>
+            </a:fillRef>
+            <a:effectRef idx="0">
+              <a:schemeClr val="accent1"/>
+            </a:effectRef>
+            <a:fontRef idx="minor">
+              <a:schemeClr val="lt1"/>
+            </a:fontRef>
+          </p:style>
+          <p:txBody>
+            <a:bodyPr rtlCol="0" anchor="ctr"/>
+            <a:lstStyle/>
+            <a:p>
+              <a:pPr algn="ctr"/>
+              <a:endParaRPr lang="en-US"/>
+            </a:p>
+          </p:txBody>
+        </p:sp>
+        <p:sp>
+          <p:nvSpPr>
+            <p:cNvPr id="121" name="TextBox 120">
+              <a:extLst>
+                <a:ext uri="{FF2B5EF4-FFF2-40B4-BE49-F238E27FC236}">
+                  <a16:creationId xmlns:a16="http://schemas.microsoft.com/office/drawing/2014/main" id="{700832D1-7B17-49DD-91A4-1F975E07A320}"/>
+                </a:ext>
+              </a:extLst>
+            </p:cNvPr>
+            <p:cNvSpPr txBox="1"/>
+            <p:nvPr/>
+          </p:nvSpPr>
+          <p:spPr>
+            <a:xfrm>
+              <a:off x="614778" y="709858"/>
+              <a:ext cx="652509" cy="369332"/>
+            </a:xfrm>
+            <a:prstGeom prst="rect">
+              <a:avLst/>
+            </a:prstGeom>
+            <a:noFill/>
+          </p:spPr>
+          <p:txBody>
+            <a:bodyPr wrap="square" rtlCol="0">
+              <a:spAutoFit/>
+            </a:bodyPr>
+            <a:lstStyle/>
+            <a:p>
+              <a:r>
+                <a:rPr lang="en-US" b="1" dirty="0">
+                  <a:solidFill>
+                    <a:schemeClr val="accent1"/>
+                  </a:solidFill>
+                </a:rPr>
+                <a:t>2027</a:t>
+              </a:r>
+            </a:p>
+          </p:txBody>
+        </p:sp>
+      </p:grpSp>
+      <p:sp>
+        <p:nvSpPr>
+          <p:cNvPr id="122" name="Isosceles Triangle 121">
+            <a:extLst>
+              <a:ext uri="{FF2B5EF4-FFF2-40B4-BE49-F238E27FC236}">
+                <a16:creationId xmlns:a16="http://schemas.microsoft.com/office/drawing/2014/main" id="{1E872384-0DC9-4C8C-8B5E-4B1CAFE25027}"/>
+              </a:ext>
+            </a:extLst>
+          </p:cNvPr>
+          <p:cNvSpPr/>
+          <p:nvPr/>
+        </p:nvSpPr>
+        <p:spPr>
+          <a:xfrm rot="5400000">
+            <a:off x="11880570" y="789049"/>
+            <a:ext cx="177553" cy="233091"/>
+          </a:xfrm>
+          <a:prstGeom prst="triangle">
+            <a:avLst/>
+          </a:prstGeom>
+          <a:solidFill>
+            <a:schemeClr val="bg1"/>
+          </a:solidFill>
+        </p:spPr>
+        <p:style>
+          <a:lnRef idx="2">
+            <a:schemeClr val="accent1">
+              <a:shade val="50000"/>
+            </a:schemeClr>
+          </a:lnRef>
+          <a:fillRef idx="1">
+            <a:schemeClr val="accent1"/>
+          </a:fillRef>
+          <a:effectRef idx="0">
+            <a:schemeClr val="accent1"/>
+          </a:effectRef>
+          <a:fontRef idx="minor">
+            <a:schemeClr val="lt1"/>
+          </a:fontRef>
+        </p:style>
+        <p:txBody>
+          <a:bodyPr rtlCol="0" anchor="ctr"/>
+          <a:lstStyle/>
+          <a:p>
+            <a:pPr algn="ctr"/>
+            <a:endParaRPr lang="en-US"/>
+          </a:p>
+        </p:txBody>
+      </p:sp>
+      <p:sp>
+        <p:nvSpPr>
+          <p:cNvPr id="123" name="Isosceles Triangle 122">
+            <a:extLst>
+              <a:ext uri="{FF2B5EF4-FFF2-40B4-BE49-F238E27FC236}">
+                <a16:creationId xmlns:a16="http://schemas.microsoft.com/office/drawing/2014/main" id="{CAE95EC5-F28D-4515-A249-9DCB3ABEA343}"/>
+              </a:ext>
+            </a:extLst>
+          </p:cNvPr>
+          <p:cNvSpPr/>
+          <p:nvPr/>
+        </p:nvSpPr>
+        <p:spPr>
+          <a:xfrm rot="16200000">
+            <a:off x="140268" y="789049"/>
+            <a:ext cx="177553" cy="233091"/>
+          </a:xfrm>
+          <a:prstGeom prst="triangle">
+            <a:avLst/>
+          </a:prstGeom>
+          <a:solidFill>
+            <a:schemeClr val="bg1"/>
+          </a:solidFill>
+        </p:spPr>
+        <p:style>
+          <a:lnRef idx="2">
+            <a:schemeClr val="accent1">
+              <a:shade val="50000"/>
+            </a:schemeClr>
+          </a:lnRef>
+          <a:fillRef idx="1">
+            <a:schemeClr val="accent1"/>
+          </a:fillRef>
+          <a:effectRef idx="0">
+            <a:schemeClr val="accent1"/>
+          </a:effectRef>
+          <a:fontRef idx="minor">
+            <a:schemeClr val="lt1"/>
+          </a:fontRef>
+        </p:style>
+        <p:txBody>
+          <a:bodyPr rtlCol="0" anchor="ctr"/>
+          <a:lstStyle/>
+          <a:p>
+            <a:pPr algn="ctr"/>
+            <a:endParaRPr lang="en-US"/>
+          </a:p>
+        </p:txBody>
+      </p:sp>
+    </p:spTree>
+    <p:extLst>
+      <p:ext uri="{BB962C8B-B14F-4D97-AF65-F5344CB8AC3E}">
+        <p14:creationId xmlns:p14="http://schemas.microsoft.com/office/powerpoint/2010/main" val="4122203364"/>
+      </p:ext>
+    </p:extLst>
+  </p:cSld>
+  <p:clrMapOvr>
+    <a:masterClrMapping/>
+  </p:clrMapOvr>
+</p:sld>
+</file>
+
 <file path=ppt/theme/theme1.xml><?xml version="1.0" encoding="utf-8"?>
 <a:theme xmlns:a="http://schemas.openxmlformats.org/drawingml/2006/main" name="Office Theme">
   <a:themeElements>

</xml_diff>

<commit_message>
Updates to the tracker screen
</commit_message>
<xml_diff>
--- a/Goal Tracker App - Screens.pptx
+++ b/Goal Tracker App - Screens.pptx
@@ -264,7 +264,7 @@
           <a:p>
             <a:fld id="{0938498D-1C41-419D-AAE9-C19D57E0856E}" type="datetimeFigureOut">
               <a:rPr lang="en-CA" smtClean="0"/>
-              <a:t>2023-09-11</a:t>
+              <a:t>2023-09-19</a:t>
             </a:fld>
             <a:endParaRPr lang="en-CA"/>
           </a:p>
@@ -464,7 +464,7 @@
           <a:p>
             <a:fld id="{0938498D-1C41-419D-AAE9-C19D57E0856E}" type="datetimeFigureOut">
               <a:rPr lang="en-CA" smtClean="0"/>
-              <a:t>2023-09-11</a:t>
+              <a:t>2023-09-19</a:t>
             </a:fld>
             <a:endParaRPr lang="en-CA"/>
           </a:p>
@@ -674,7 +674,7 @@
           <a:p>
             <a:fld id="{0938498D-1C41-419D-AAE9-C19D57E0856E}" type="datetimeFigureOut">
               <a:rPr lang="en-CA" smtClean="0"/>
-              <a:t>2023-09-11</a:t>
+              <a:t>2023-09-19</a:t>
             </a:fld>
             <a:endParaRPr lang="en-CA"/>
           </a:p>
@@ -874,7 +874,7 @@
           <a:p>
             <a:fld id="{0938498D-1C41-419D-AAE9-C19D57E0856E}" type="datetimeFigureOut">
               <a:rPr lang="en-CA" smtClean="0"/>
-              <a:t>2023-09-11</a:t>
+              <a:t>2023-09-19</a:t>
             </a:fld>
             <a:endParaRPr lang="en-CA"/>
           </a:p>
@@ -1150,7 +1150,7 @@
           <a:p>
             <a:fld id="{0938498D-1C41-419D-AAE9-C19D57E0856E}" type="datetimeFigureOut">
               <a:rPr lang="en-CA" smtClean="0"/>
-              <a:t>2023-09-11</a:t>
+              <a:t>2023-09-19</a:t>
             </a:fld>
             <a:endParaRPr lang="en-CA"/>
           </a:p>
@@ -1418,7 +1418,7 @@
           <a:p>
             <a:fld id="{0938498D-1C41-419D-AAE9-C19D57E0856E}" type="datetimeFigureOut">
               <a:rPr lang="en-CA" smtClean="0"/>
-              <a:t>2023-09-11</a:t>
+              <a:t>2023-09-19</a:t>
             </a:fld>
             <a:endParaRPr lang="en-CA"/>
           </a:p>
@@ -1833,7 +1833,7 @@
           <a:p>
             <a:fld id="{0938498D-1C41-419D-AAE9-C19D57E0856E}" type="datetimeFigureOut">
               <a:rPr lang="en-CA" smtClean="0"/>
-              <a:t>2023-09-11</a:t>
+              <a:t>2023-09-19</a:t>
             </a:fld>
             <a:endParaRPr lang="en-CA"/>
           </a:p>
@@ -1975,7 +1975,7 @@
           <a:p>
             <a:fld id="{0938498D-1C41-419D-AAE9-C19D57E0856E}" type="datetimeFigureOut">
               <a:rPr lang="en-CA" smtClean="0"/>
-              <a:t>2023-09-11</a:t>
+              <a:t>2023-09-19</a:t>
             </a:fld>
             <a:endParaRPr lang="en-CA"/>
           </a:p>
@@ -2088,7 +2088,7 @@
           <a:p>
             <a:fld id="{0938498D-1C41-419D-AAE9-C19D57E0856E}" type="datetimeFigureOut">
               <a:rPr lang="en-CA" smtClean="0"/>
-              <a:t>2023-09-11</a:t>
+              <a:t>2023-09-19</a:t>
             </a:fld>
             <a:endParaRPr lang="en-CA"/>
           </a:p>
@@ -2401,7 +2401,7 @@
           <a:p>
             <a:fld id="{0938498D-1C41-419D-AAE9-C19D57E0856E}" type="datetimeFigureOut">
               <a:rPr lang="en-CA" smtClean="0"/>
-              <a:t>2023-09-11</a:t>
+              <a:t>2023-09-19</a:t>
             </a:fld>
             <a:endParaRPr lang="en-CA"/>
           </a:p>
@@ -2690,7 +2690,7 @@
           <a:p>
             <a:fld id="{0938498D-1C41-419D-AAE9-C19D57E0856E}" type="datetimeFigureOut">
               <a:rPr lang="en-CA" smtClean="0"/>
-              <a:t>2023-09-11</a:t>
+              <a:t>2023-09-19</a:t>
             </a:fld>
             <a:endParaRPr lang="en-CA"/>
           </a:p>
@@ -2963,7 +2963,7 @@
           <a:p>
             <a:fld id="{0938498D-1C41-419D-AAE9-C19D57E0856E}" type="datetimeFigureOut">
               <a:rPr lang="en-CA" smtClean="0"/>
-              <a:t>2023-09-11</a:t>
+              <a:t>2023-09-19</a:t>
             </a:fld>
             <a:endParaRPr lang="en-CA"/>
           </a:p>
@@ -7253,13 +7253,15 @@
               </a:ext>
             </a:extLst>
           </p:cNvPr>
-          <p:cNvCxnSpPr/>
+          <p:cNvCxnSpPr>
+            <a:cxnSpLocks/>
+          </p:cNvCxnSpPr>
           <p:nvPr/>
         </p:nvCxnSpPr>
         <p:spPr>
           <a:xfrm>
-            <a:off x="0" y="1936910"/>
-            <a:ext cx="12192000" cy="0"/>
+            <a:off x="2018936" y="1508406"/>
+            <a:ext cx="0" cy="5349594"/>
           </a:xfrm>
           <a:prstGeom prst="line">
             <a:avLst/>
@@ -9748,6 +9750,1328 @@
           <a:p>
             <a:pPr algn="ctr"/>
             <a:endParaRPr lang="en-US"/>
+          </a:p>
+        </p:txBody>
+      </p:sp>
+      <p:sp>
+        <p:nvSpPr>
+          <p:cNvPr id="15" name="TextBox 14">
+            <a:extLst>
+              <a:ext uri="{FF2B5EF4-FFF2-40B4-BE49-F238E27FC236}">
+                <a16:creationId xmlns:a16="http://schemas.microsoft.com/office/drawing/2014/main" id="{03FD03E1-CA35-3639-3B92-AA66961CDA53}"/>
+              </a:ext>
+            </a:extLst>
+          </p:cNvPr>
+          <p:cNvSpPr txBox="1"/>
+          <p:nvPr/>
+        </p:nvSpPr>
+        <p:spPr>
+          <a:xfrm>
+            <a:off x="112498" y="1517861"/>
+            <a:ext cx="1638995" cy="369332"/>
+          </a:xfrm>
+          <a:prstGeom prst="rect">
+            <a:avLst/>
+          </a:prstGeom>
+          <a:noFill/>
+        </p:spPr>
+        <p:txBody>
+          <a:bodyPr wrap="square" rtlCol="0">
+            <a:spAutoFit/>
+          </a:bodyPr>
+          <a:lstStyle/>
+          <a:p>
+            <a:r>
+              <a:rPr lang="en-US" dirty="0">
+                <a:solidFill>
+                  <a:schemeClr val="accent1"/>
+                </a:solidFill>
+              </a:rPr>
+              <a:t>Week 1</a:t>
+            </a:r>
+            <a:r>
+              <a:rPr lang="en-US" baseline="30000" dirty="0">
+                <a:solidFill>
+                  <a:schemeClr val="accent1"/>
+                </a:solidFill>
+              </a:rPr>
+              <a:t>st</a:t>
+            </a:r>
+            <a:r>
+              <a:rPr lang="en-US" dirty="0">
+                <a:solidFill>
+                  <a:schemeClr val="accent1"/>
+                </a:solidFill>
+              </a:rPr>
+              <a:t> – 2</a:t>
+            </a:r>
+            <a:r>
+              <a:rPr lang="en-US" baseline="30000" dirty="0">
+                <a:solidFill>
+                  <a:schemeClr val="accent1"/>
+                </a:solidFill>
+              </a:rPr>
+              <a:t>nd</a:t>
+            </a:r>
+            <a:endParaRPr lang="en-US" dirty="0">
+              <a:solidFill>
+                <a:schemeClr val="accent1"/>
+              </a:solidFill>
+            </a:endParaRPr>
+          </a:p>
+        </p:txBody>
+      </p:sp>
+      <p:sp>
+        <p:nvSpPr>
+          <p:cNvPr id="16" name="TextBox 15">
+            <a:extLst>
+              <a:ext uri="{FF2B5EF4-FFF2-40B4-BE49-F238E27FC236}">
+                <a16:creationId xmlns:a16="http://schemas.microsoft.com/office/drawing/2014/main" id="{1C6563CA-1540-92AA-641F-C36D71AB6529}"/>
+              </a:ext>
+            </a:extLst>
+          </p:cNvPr>
+          <p:cNvSpPr txBox="1"/>
+          <p:nvPr/>
+        </p:nvSpPr>
+        <p:spPr>
+          <a:xfrm>
+            <a:off x="129917" y="1895750"/>
+            <a:ext cx="1638995" cy="369332"/>
+          </a:xfrm>
+          <a:prstGeom prst="rect">
+            <a:avLst/>
+          </a:prstGeom>
+          <a:noFill/>
+        </p:spPr>
+        <p:txBody>
+          <a:bodyPr wrap="square" rtlCol="0">
+            <a:spAutoFit/>
+          </a:bodyPr>
+          <a:lstStyle/>
+          <a:p>
+            <a:r>
+              <a:rPr lang="en-US" dirty="0">
+                <a:solidFill>
+                  <a:schemeClr val="accent1"/>
+                </a:solidFill>
+              </a:rPr>
+              <a:t>Week 3</a:t>
+            </a:r>
+            <a:r>
+              <a:rPr lang="en-US" baseline="30000" dirty="0">
+                <a:solidFill>
+                  <a:schemeClr val="accent1"/>
+                </a:solidFill>
+              </a:rPr>
+              <a:t>rd</a:t>
+            </a:r>
+            <a:r>
+              <a:rPr lang="en-US" dirty="0">
+                <a:solidFill>
+                  <a:schemeClr val="accent1"/>
+                </a:solidFill>
+              </a:rPr>
+              <a:t> – 9</a:t>
+            </a:r>
+            <a:r>
+              <a:rPr lang="en-US" baseline="30000" dirty="0">
+                <a:solidFill>
+                  <a:schemeClr val="accent1"/>
+                </a:solidFill>
+              </a:rPr>
+              <a:t>th</a:t>
+            </a:r>
+            <a:endParaRPr lang="en-US" dirty="0">
+              <a:solidFill>
+                <a:schemeClr val="accent1"/>
+              </a:solidFill>
+            </a:endParaRPr>
+          </a:p>
+        </p:txBody>
+      </p:sp>
+      <p:sp>
+        <p:nvSpPr>
+          <p:cNvPr id="17" name="TextBox 16">
+            <a:extLst>
+              <a:ext uri="{FF2B5EF4-FFF2-40B4-BE49-F238E27FC236}">
+                <a16:creationId xmlns:a16="http://schemas.microsoft.com/office/drawing/2014/main" id="{A89AB2C1-17D3-78A4-A419-02E86A90D5AA}"/>
+              </a:ext>
+            </a:extLst>
+          </p:cNvPr>
+          <p:cNvSpPr txBox="1"/>
+          <p:nvPr/>
+        </p:nvSpPr>
+        <p:spPr>
+          <a:xfrm>
+            <a:off x="129917" y="2282196"/>
+            <a:ext cx="1819104" cy="369332"/>
+          </a:xfrm>
+          <a:prstGeom prst="rect">
+            <a:avLst/>
+          </a:prstGeom>
+          <a:noFill/>
+        </p:spPr>
+        <p:txBody>
+          <a:bodyPr wrap="square" rtlCol="0">
+            <a:spAutoFit/>
+          </a:bodyPr>
+          <a:lstStyle/>
+          <a:p>
+            <a:r>
+              <a:rPr lang="en-US" dirty="0">
+                <a:solidFill>
+                  <a:schemeClr val="accent1"/>
+                </a:solidFill>
+              </a:rPr>
+              <a:t>Week 10</a:t>
+            </a:r>
+            <a:r>
+              <a:rPr lang="en-US" baseline="30000" dirty="0">
+                <a:solidFill>
+                  <a:schemeClr val="accent1"/>
+                </a:solidFill>
+              </a:rPr>
+              <a:t>th</a:t>
+            </a:r>
+            <a:r>
+              <a:rPr lang="en-US" dirty="0">
+                <a:solidFill>
+                  <a:schemeClr val="accent1"/>
+                </a:solidFill>
+              </a:rPr>
+              <a:t> – 16</a:t>
+            </a:r>
+            <a:r>
+              <a:rPr lang="en-US" baseline="30000" dirty="0">
+                <a:solidFill>
+                  <a:schemeClr val="accent1"/>
+                </a:solidFill>
+              </a:rPr>
+              <a:t>th</a:t>
+            </a:r>
+            <a:endParaRPr lang="en-US" dirty="0">
+              <a:solidFill>
+                <a:schemeClr val="accent1"/>
+              </a:solidFill>
+            </a:endParaRPr>
+          </a:p>
+        </p:txBody>
+      </p:sp>
+      <p:sp>
+        <p:nvSpPr>
+          <p:cNvPr id="18" name="TextBox 17">
+            <a:extLst>
+              <a:ext uri="{FF2B5EF4-FFF2-40B4-BE49-F238E27FC236}">
+                <a16:creationId xmlns:a16="http://schemas.microsoft.com/office/drawing/2014/main" id="{0C262756-A3DA-8A7F-942D-69A4EF67C182}"/>
+              </a:ext>
+            </a:extLst>
+          </p:cNvPr>
+          <p:cNvSpPr txBox="1"/>
+          <p:nvPr/>
+        </p:nvSpPr>
+        <p:spPr>
+          <a:xfrm>
+            <a:off x="112498" y="2651528"/>
+            <a:ext cx="1819104" cy="369332"/>
+          </a:xfrm>
+          <a:prstGeom prst="rect">
+            <a:avLst/>
+          </a:prstGeom>
+          <a:noFill/>
+        </p:spPr>
+        <p:txBody>
+          <a:bodyPr wrap="square" rtlCol="0">
+            <a:spAutoFit/>
+          </a:bodyPr>
+          <a:lstStyle/>
+          <a:p>
+            <a:r>
+              <a:rPr lang="en-US" b="1" dirty="0">
+                <a:solidFill>
+                  <a:schemeClr val="accent1"/>
+                </a:solidFill>
+              </a:rPr>
+              <a:t>Week 17</a:t>
+            </a:r>
+            <a:r>
+              <a:rPr lang="en-US" b="1" baseline="30000" dirty="0">
+                <a:solidFill>
+                  <a:schemeClr val="accent1"/>
+                </a:solidFill>
+              </a:rPr>
+              <a:t>th</a:t>
+            </a:r>
+            <a:r>
+              <a:rPr lang="en-US" b="1" dirty="0">
+                <a:solidFill>
+                  <a:schemeClr val="accent1"/>
+                </a:solidFill>
+              </a:rPr>
+              <a:t> – 23</a:t>
+            </a:r>
+            <a:r>
+              <a:rPr lang="en-US" b="1" baseline="30000" dirty="0">
+                <a:solidFill>
+                  <a:schemeClr val="accent1"/>
+                </a:solidFill>
+              </a:rPr>
+              <a:t>rd</a:t>
+            </a:r>
+            <a:endParaRPr lang="en-US" b="1" dirty="0">
+              <a:solidFill>
+                <a:schemeClr val="accent1"/>
+              </a:solidFill>
+            </a:endParaRPr>
+          </a:p>
+        </p:txBody>
+      </p:sp>
+      <p:sp>
+        <p:nvSpPr>
+          <p:cNvPr id="19" name="TextBox 18">
+            <a:extLst>
+              <a:ext uri="{FF2B5EF4-FFF2-40B4-BE49-F238E27FC236}">
+                <a16:creationId xmlns:a16="http://schemas.microsoft.com/office/drawing/2014/main" id="{16186157-185F-5CE8-7057-05357F7EF464}"/>
+              </a:ext>
+            </a:extLst>
+          </p:cNvPr>
+          <p:cNvSpPr txBox="1"/>
+          <p:nvPr/>
+        </p:nvSpPr>
+        <p:spPr>
+          <a:xfrm>
+            <a:off x="112498" y="3037974"/>
+            <a:ext cx="1819104" cy="369332"/>
+          </a:xfrm>
+          <a:prstGeom prst="rect">
+            <a:avLst/>
+          </a:prstGeom>
+          <a:noFill/>
+        </p:spPr>
+        <p:txBody>
+          <a:bodyPr wrap="square" rtlCol="0">
+            <a:spAutoFit/>
+          </a:bodyPr>
+          <a:lstStyle/>
+          <a:p>
+            <a:r>
+              <a:rPr lang="en-US" dirty="0">
+                <a:solidFill>
+                  <a:schemeClr val="accent1"/>
+                </a:solidFill>
+              </a:rPr>
+              <a:t>Week 24</a:t>
+            </a:r>
+            <a:r>
+              <a:rPr lang="en-US" baseline="30000" dirty="0">
+                <a:solidFill>
+                  <a:schemeClr val="accent1"/>
+                </a:solidFill>
+              </a:rPr>
+              <a:t>th</a:t>
+            </a:r>
+            <a:r>
+              <a:rPr lang="en-US" dirty="0">
+                <a:solidFill>
+                  <a:schemeClr val="accent1"/>
+                </a:solidFill>
+              </a:rPr>
+              <a:t> – 30</a:t>
+            </a:r>
+            <a:r>
+              <a:rPr lang="en-US" baseline="30000" dirty="0">
+                <a:solidFill>
+                  <a:schemeClr val="accent1"/>
+                </a:solidFill>
+              </a:rPr>
+              <a:t>rd</a:t>
+            </a:r>
+            <a:endParaRPr lang="en-US" dirty="0">
+              <a:solidFill>
+                <a:schemeClr val="accent1"/>
+              </a:solidFill>
+            </a:endParaRPr>
+          </a:p>
+        </p:txBody>
+      </p:sp>
+      <p:grpSp>
+        <p:nvGrpSpPr>
+          <p:cNvPr id="26" name="Group 25">
+            <a:extLst>
+              <a:ext uri="{FF2B5EF4-FFF2-40B4-BE49-F238E27FC236}">
+                <a16:creationId xmlns:a16="http://schemas.microsoft.com/office/drawing/2014/main" id="{1048C18C-609E-DE94-8CFA-017D6A85779A}"/>
+              </a:ext>
+            </a:extLst>
+          </p:cNvPr>
+          <p:cNvGrpSpPr/>
+          <p:nvPr/>
+        </p:nvGrpSpPr>
+        <p:grpSpPr>
+          <a:xfrm>
+            <a:off x="2337658" y="1641079"/>
+            <a:ext cx="9395853" cy="434682"/>
+            <a:chOff x="436485" y="994298"/>
+            <a:chExt cx="11319030" cy="505977"/>
+          </a:xfrm>
+        </p:grpSpPr>
+        <p:sp>
+          <p:nvSpPr>
+            <p:cNvPr id="20" name="Rectangle: Rounded Corners 19">
+              <a:extLst>
+                <a:ext uri="{FF2B5EF4-FFF2-40B4-BE49-F238E27FC236}">
+                  <a16:creationId xmlns:a16="http://schemas.microsoft.com/office/drawing/2014/main" id="{E7EB7757-296E-75A6-C20A-03785BF52C18}"/>
+                </a:ext>
+              </a:extLst>
+            </p:cNvPr>
+            <p:cNvSpPr/>
+            <p:nvPr/>
+          </p:nvSpPr>
+          <p:spPr>
+            <a:xfrm>
+              <a:off x="436485" y="994298"/>
+              <a:ext cx="11319030" cy="505977"/>
+            </a:xfrm>
+            <a:prstGeom prst="roundRect">
+              <a:avLst/>
+            </a:prstGeom>
+          </p:spPr>
+          <p:style>
+            <a:lnRef idx="2">
+              <a:schemeClr val="accent1">
+                <a:shade val="50000"/>
+              </a:schemeClr>
+            </a:lnRef>
+            <a:fillRef idx="1">
+              <a:schemeClr val="accent1"/>
+            </a:fillRef>
+            <a:effectRef idx="0">
+              <a:schemeClr val="accent1"/>
+            </a:effectRef>
+            <a:fontRef idx="minor">
+              <a:schemeClr val="lt1"/>
+            </a:fontRef>
+          </p:style>
+          <p:txBody>
+            <a:bodyPr rtlCol="0" anchor="ctr"/>
+            <a:lstStyle/>
+            <a:p>
+              <a:pPr algn="ctr"/>
+              <a:endParaRPr lang="en-US"/>
+            </a:p>
+          </p:txBody>
+        </p:sp>
+        <p:grpSp>
+          <p:nvGrpSpPr>
+            <p:cNvPr id="21" name="Group 20">
+              <a:extLst>
+                <a:ext uri="{FF2B5EF4-FFF2-40B4-BE49-F238E27FC236}">
+                  <a16:creationId xmlns:a16="http://schemas.microsoft.com/office/drawing/2014/main" id="{4B6E0AD3-7C79-0A19-29D8-F90929A17B4E}"/>
+                </a:ext>
+              </a:extLst>
+            </p:cNvPr>
+            <p:cNvGrpSpPr/>
+            <p:nvPr/>
+          </p:nvGrpSpPr>
+          <p:grpSpPr>
+            <a:xfrm>
+              <a:off x="932156" y="1060852"/>
+              <a:ext cx="381739" cy="412789"/>
+              <a:chOff x="541537" y="1060852"/>
+              <a:chExt cx="381739" cy="412789"/>
+            </a:xfrm>
+          </p:grpSpPr>
+          <p:sp>
+            <p:nvSpPr>
+              <p:cNvPr id="22" name="Oval 21">
+                <a:extLst>
+                  <a:ext uri="{FF2B5EF4-FFF2-40B4-BE49-F238E27FC236}">
+                    <a16:creationId xmlns:a16="http://schemas.microsoft.com/office/drawing/2014/main" id="{47496450-0432-F91E-C1CA-EB36875D0E2F}"/>
+                  </a:ext>
+                </a:extLst>
+              </p:cNvPr>
+              <p:cNvSpPr/>
+              <p:nvPr/>
+            </p:nvSpPr>
+            <p:spPr>
+              <a:xfrm>
+                <a:off x="541537" y="1060852"/>
+                <a:ext cx="381739" cy="386155"/>
+              </a:xfrm>
+              <a:prstGeom prst="ellipse">
+                <a:avLst/>
+              </a:prstGeom>
+              <a:solidFill>
+                <a:schemeClr val="bg1"/>
+              </a:solidFill>
+            </p:spPr>
+            <p:style>
+              <a:lnRef idx="2">
+                <a:schemeClr val="accent1">
+                  <a:shade val="50000"/>
+                </a:schemeClr>
+              </a:lnRef>
+              <a:fillRef idx="1">
+                <a:schemeClr val="accent1"/>
+              </a:fillRef>
+              <a:effectRef idx="0">
+                <a:schemeClr val="accent1"/>
+              </a:effectRef>
+              <a:fontRef idx="minor">
+                <a:schemeClr val="lt1"/>
+              </a:fontRef>
+            </p:style>
+            <p:txBody>
+              <a:bodyPr rtlCol="0" anchor="ctr"/>
+              <a:lstStyle/>
+              <a:p>
+                <a:pPr algn="ctr"/>
+                <a:endParaRPr lang="en-US"/>
+              </a:p>
+            </p:txBody>
+          </p:sp>
+          <p:pic>
+            <p:nvPicPr>
+              <p:cNvPr id="23" name="Graphic 22" descr="Checkmark with solid fill">
+                <a:extLst>
+                  <a:ext uri="{FF2B5EF4-FFF2-40B4-BE49-F238E27FC236}">
+                    <a16:creationId xmlns:a16="http://schemas.microsoft.com/office/drawing/2014/main" id="{66CEC9A7-AC63-0CF3-3ED0-FCDDE368D8E1}"/>
+                  </a:ext>
+                </a:extLst>
+              </p:cNvPr>
+              <p:cNvPicPr>
+                <a:picLocks noChangeAspect="1"/>
+              </p:cNvPicPr>
+              <p:nvPr/>
+            </p:nvPicPr>
+            <p:blipFill>
+              <a:blip r:embed="rId2">
+                <a:extLst>
+                  <a:ext uri="{28A0092B-C50C-407E-A947-70E740481C1C}">
+                    <a14:useLocalDpi xmlns:a14="http://schemas.microsoft.com/office/drawing/2010/main" val="0"/>
+                  </a:ext>
+                  <a:ext uri="{96DAC541-7B7A-43D3-8B79-37D633B846F1}">
+                    <asvg:svgBlip xmlns:asvg="http://schemas.microsoft.com/office/drawing/2016/SVG/main" r:embed="rId3"/>
+                  </a:ext>
+                </a:extLst>
+              </a:blip>
+              <a:stretch>
+                <a:fillRect/>
+              </a:stretch>
+            </p:blipFill>
+            <p:spPr>
+              <a:xfrm>
+                <a:off x="541537" y="1098559"/>
+                <a:ext cx="375082" cy="375082"/>
+              </a:xfrm>
+              <a:prstGeom prst="rect">
+                <a:avLst/>
+              </a:prstGeom>
+            </p:spPr>
+          </p:pic>
+        </p:grpSp>
+        <p:sp>
+          <p:nvSpPr>
+            <p:cNvPr id="24" name="Isosceles Triangle 23">
+              <a:extLst>
+                <a:ext uri="{FF2B5EF4-FFF2-40B4-BE49-F238E27FC236}">
+                  <a16:creationId xmlns:a16="http://schemas.microsoft.com/office/drawing/2014/main" id="{2004089A-13DE-BC69-C29C-336279E6057B}"/>
+                </a:ext>
+              </a:extLst>
+            </p:cNvPr>
+            <p:cNvSpPr/>
+            <p:nvPr/>
+          </p:nvSpPr>
+          <p:spPr>
+            <a:xfrm rot="5400000">
+              <a:off x="595544" y="1137383"/>
+              <a:ext cx="177553" cy="233091"/>
+            </a:xfrm>
+            <a:prstGeom prst="triangle">
+              <a:avLst/>
+            </a:prstGeom>
+            <a:solidFill>
+              <a:schemeClr val="bg1"/>
+            </a:solidFill>
+          </p:spPr>
+          <p:style>
+            <a:lnRef idx="2">
+              <a:schemeClr val="accent1">
+                <a:shade val="50000"/>
+              </a:schemeClr>
+            </a:lnRef>
+            <a:fillRef idx="1">
+              <a:schemeClr val="accent1"/>
+            </a:fillRef>
+            <a:effectRef idx="0">
+              <a:schemeClr val="accent1"/>
+            </a:effectRef>
+            <a:fontRef idx="minor">
+              <a:schemeClr val="lt1"/>
+            </a:fontRef>
+          </p:style>
+          <p:txBody>
+            <a:bodyPr rtlCol="0" anchor="ctr"/>
+            <a:lstStyle/>
+            <a:p>
+              <a:pPr algn="ctr"/>
+              <a:endParaRPr lang="en-US"/>
+            </a:p>
+          </p:txBody>
+        </p:sp>
+        <p:sp>
+          <p:nvSpPr>
+            <p:cNvPr id="25" name="TextBox 24">
+              <a:extLst>
+                <a:ext uri="{FF2B5EF4-FFF2-40B4-BE49-F238E27FC236}">
+                  <a16:creationId xmlns:a16="http://schemas.microsoft.com/office/drawing/2014/main" id="{F70A55F7-615A-A250-348F-6A6D944120BB}"/>
+                </a:ext>
+              </a:extLst>
+            </p:cNvPr>
+            <p:cNvSpPr txBox="1"/>
+            <p:nvPr/>
+          </p:nvSpPr>
+          <p:spPr>
+            <a:xfrm>
+              <a:off x="1507381" y="1026816"/>
+              <a:ext cx="3009530" cy="465735"/>
+            </a:xfrm>
+            <a:prstGeom prst="rect">
+              <a:avLst/>
+            </a:prstGeom>
+            <a:noFill/>
+          </p:spPr>
+          <p:txBody>
+            <a:bodyPr wrap="square" rtlCol="0">
+              <a:spAutoFit/>
+            </a:bodyPr>
+            <a:lstStyle/>
+            <a:p>
+              <a:r>
+                <a:rPr lang="en-US" sz="2000" b="1" dirty="0">
+                  <a:solidFill>
+                    <a:schemeClr val="bg2"/>
+                  </a:solidFill>
+                </a:rPr>
+                <a:t>Complete Website</a:t>
+              </a:r>
+            </a:p>
+          </p:txBody>
+        </p:sp>
+      </p:grpSp>
+      <p:grpSp>
+        <p:nvGrpSpPr>
+          <p:cNvPr id="27" name="Group 26">
+            <a:extLst>
+              <a:ext uri="{FF2B5EF4-FFF2-40B4-BE49-F238E27FC236}">
+                <a16:creationId xmlns:a16="http://schemas.microsoft.com/office/drawing/2014/main" id="{1DDB2E5F-272C-A089-65D3-220B71AA63CE}"/>
+              </a:ext>
+            </a:extLst>
+          </p:cNvPr>
+          <p:cNvGrpSpPr/>
+          <p:nvPr/>
+        </p:nvGrpSpPr>
+        <p:grpSpPr>
+          <a:xfrm>
+            <a:off x="2337658" y="2212959"/>
+            <a:ext cx="9395853" cy="434682"/>
+            <a:chOff x="436485" y="994298"/>
+            <a:chExt cx="11319030" cy="505977"/>
+          </a:xfrm>
+        </p:grpSpPr>
+        <p:sp>
+          <p:nvSpPr>
+            <p:cNvPr id="28" name="Rectangle: Rounded Corners 27">
+              <a:extLst>
+                <a:ext uri="{FF2B5EF4-FFF2-40B4-BE49-F238E27FC236}">
+                  <a16:creationId xmlns:a16="http://schemas.microsoft.com/office/drawing/2014/main" id="{CBE5021F-B0DF-9C12-6B1C-A89E164BD23F}"/>
+                </a:ext>
+              </a:extLst>
+            </p:cNvPr>
+            <p:cNvSpPr/>
+            <p:nvPr/>
+          </p:nvSpPr>
+          <p:spPr>
+            <a:xfrm>
+              <a:off x="436485" y="994298"/>
+              <a:ext cx="11319030" cy="505977"/>
+            </a:xfrm>
+            <a:prstGeom prst="roundRect">
+              <a:avLst/>
+            </a:prstGeom>
+          </p:spPr>
+          <p:style>
+            <a:lnRef idx="2">
+              <a:schemeClr val="accent1">
+                <a:shade val="50000"/>
+              </a:schemeClr>
+            </a:lnRef>
+            <a:fillRef idx="1">
+              <a:schemeClr val="accent1"/>
+            </a:fillRef>
+            <a:effectRef idx="0">
+              <a:schemeClr val="accent1"/>
+            </a:effectRef>
+            <a:fontRef idx="minor">
+              <a:schemeClr val="lt1"/>
+            </a:fontRef>
+          </p:style>
+          <p:txBody>
+            <a:bodyPr rtlCol="0" anchor="ctr"/>
+            <a:lstStyle/>
+            <a:p>
+              <a:pPr algn="ctr"/>
+              <a:endParaRPr lang="en-US"/>
+            </a:p>
+          </p:txBody>
+        </p:sp>
+        <p:grpSp>
+          <p:nvGrpSpPr>
+            <p:cNvPr id="29" name="Group 28">
+              <a:extLst>
+                <a:ext uri="{FF2B5EF4-FFF2-40B4-BE49-F238E27FC236}">
+                  <a16:creationId xmlns:a16="http://schemas.microsoft.com/office/drawing/2014/main" id="{EF7520A5-F4D5-25A9-F62B-C53E84771F34}"/>
+                </a:ext>
+              </a:extLst>
+            </p:cNvPr>
+            <p:cNvGrpSpPr/>
+            <p:nvPr/>
+          </p:nvGrpSpPr>
+          <p:grpSpPr>
+            <a:xfrm>
+              <a:off x="932156" y="1060852"/>
+              <a:ext cx="381739" cy="412789"/>
+              <a:chOff x="541537" y="1060852"/>
+              <a:chExt cx="381739" cy="412789"/>
+            </a:xfrm>
+          </p:grpSpPr>
+          <p:sp>
+            <p:nvSpPr>
+              <p:cNvPr id="32" name="Oval 31">
+                <a:extLst>
+                  <a:ext uri="{FF2B5EF4-FFF2-40B4-BE49-F238E27FC236}">
+                    <a16:creationId xmlns:a16="http://schemas.microsoft.com/office/drawing/2014/main" id="{9B337B6C-B132-C21A-7708-047E857CBA17}"/>
+                  </a:ext>
+                </a:extLst>
+              </p:cNvPr>
+              <p:cNvSpPr/>
+              <p:nvPr/>
+            </p:nvSpPr>
+            <p:spPr>
+              <a:xfrm>
+                <a:off x="541537" y="1060852"/>
+                <a:ext cx="381739" cy="386155"/>
+              </a:xfrm>
+              <a:prstGeom prst="ellipse">
+                <a:avLst/>
+              </a:prstGeom>
+              <a:solidFill>
+                <a:schemeClr val="bg1"/>
+              </a:solidFill>
+            </p:spPr>
+            <p:style>
+              <a:lnRef idx="2">
+                <a:schemeClr val="accent1">
+                  <a:shade val="50000"/>
+                </a:schemeClr>
+              </a:lnRef>
+              <a:fillRef idx="1">
+                <a:schemeClr val="accent1"/>
+              </a:fillRef>
+              <a:effectRef idx="0">
+                <a:schemeClr val="accent1"/>
+              </a:effectRef>
+              <a:fontRef idx="minor">
+                <a:schemeClr val="lt1"/>
+              </a:fontRef>
+            </p:style>
+            <p:txBody>
+              <a:bodyPr rtlCol="0" anchor="ctr"/>
+              <a:lstStyle/>
+              <a:p>
+                <a:pPr algn="ctr"/>
+                <a:endParaRPr lang="en-US"/>
+              </a:p>
+            </p:txBody>
+          </p:sp>
+          <p:pic>
+            <p:nvPicPr>
+              <p:cNvPr id="33" name="Graphic 32" descr="Checkmark with solid fill">
+                <a:extLst>
+                  <a:ext uri="{FF2B5EF4-FFF2-40B4-BE49-F238E27FC236}">
+                    <a16:creationId xmlns:a16="http://schemas.microsoft.com/office/drawing/2014/main" id="{CBA2ACB1-FA07-AD43-FC93-1DCCD20833E6}"/>
+                  </a:ext>
+                </a:extLst>
+              </p:cNvPr>
+              <p:cNvPicPr>
+                <a:picLocks noChangeAspect="1"/>
+              </p:cNvPicPr>
+              <p:nvPr/>
+            </p:nvPicPr>
+            <p:blipFill>
+              <a:blip r:embed="rId2">
+                <a:extLst>
+                  <a:ext uri="{28A0092B-C50C-407E-A947-70E740481C1C}">
+                    <a14:useLocalDpi xmlns:a14="http://schemas.microsoft.com/office/drawing/2010/main" val="0"/>
+                  </a:ext>
+                  <a:ext uri="{96DAC541-7B7A-43D3-8B79-37D633B846F1}">
+                    <asvg:svgBlip xmlns:asvg="http://schemas.microsoft.com/office/drawing/2016/SVG/main" r:embed="rId3"/>
+                  </a:ext>
+                </a:extLst>
+              </a:blip>
+              <a:stretch>
+                <a:fillRect/>
+              </a:stretch>
+            </p:blipFill>
+            <p:spPr>
+              <a:xfrm>
+                <a:off x="541537" y="1098559"/>
+                <a:ext cx="375082" cy="375082"/>
+              </a:xfrm>
+              <a:prstGeom prst="rect">
+                <a:avLst/>
+              </a:prstGeom>
+            </p:spPr>
+          </p:pic>
+        </p:grpSp>
+        <p:sp>
+          <p:nvSpPr>
+            <p:cNvPr id="30" name="Isosceles Triangle 29">
+              <a:extLst>
+                <a:ext uri="{FF2B5EF4-FFF2-40B4-BE49-F238E27FC236}">
+                  <a16:creationId xmlns:a16="http://schemas.microsoft.com/office/drawing/2014/main" id="{B9A868FA-CBBB-7CB9-239C-82FD90ABE6C1}"/>
+                </a:ext>
+              </a:extLst>
+            </p:cNvPr>
+            <p:cNvSpPr/>
+            <p:nvPr/>
+          </p:nvSpPr>
+          <p:spPr>
+            <a:xfrm rot="5400000">
+              <a:off x="595544" y="1137383"/>
+              <a:ext cx="177553" cy="233091"/>
+            </a:xfrm>
+            <a:prstGeom prst="triangle">
+              <a:avLst/>
+            </a:prstGeom>
+            <a:solidFill>
+              <a:schemeClr val="bg1"/>
+            </a:solidFill>
+          </p:spPr>
+          <p:style>
+            <a:lnRef idx="2">
+              <a:schemeClr val="accent1">
+                <a:shade val="50000"/>
+              </a:schemeClr>
+            </a:lnRef>
+            <a:fillRef idx="1">
+              <a:schemeClr val="accent1"/>
+            </a:fillRef>
+            <a:effectRef idx="0">
+              <a:schemeClr val="accent1"/>
+            </a:effectRef>
+            <a:fontRef idx="minor">
+              <a:schemeClr val="lt1"/>
+            </a:fontRef>
+          </p:style>
+          <p:txBody>
+            <a:bodyPr rtlCol="0" anchor="ctr"/>
+            <a:lstStyle/>
+            <a:p>
+              <a:pPr algn="ctr"/>
+              <a:endParaRPr lang="en-US"/>
+            </a:p>
+          </p:txBody>
+        </p:sp>
+        <p:sp>
+          <p:nvSpPr>
+            <p:cNvPr id="31" name="TextBox 30">
+              <a:extLst>
+                <a:ext uri="{FF2B5EF4-FFF2-40B4-BE49-F238E27FC236}">
+                  <a16:creationId xmlns:a16="http://schemas.microsoft.com/office/drawing/2014/main" id="{B5E897C8-A3F4-ACEF-3C74-3A408266A7DB}"/>
+                </a:ext>
+              </a:extLst>
+            </p:cNvPr>
+            <p:cNvSpPr txBox="1"/>
+            <p:nvPr/>
+          </p:nvSpPr>
+          <p:spPr>
+            <a:xfrm>
+              <a:off x="1507381" y="1026816"/>
+              <a:ext cx="3554282" cy="465734"/>
+            </a:xfrm>
+            <a:prstGeom prst="rect">
+              <a:avLst/>
+            </a:prstGeom>
+            <a:noFill/>
+          </p:spPr>
+          <p:txBody>
+            <a:bodyPr wrap="square" rtlCol="0">
+              <a:spAutoFit/>
+            </a:bodyPr>
+            <a:lstStyle/>
+            <a:p>
+              <a:r>
+                <a:rPr lang="en-US" sz="2000" b="1" dirty="0">
+                  <a:solidFill>
+                    <a:schemeClr val="bg2"/>
+                  </a:solidFill>
+                </a:rPr>
+                <a:t>Read 2 Research Papers</a:t>
+              </a:r>
+            </a:p>
+          </p:txBody>
+        </p:sp>
+      </p:grpSp>
+      <p:grpSp>
+        <p:nvGrpSpPr>
+          <p:cNvPr id="34" name="Group 33">
+            <a:extLst>
+              <a:ext uri="{FF2B5EF4-FFF2-40B4-BE49-F238E27FC236}">
+                <a16:creationId xmlns:a16="http://schemas.microsoft.com/office/drawing/2014/main" id="{3676105E-D20A-E4EB-5605-BEECA0B30FDC}"/>
+              </a:ext>
+            </a:extLst>
+          </p:cNvPr>
+          <p:cNvGrpSpPr/>
+          <p:nvPr/>
+        </p:nvGrpSpPr>
+        <p:grpSpPr>
+          <a:xfrm>
+            <a:off x="2337658" y="2795080"/>
+            <a:ext cx="9395853" cy="434682"/>
+            <a:chOff x="436485" y="994298"/>
+            <a:chExt cx="11319030" cy="505977"/>
+          </a:xfrm>
+        </p:grpSpPr>
+        <p:sp>
+          <p:nvSpPr>
+            <p:cNvPr id="35" name="Rectangle: Rounded Corners 34">
+              <a:extLst>
+                <a:ext uri="{FF2B5EF4-FFF2-40B4-BE49-F238E27FC236}">
+                  <a16:creationId xmlns:a16="http://schemas.microsoft.com/office/drawing/2014/main" id="{278DAD61-B6C6-85CF-1B2E-3167F7F092E3}"/>
+                </a:ext>
+              </a:extLst>
+            </p:cNvPr>
+            <p:cNvSpPr/>
+            <p:nvPr/>
+          </p:nvSpPr>
+          <p:spPr>
+            <a:xfrm>
+              <a:off x="436485" y="994298"/>
+              <a:ext cx="11319030" cy="505977"/>
+            </a:xfrm>
+            <a:prstGeom prst="roundRect">
+              <a:avLst/>
+            </a:prstGeom>
+          </p:spPr>
+          <p:style>
+            <a:lnRef idx="2">
+              <a:schemeClr val="accent1">
+                <a:shade val="50000"/>
+              </a:schemeClr>
+            </a:lnRef>
+            <a:fillRef idx="1">
+              <a:schemeClr val="accent1"/>
+            </a:fillRef>
+            <a:effectRef idx="0">
+              <a:schemeClr val="accent1"/>
+            </a:effectRef>
+            <a:fontRef idx="minor">
+              <a:schemeClr val="lt1"/>
+            </a:fontRef>
+          </p:style>
+          <p:txBody>
+            <a:bodyPr rtlCol="0" anchor="ctr"/>
+            <a:lstStyle/>
+            <a:p>
+              <a:pPr algn="ctr"/>
+              <a:endParaRPr lang="en-US"/>
+            </a:p>
+          </p:txBody>
+        </p:sp>
+        <p:grpSp>
+          <p:nvGrpSpPr>
+            <p:cNvPr id="36" name="Group 35">
+              <a:extLst>
+                <a:ext uri="{FF2B5EF4-FFF2-40B4-BE49-F238E27FC236}">
+                  <a16:creationId xmlns:a16="http://schemas.microsoft.com/office/drawing/2014/main" id="{D3EFB521-4268-8A0A-4060-9F559BC32114}"/>
+                </a:ext>
+              </a:extLst>
+            </p:cNvPr>
+            <p:cNvGrpSpPr/>
+            <p:nvPr/>
+          </p:nvGrpSpPr>
+          <p:grpSpPr>
+            <a:xfrm>
+              <a:off x="932156" y="1060852"/>
+              <a:ext cx="381739" cy="412789"/>
+              <a:chOff x="541537" y="1060852"/>
+              <a:chExt cx="381739" cy="412789"/>
+            </a:xfrm>
+          </p:grpSpPr>
+          <p:sp>
+            <p:nvSpPr>
+              <p:cNvPr id="39" name="Oval 38">
+                <a:extLst>
+                  <a:ext uri="{FF2B5EF4-FFF2-40B4-BE49-F238E27FC236}">
+                    <a16:creationId xmlns:a16="http://schemas.microsoft.com/office/drawing/2014/main" id="{F3E1EB6A-9091-A501-A940-55D3E8F80323}"/>
+                  </a:ext>
+                </a:extLst>
+              </p:cNvPr>
+              <p:cNvSpPr/>
+              <p:nvPr/>
+            </p:nvSpPr>
+            <p:spPr>
+              <a:xfrm>
+                <a:off x="541537" y="1060852"/>
+                <a:ext cx="381739" cy="386155"/>
+              </a:xfrm>
+              <a:prstGeom prst="ellipse">
+                <a:avLst/>
+              </a:prstGeom>
+              <a:solidFill>
+                <a:schemeClr val="bg1"/>
+              </a:solidFill>
+            </p:spPr>
+            <p:style>
+              <a:lnRef idx="2">
+                <a:schemeClr val="accent1">
+                  <a:shade val="50000"/>
+                </a:schemeClr>
+              </a:lnRef>
+              <a:fillRef idx="1">
+                <a:schemeClr val="accent1"/>
+              </a:fillRef>
+              <a:effectRef idx="0">
+                <a:schemeClr val="accent1"/>
+              </a:effectRef>
+              <a:fontRef idx="minor">
+                <a:schemeClr val="lt1"/>
+              </a:fontRef>
+            </p:style>
+            <p:txBody>
+              <a:bodyPr rtlCol="0" anchor="ctr"/>
+              <a:lstStyle/>
+              <a:p>
+                <a:pPr algn="ctr"/>
+                <a:endParaRPr lang="en-US"/>
+              </a:p>
+            </p:txBody>
+          </p:sp>
+          <p:pic>
+            <p:nvPicPr>
+              <p:cNvPr id="40" name="Graphic 39" descr="Checkmark with solid fill">
+                <a:extLst>
+                  <a:ext uri="{FF2B5EF4-FFF2-40B4-BE49-F238E27FC236}">
+                    <a16:creationId xmlns:a16="http://schemas.microsoft.com/office/drawing/2014/main" id="{E77E8770-9210-2C12-4BEB-19DC595AD6DB}"/>
+                  </a:ext>
+                </a:extLst>
+              </p:cNvPr>
+              <p:cNvPicPr>
+                <a:picLocks noChangeAspect="1"/>
+              </p:cNvPicPr>
+              <p:nvPr/>
+            </p:nvPicPr>
+            <p:blipFill>
+              <a:blip r:embed="rId2">
+                <a:extLst>
+                  <a:ext uri="{28A0092B-C50C-407E-A947-70E740481C1C}">
+                    <a14:useLocalDpi xmlns:a14="http://schemas.microsoft.com/office/drawing/2010/main" val="0"/>
+                  </a:ext>
+                  <a:ext uri="{96DAC541-7B7A-43D3-8B79-37D633B846F1}">
+                    <asvg:svgBlip xmlns:asvg="http://schemas.microsoft.com/office/drawing/2016/SVG/main" r:embed="rId3"/>
+                  </a:ext>
+                </a:extLst>
+              </a:blip>
+              <a:stretch>
+                <a:fillRect/>
+              </a:stretch>
+            </p:blipFill>
+            <p:spPr>
+              <a:xfrm>
+                <a:off x="541537" y="1098559"/>
+                <a:ext cx="375082" cy="375082"/>
+              </a:xfrm>
+              <a:prstGeom prst="rect">
+                <a:avLst/>
+              </a:prstGeom>
+            </p:spPr>
+          </p:pic>
+        </p:grpSp>
+        <p:sp>
+          <p:nvSpPr>
+            <p:cNvPr id="37" name="Isosceles Triangle 36">
+              <a:extLst>
+                <a:ext uri="{FF2B5EF4-FFF2-40B4-BE49-F238E27FC236}">
+                  <a16:creationId xmlns:a16="http://schemas.microsoft.com/office/drawing/2014/main" id="{424AC8D1-7CA9-FB69-E28D-2273F10461F7}"/>
+                </a:ext>
+              </a:extLst>
+            </p:cNvPr>
+            <p:cNvSpPr/>
+            <p:nvPr/>
+          </p:nvSpPr>
+          <p:spPr>
+            <a:xfrm rot="5400000">
+              <a:off x="595544" y="1137383"/>
+              <a:ext cx="177553" cy="233091"/>
+            </a:xfrm>
+            <a:prstGeom prst="triangle">
+              <a:avLst/>
+            </a:prstGeom>
+            <a:solidFill>
+              <a:schemeClr val="bg1"/>
+            </a:solidFill>
+          </p:spPr>
+          <p:style>
+            <a:lnRef idx="2">
+              <a:schemeClr val="accent1">
+                <a:shade val="50000"/>
+              </a:schemeClr>
+            </a:lnRef>
+            <a:fillRef idx="1">
+              <a:schemeClr val="accent1"/>
+            </a:fillRef>
+            <a:effectRef idx="0">
+              <a:schemeClr val="accent1"/>
+            </a:effectRef>
+            <a:fontRef idx="minor">
+              <a:schemeClr val="lt1"/>
+            </a:fontRef>
+          </p:style>
+          <p:txBody>
+            <a:bodyPr rtlCol="0" anchor="ctr"/>
+            <a:lstStyle/>
+            <a:p>
+              <a:pPr algn="ctr"/>
+              <a:endParaRPr lang="en-US"/>
+            </a:p>
+          </p:txBody>
+        </p:sp>
+        <p:sp>
+          <p:nvSpPr>
+            <p:cNvPr id="38" name="TextBox 37">
+              <a:extLst>
+                <a:ext uri="{FF2B5EF4-FFF2-40B4-BE49-F238E27FC236}">
+                  <a16:creationId xmlns:a16="http://schemas.microsoft.com/office/drawing/2014/main" id="{89F8495A-4DDD-974F-DD63-7A0149C501F4}"/>
+                </a:ext>
+              </a:extLst>
+            </p:cNvPr>
+            <p:cNvSpPr txBox="1"/>
+            <p:nvPr/>
+          </p:nvSpPr>
+          <p:spPr>
+            <a:xfrm>
+              <a:off x="1507381" y="1016775"/>
+              <a:ext cx="3554282" cy="465733"/>
+            </a:xfrm>
+            <a:prstGeom prst="rect">
+              <a:avLst/>
+            </a:prstGeom>
+            <a:noFill/>
+          </p:spPr>
+          <p:txBody>
+            <a:bodyPr wrap="square" rtlCol="0">
+              <a:spAutoFit/>
+            </a:bodyPr>
+            <a:lstStyle/>
+            <a:p>
+              <a:r>
+                <a:rPr lang="en-US" sz="2000" b="1" dirty="0">
+                  <a:solidFill>
+                    <a:schemeClr val="bg2"/>
+                  </a:solidFill>
+                </a:rPr>
+                <a:t>Learn about Investing</a:t>
+              </a:r>
+            </a:p>
+          </p:txBody>
+        </p:sp>
+      </p:grpSp>
+      <p:sp>
+        <p:nvSpPr>
+          <p:cNvPr id="42" name="Rectangle: Rounded Corners 41">
+            <a:extLst>
+              <a:ext uri="{FF2B5EF4-FFF2-40B4-BE49-F238E27FC236}">
+                <a16:creationId xmlns:a16="http://schemas.microsoft.com/office/drawing/2014/main" id="{793F90CC-EDD6-2530-D365-CA2FB2F2B2AE}"/>
+              </a:ext>
+            </a:extLst>
+          </p:cNvPr>
+          <p:cNvSpPr/>
+          <p:nvPr/>
+        </p:nvSpPr>
+        <p:spPr>
+          <a:xfrm>
+            <a:off x="2348884" y="3337262"/>
+            <a:ext cx="9395853" cy="1691935"/>
+          </a:xfrm>
+          <a:prstGeom prst="roundRect">
+            <a:avLst>
+              <a:gd name="adj" fmla="val 5450"/>
+            </a:avLst>
+          </a:prstGeom>
+        </p:spPr>
+        <p:style>
+          <a:lnRef idx="2">
+            <a:schemeClr val="accent1">
+              <a:shade val="50000"/>
+            </a:schemeClr>
+          </a:lnRef>
+          <a:fillRef idx="1">
+            <a:schemeClr val="accent1"/>
+          </a:fillRef>
+          <a:effectRef idx="0">
+            <a:schemeClr val="accent1"/>
+          </a:effectRef>
+          <a:fontRef idx="minor">
+            <a:schemeClr val="lt1"/>
+          </a:fontRef>
+        </p:style>
+        <p:txBody>
+          <a:bodyPr rtlCol="0" anchor="ctr"/>
+          <a:lstStyle/>
+          <a:p>
+            <a:pPr algn="ctr"/>
+            <a:endParaRPr lang="en-US"/>
+          </a:p>
+        </p:txBody>
+      </p:sp>
+      <p:sp>
+        <p:nvSpPr>
+          <p:cNvPr id="46" name="Oval 45">
+            <a:extLst>
+              <a:ext uri="{FF2B5EF4-FFF2-40B4-BE49-F238E27FC236}">
+                <a16:creationId xmlns:a16="http://schemas.microsoft.com/office/drawing/2014/main" id="{AD9DC6A2-B694-EA35-53B8-FC51219DAA7A}"/>
+              </a:ext>
+            </a:extLst>
+          </p:cNvPr>
+          <p:cNvSpPr/>
+          <p:nvPr/>
+        </p:nvSpPr>
+        <p:spPr>
+          <a:xfrm>
+            <a:off x="2760337" y="3394439"/>
+            <a:ext cx="316879" cy="331744"/>
+          </a:xfrm>
+          <a:prstGeom prst="ellipse">
+            <a:avLst/>
+          </a:prstGeom>
+          <a:solidFill>
+            <a:schemeClr val="bg1"/>
+          </a:solidFill>
+        </p:spPr>
+        <p:style>
+          <a:lnRef idx="2">
+            <a:schemeClr val="accent1">
+              <a:shade val="50000"/>
+            </a:schemeClr>
+          </a:lnRef>
+          <a:fillRef idx="1">
+            <a:schemeClr val="accent1"/>
+          </a:fillRef>
+          <a:effectRef idx="0">
+            <a:schemeClr val="accent1"/>
+          </a:effectRef>
+          <a:fontRef idx="minor">
+            <a:schemeClr val="lt1"/>
+          </a:fontRef>
+        </p:style>
+        <p:txBody>
+          <a:bodyPr rtlCol="0" anchor="ctr"/>
+          <a:lstStyle/>
+          <a:p>
+            <a:pPr algn="ctr"/>
+            <a:endParaRPr lang="en-US"/>
+          </a:p>
+        </p:txBody>
+      </p:sp>
+      <p:sp>
+        <p:nvSpPr>
+          <p:cNvPr id="44" name="Isosceles Triangle 43">
+            <a:extLst>
+              <a:ext uri="{FF2B5EF4-FFF2-40B4-BE49-F238E27FC236}">
+                <a16:creationId xmlns:a16="http://schemas.microsoft.com/office/drawing/2014/main" id="{291C7D36-CB9F-0C0A-3F0D-D49AD1088E33}"/>
+              </a:ext>
+            </a:extLst>
+          </p:cNvPr>
+          <p:cNvSpPr/>
+          <p:nvPr/>
+        </p:nvSpPr>
+        <p:spPr>
+          <a:xfrm rot="10800000">
+            <a:off x="2478343" y="3463567"/>
+            <a:ext cx="152535" cy="193487"/>
+          </a:xfrm>
+          <a:prstGeom prst="triangle">
+            <a:avLst/>
+          </a:prstGeom>
+          <a:solidFill>
+            <a:schemeClr val="bg1"/>
+          </a:solidFill>
+        </p:spPr>
+        <p:style>
+          <a:lnRef idx="2">
+            <a:schemeClr val="accent1">
+              <a:shade val="50000"/>
+            </a:schemeClr>
+          </a:lnRef>
+          <a:fillRef idx="1">
+            <a:schemeClr val="accent1"/>
+          </a:fillRef>
+          <a:effectRef idx="0">
+            <a:schemeClr val="accent1"/>
+          </a:effectRef>
+          <a:fontRef idx="minor">
+            <a:schemeClr val="lt1"/>
+          </a:fontRef>
+        </p:style>
+        <p:txBody>
+          <a:bodyPr rtlCol="0" anchor="ctr"/>
+          <a:lstStyle/>
+          <a:p>
+            <a:pPr algn="ctr"/>
+            <a:endParaRPr lang="en-US"/>
+          </a:p>
+        </p:txBody>
+      </p:sp>
+      <p:sp>
+        <p:nvSpPr>
+          <p:cNvPr id="45" name="TextBox 44">
+            <a:extLst>
+              <a:ext uri="{FF2B5EF4-FFF2-40B4-BE49-F238E27FC236}">
+                <a16:creationId xmlns:a16="http://schemas.microsoft.com/office/drawing/2014/main" id="{DB966F54-3F73-D974-C3EC-C77272B1BA30}"/>
+              </a:ext>
+            </a:extLst>
+          </p:cNvPr>
+          <p:cNvSpPr txBox="1"/>
+          <p:nvPr/>
+        </p:nvSpPr>
+        <p:spPr>
+          <a:xfrm>
+            <a:off x="3237828" y="3373825"/>
+            <a:ext cx="2950386" cy="400110"/>
+          </a:xfrm>
+          <a:prstGeom prst="rect">
+            <a:avLst/>
+          </a:prstGeom>
+          <a:noFill/>
+        </p:spPr>
+        <p:txBody>
+          <a:bodyPr wrap="square" rtlCol="0">
+            <a:spAutoFit/>
+          </a:bodyPr>
+          <a:lstStyle/>
+          <a:p>
+            <a:r>
+              <a:rPr lang="en-US" sz="2000" b="1">
+                <a:solidFill>
+                  <a:schemeClr val="bg2"/>
+                </a:solidFill>
+              </a:rPr>
+              <a:t>Work on LLM</a:t>
+            </a:r>
+            <a:endParaRPr lang="en-US" sz="2000" b="1" dirty="0">
+              <a:solidFill>
+                <a:schemeClr val="bg2"/>
+              </a:solidFill>
+            </a:endParaRPr>
           </a:p>
         </p:txBody>
       </p:sp>

</xml_diff>